<commit_message>
update day3 lab and homework
</commit_message>
<xml_diff>
--- a/dia3/lab3_selection.pptx
+++ b/dia3/lab3_selection.pptx
@@ -5,29 +5,16 @@
     <p:sldMasterId id="2147483660" r:id="rId1"/>
   </p:sldMasterIdLst>
   <p:notesMasterIdLst>
-    <p:notesMasterId r:id="rId22"/>
+    <p:notesMasterId r:id="rId9"/>
   </p:notesMasterIdLst>
   <p:sldIdLst>
     <p:sldId id="323" r:id="rId2"/>
-    <p:sldId id="275" r:id="rId3"/>
-    <p:sldId id="335" r:id="rId4"/>
-    <p:sldId id="336" r:id="rId5"/>
-    <p:sldId id="342" r:id="rId6"/>
-    <p:sldId id="341" r:id="rId7"/>
-    <p:sldId id="340" r:id="rId8"/>
-    <p:sldId id="338" r:id="rId9"/>
-    <p:sldId id="334" r:id="rId10"/>
-    <p:sldId id="343" r:id="rId11"/>
-    <p:sldId id="344" r:id="rId12"/>
-    <p:sldId id="345" r:id="rId13"/>
-    <p:sldId id="346" r:id="rId14"/>
-    <p:sldId id="347" r:id="rId15"/>
-    <p:sldId id="348" r:id="rId16"/>
-    <p:sldId id="349" r:id="rId17"/>
-    <p:sldId id="350" r:id="rId18"/>
-    <p:sldId id="351" r:id="rId19"/>
-    <p:sldId id="352" r:id="rId20"/>
-    <p:sldId id="353" r:id="rId21"/>
+    <p:sldId id="355" r:id="rId3"/>
+    <p:sldId id="356" r:id="rId4"/>
+    <p:sldId id="353" r:id="rId5"/>
+    <p:sldId id="357" r:id="rId6"/>
+    <p:sldId id="358" r:id="rId7"/>
+    <p:sldId id="359" r:id="rId8"/>
   </p:sldIdLst>
   <p:sldSz cx="9144000" cy="6858000" type="screen4x3"/>
   <p:notesSz cx="6858000" cy="9144000"/>
@@ -231,7 +218,7 @@
           <a:p>
             <a:fld id="{9EC8F33C-A7AA-43A7-BCA9-F081EA0B4664}" type="datetimeFigureOut">
               <a:rPr lang="en-US" smtClean="0"/>
-              <a:t>1/10/2019</a:t>
+              <a:t>1/11/2019</a:t>
             </a:fld>
             <a:endParaRPr lang="en-US"/>
           </a:p>
@@ -722,7 +709,7 @@
           <a:p>
             <a:fld id="{9A356AEA-056F-417E-9B38-4BA8743FE6C4}" type="datetime1">
               <a:rPr lang="en-US" smtClean="0"/>
-              <a:t>1/10/2019</a:t>
+              <a:t>1/11/2019</a:t>
             </a:fld>
             <a:endParaRPr lang="en-US"/>
           </a:p>
@@ -909,7 +896,7 @@
           <a:p>
             <a:fld id="{09867F7C-1948-4907-9EBC-DD38682B5188}" type="datetime1">
               <a:rPr lang="en-US" smtClean="0"/>
-              <a:t>1/10/2019</a:t>
+              <a:t>1/11/2019</a:t>
             </a:fld>
             <a:endParaRPr lang="en-US"/>
           </a:p>
@@ -1105,7 +1092,7 @@
           <a:p>
             <a:fld id="{A5996870-3492-4879-A20C-50CF7F25E309}" type="datetime1">
               <a:rPr lang="en-US" smtClean="0"/>
-              <a:t>1/10/2019</a:t>
+              <a:t>1/11/2019</a:t>
             </a:fld>
             <a:endParaRPr lang="en-US"/>
           </a:p>
@@ -1357,7 +1344,7 @@
           <a:p>
             <a:fld id="{3339509F-2835-4D20-8448-C5CCD453FC4A}" type="datetime1">
               <a:rPr lang="en-US" smtClean="0"/>
-              <a:t>1/10/2019</a:t>
+              <a:t>1/11/2019</a:t>
             </a:fld>
             <a:endParaRPr lang="en-US"/>
           </a:p>
@@ -1581,7 +1568,7 @@
           <a:p>
             <a:fld id="{7A6EDDDE-DBE4-4114-B865-EC3A2920782E}" type="datetime1">
               <a:rPr lang="en-US" smtClean="0"/>
-              <a:t>1/10/2019</a:t>
+              <a:t>1/11/2019</a:t>
             </a:fld>
             <a:endParaRPr lang="en-US"/>
           </a:p>
@@ -1889,7 +1876,7 @@
           <a:p>
             <a:fld id="{8DA96907-43AE-4B1E-B5FF-6853ADDA5697}" type="datetime1">
               <a:rPr lang="en-US" smtClean="0"/>
-              <a:t>1/10/2019</a:t>
+              <a:t>1/11/2019</a:t>
             </a:fld>
             <a:endParaRPr lang="en-US"/>
           </a:p>
@@ -2057,7 +2044,7 @@
           <a:p>
             <a:fld id="{2E65DF97-DE0F-4515-8F8D-0E1C627BC4E9}" type="datetime1">
               <a:rPr lang="en-US" smtClean="0"/>
-              <a:t>1/10/2019</a:t>
+              <a:t>1/11/2019</a:t>
             </a:fld>
             <a:endParaRPr lang="en-US"/>
           </a:p>
@@ -2369,7 +2356,7 @@
           <a:p>
             <a:fld id="{23B9FD00-80D5-4EA7-B536-8F4F2C3959C9}" type="datetime1">
               <a:rPr lang="en-US" smtClean="0"/>
-              <a:t>1/10/2019</a:t>
+              <a:t>1/11/2019</a:t>
             </a:fld>
             <a:endParaRPr lang="en-US"/>
           </a:p>
@@ -2681,7 +2668,7 @@
           <a:p>
             <a:fld id="{DAC77084-4DB4-4A23-9870-BF49183ACB4C}" type="datetime1">
               <a:rPr lang="en-US" smtClean="0"/>
-              <a:t>1/10/2019</a:t>
+              <a:t>1/11/2019</a:t>
             </a:fld>
             <a:endParaRPr lang="en-US"/>
           </a:p>
@@ -2867,7 +2854,7 @@
           <a:p>
             <a:fld id="{6E487ECE-0D8C-4AFB-BD35-997F06E0971C}" type="datetime1">
               <a:rPr lang="en-US" smtClean="0"/>
-              <a:t>1/10/2019</a:t>
+              <a:t>1/11/2019</a:t>
             </a:fld>
             <a:endParaRPr lang="en-US"/>
           </a:p>
@@ -3076,7 +3063,7 @@
           <a:p>
             <a:fld id="{D4F6DC8D-78A1-49CC-B033-F77D87B04958}" type="datetime1">
               <a:rPr lang="en-US" smtClean="0"/>
-              <a:t>1/10/2019</a:t>
+              <a:t>1/11/2019</a:t>
             </a:fld>
             <a:endParaRPr lang="en-US"/>
           </a:p>
@@ -3379,7 +3366,7 @@
           <a:p>
             <a:fld id="{3BCF4A7C-A413-48DA-9211-5240CAEE1DD4}" type="datetime1">
               <a:rPr lang="en-US" smtClean="0"/>
-              <a:t>1/10/2019</a:t>
+              <a:t>1/11/2019</a:t>
             </a:fld>
             <a:endParaRPr lang="en-US"/>
           </a:p>
@@ -3821,7 +3808,7 @@
           <a:p>
             <a:fld id="{AAE887C4-8D00-4515-BD6B-6D6B646F02F7}" type="datetime1">
               <a:rPr lang="en-US" smtClean="0"/>
-              <a:t>1/10/2019</a:t>
+              <a:t>1/11/2019</a:t>
             </a:fld>
             <a:endParaRPr lang="en-US"/>
           </a:p>
@@ -3956,7 +3943,7 @@
           <a:p>
             <a:fld id="{10C13C5A-776A-4D2B-A91E-2ACB7D90E7CC}" type="datetime1">
               <a:rPr lang="en-US" smtClean="0"/>
-              <a:t>1/10/2019</a:t>
+              <a:t>1/11/2019</a:t>
             </a:fld>
             <a:endParaRPr lang="en-US"/>
           </a:p>
@@ -4069,7 +4056,7 @@
           <a:p>
             <a:fld id="{00A5D59F-6FC3-492C-BAE3-F50C9D1FBA31}" type="datetime1">
               <a:rPr lang="en-US" smtClean="0"/>
-              <a:t>1/10/2019</a:t>
+              <a:t>1/11/2019</a:t>
             </a:fld>
             <a:endParaRPr lang="en-US"/>
           </a:p>
@@ -4362,7 +4349,7 @@
           <a:p>
             <a:fld id="{CD78B45F-E474-4F2F-801A-58FC9FE22655}" type="datetime1">
               <a:rPr lang="en-US" smtClean="0"/>
-              <a:t>1/10/2019</a:t>
+              <a:t>1/11/2019</a:t>
             </a:fld>
             <a:endParaRPr lang="en-US"/>
           </a:p>
@@ -4636,7 +4623,7 @@
           <a:p>
             <a:fld id="{FDF35450-A835-4587-8F84-782057674F92}" type="datetime1">
               <a:rPr lang="en-US" smtClean="0"/>
-              <a:t>1/10/2019</a:t>
+              <a:t>1/11/2019</a:t>
             </a:fld>
             <a:endParaRPr lang="en-US"/>
           </a:p>
@@ -4930,7 +4917,7 @@
           <a:p>
             <a:fld id="{F6803E09-2A09-4EEA-8E99-292225B5EDFC}" type="datetime1">
               <a:rPr lang="en-US" smtClean="0"/>
-              <a:t>1/10/2019</a:t>
+              <a:t>1/11/2019</a:t>
             </a:fld>
             <a:endParaRPr lang="en-US"/>
           </a:p>
@@ -5626,7 +5613,7 @@
           <p:cNvPr id="2" name="Title 1">
             <a:extLst>
               <a:ext uri="{FF2B5EF4-FFF2-40B4-BE49-F238E27FC236}">
-                <a16:creationId xmlns:a16="http://schemas.microsoft.com/office/drawing/2014/main" id="{4819A39B-28BB-4873-9914-8FEE18891DD4}"/>
+                <a16:creationId xmlns="" xmlns:a16="http://schemas.microsoft.com/office/drawing/2014/main" id="{4819A39B-28BB-4873-9914-8FEE18891DD4}"/>
               </a:ext>
             </a:extLst>
           </p:cNvPr>
@@ -5646,7 +5633,15 @@
           <a:p>
             <a:r>
               <a:rPr lang="es-ES" dirty="0" err="1" smtClean="0"/>
-              <a:t>Model</a:t>
+              <a:t>Bayesian</a:t>
+            </a:r>
+            <a:r>
+              <a:rPr lang="es-ES" dirty="0" smtClean="0"/>
+              <a:t> </a:t>
+            </a:r>
+            <a:r>
+              <a:rPr lang="es-ES" dirty="0" err="1" smtClean="0"/>
+              <a:t>model</a:t>
             </a:r>
             <a:r>
               <a:rPr lang="es-ES" dirty="0" smtClean="0"/>
@@ -5665,7 +5660,7 @@
           <p:cNvPr id="5" name="Subtitle 2">
             <a:extLst>
               <a:ext uri="{FF2B5EF4-FFF2-40B4-BE49-F238E27FC236}">
-                <a16:creationId xmlns:a16="http://schemas.microsoft.com/office/drawing/2014/main" id="{2BECD79D-0B3A-44C2-A155-03EC2A6A5D3B}"/>
+                <a16:creationId xmlns="" xmlns:a16="http://schemas.microsoft.com/office/drawing/2014/main" id="{2BECD79D-0B3A-44C2-A155-03EC2A6A5D3B}"/>
               </a:ext>
             </a:extLst>
           </p:cNvPr>
@@ -5967,1853 +5962,6 @@
 </p:sld>
 </file>
 
-<file path=ppt/slides/slide10.xml><?xml version="1.0" encoding="utf-8"?>
-<p:sld xmlns:a="http://schemas.openxmlformats.org/drawingml/2006/main" xmlns:r="http://schemas.openxmlformats.org/officeDocument/2006/relationships" xmlns:p="http://schemas.openxmlformats.org/presentationml/2006/main">
-  <p:cSld>
-    <p:spTree>
-      <p:nvGrpSpPr>
-        <p:cNvPr id="1" name=""/>
-        <p:cNvGrpSpPr/>
-        <p:nvPr/>
-      </p:nvGrpSpPr>
-      <p:grpSpPr>
-        <a:xfrm>
-          <a:off x="0" y="0"/>
-          <a:ext cx="0" cy="0"/>
-          <a:chOff x="0" y="0"/>
-          <a:chExt cx="0" cy="0"/>
-        </a:xfrm>
-      </p:grpSpPr>
-      <p:sp>
-        <p:nvSpPr>
-          <p:cNvPr id="2" name="Title 1"/>
-          <p:cNvSpPr>
-            <a:spLocks noGrp="1"/>
-          </p:cNvSpPr>
-          <p:nvPr>
-            <p:ph type="title"/>
-          </p:nvPr>
-        </p:nvSpPr>
-        <p:spPr/>
-        <p:txBody>
-          <a:bodyPr/>
-          <a:lstStyle/>
-          <a:p>
-            <a:r>
-              <a:rPr lang="en-US" dirty="0" smtClean="0"/>
-              <a:t>Exercise</a:t>
-            </a:r>
-            <a:endParaRPr lang="en-US" dirty="0"/>
-          </a:p>
-        </p:txBody>
-      </p:sp>
-      <p:sp>
-        <p:nvSpPr>
-          <p:cNvPr id="3" name="Content Placeholder 2"/>
-          <p:cNvSpPr>
-            <a:spLocks noGrp="1"/>
-          </p:cNvSpPr>
-          <p:nvPr>
-            <p:ph idx="1"/>
-          </p:nvPr>
-        </p:nvSpPr>
-        <p:spPr>
-          <a:xfrm>
-            <a:off x="457200" y="954158"/>
-            <a:ext cx="8229600" cy="5176768"/>
-          </a:xfrm>
-        </p:spPr>
-        <p:txBody>
-          <a:bodyPr/>
-          <a:lstStyle/>
-          <a:p>
-            <a:r>
-              <a:rPr lang="en-US" dirty="0" smtClean="0"/>
-              <a:t>Track 20 animals over a year, expect that between 10 and 20 will survive (S) (i.e., binomial likelihood)</a:t>
-            </a:r>
-          </a:p>
-          <a:p>
-            <a:r>
-              <a:rPr lang="en-US" dirty="0" smtClean="0"/>
-              <a:t>Let probability of survival = p =</a:t>
-            </a:r>
-            <a:r>
-              <a:rPr lang="en-US" dirty="0" err="1" smtClean="0"/>
-              <a:t>ilogit</a:t>
-            </a:r>
-            <a:r>
-              <a:rPr lang="en-US" dirty="0" smtClean="0"/>
-              <a:t>(theta) </a:t>
-            </a:r>
-            <a:r>
-              <a:rPr lang="en-US" dirty="0"/>
-              <a:t>where </a:t>
-            </a:r>
-            <a:r>
-              <a:rPr lang="en-US" dirty="0" err="1"/>
-              <a:t>ilogit</a:t>
-            </a:r>
-            <a:r>
-              <a:rPr lang="en-US" dirty="0"/>
-              <a:t>=1/(1+exp(-x))</a:t>
-            </a:r>
-            <a:endParaRPr lang="en-US" dirty="0" smtClean="0"/>
-          </a:p>
-          <a:p>
-            <a:r>
-              <a:rPr lang="en-US" dirty="0" smtClean="0"/>
-              <a:t>Assume prior: </a:t>
-            </a:r>
-            <a:r>
-              <a:rPr lang="en-US" dirty="0" err="1" smtClean="0"/>
-              <a:t>theta~N</a:t>
-            </a:r>
-            <a:r>
-              <a:rPr lang="en-US" dirty="0" smtClean="0"/>
-              <a:t>(0,100)</a:t>
-            </a:r>
-          </a:p>
-          <a:p>
-            <a:r>
-              <a:rPr lang="en-US" dirty="0" smtClean="0"/>
-              <a:t>Plot the implied prior on p and the prior predictive distribution for S</a:t>
-            </a:r>
-          </a:p>
-          <a:p>
-            <a:r>
-              <a:rPr lang="en-US" dirty="0" smtClean="0"/>
-              <a:t>Recalibrate theta to match our prior knowledge</a:t>
-            </a:r>
-            <a:endParaRPr lang="en-US" dirty="0"/>
-          </a:p>
-        </p:txBody>
-      </p:sp>
-      <p:sp>
-        <p:nvSpPr>
-          <p:cNvPr id="4" name="Slide Number Placeholder 3"/>
-          <p:cNvSpPr>
-            <a:spLocks noGrp="1"/>
-          </p:cNvSpPr>
-          <p:nvPr>
-            <p:ph type="sldNum" sz="quarter" idx="12"/>
-          </p:nvPr>
-        </p:nvSpPr>
-        <p:spPr/>
-        <p:txBody>
-          <a:bodyPr/>
-          <a:lstStyle/>
-          <a:p>
-            <a:fld id="{A90099C9-4CB8-9A40-B745-9AB270505907}" type="slidenum">
-              <a:rPr lang="en-US" smtClean="0"/>
-              <a:t>10</a:t>
-            </a:fld>
-            <a:endParaRPr lang="en-US"/>
-          </a:p>
-        </p:txBody>
-      </p:sp>
-    </p:spTree>
-    <p:extLst>
-      <p:ext uri="{BB962C8B-B14F-4D97-AF65-F5344CB8AC3E}">
-        <p14:creationId xmlns:p14="http://schemas.microsoft.com/office/powerpoint/2010/main" val="41579060"/>
-      </p:ext>
-    </p:extLst>
-  </p:cSld>
-  <p:clrMapOvr>
-    <a:masterClrMapping/>
-  </p:clrMapOvr>
-</p:sld>
-</file>
-
-<file path=ppt/slides/slide11.xml><?xml version="1.0" encoding="utf-8"?>
-<p:sld xmlns:a="http://schemas.openxmlformats.org/drawingml/2006/main" xmlns:r="http://schemas.openxmlformats.org/officeDocument/2006/relationships" xmlns:p="http://schemas.openxmlformats.org/presentationml/2006/main">
-  <p:cSld>
-    <p:spTree>
-      <p:nvGrpSpPr>
-        <p:cNvPr id="1" name=""/>
-        <p:cNvGrpSpPr/>
-        <p:nvPr/>
-      </p:nvGrpSpPr>
-      <p:grpSpPr>
-        <a:xfrm>
-          <a:off x="0" y="0"/>
-          <a:ext cx="0" cy="0"/>
-          <a:chOff x="0" y="0"/>
-          <a:chExt cx="0" cy="0"/>
-        </a:xfrm>
-      </p:grpSpPr>
-      <p:sp>
-        <p:nvSpPr>
-          <p:cNvPr id="2" name="Title 1"/>
-          <p:cNvSpPr>
-            <a:spLocks noGrp="1"/>
-          </p:cNvSpPr>
-          <p:nvPr>
-            <p:ph type="title"/>
-          </p:nvPr>
-        </p:nvSpPr>
-        <p:spPr/>
-        <p:txBody>
-          <a:bodyPr/>
-          <a:lstStyle/>
-          <a:p>
-            <a:r>
-              <a:rPr lang="en-US" dirty="0" smtClean="0"/>
-              <a:t>Running the model</a:t>
-            </a:r>
-            <a:endParaRPr lang="en-US" dirty="0"/>
-          </a:p>
-        </p:txBody>
-      </p:sp>
-      <p:sp>
-        <p:nvSpPr>
-          <p:cNvPr id="3" name="Content Placeholder 2"/>
-          <p:cNvSpPr>
-            <a:spLocks noGrp="1"/>
-          </p:cNvSpPr>
-          <p:nvPr>
-            <p:ph idx="1"/>
-          </p:nvPr>
-        </p:nvSpPr>
-        <p:spPr>
-          <a:xfrm>
-            <a:off x="457200" y="3568149"/>
-            <a:ext cx="8229600" cy="2474842"/>
-          </a:xfrm>
-        </p:spPr>
-        <p:txBody>
-          <a:bodyPr/>
-          <a:lstStyle/>
-          <a:p>
-            <a:pPr marL="0" indent="0">
-              <a:buNone/>
-            </a:pPr>
-            <a:r>
-              <a:rPr lang="en-US" sz="2000" dirty="0" smtClean="0">
-                <a:latin typeface="Courier New" panose="02070309020205020404" pitchFamily="49" charset="0"/>
-                <a:cs typeface="Courier New" panose="02070309020205020404" pitchFamily="49" charset="0"/>
-              </a:rPr>
-              <a:t>model </a:t>
-            </a:r>
-            <a:r>
-              <a:rPr lang="en-US" sz="2000" dirty="0">
-                <a:latin typeface="Courier New" panose="02070309020205020404" pitchFamily="49" charset="0"/>
-                <a:cs typeface="Courier New" panose="02070309020205020404" pitchFamily="49" charset="0"/>
-              </a:rPr>
-              <a:t>{</a:t>
-            </a:r>
-          </a:p>
-          <a:p>
-            <a:pPr marL="0" indent="0">
-              <a:buNone/>
-            </a:pPr>
-            <a:r>
-              <a:rPr lang="en-US" sz="2000" dirty="0">
-                <a:latin typeface="Courier New" panose="02070309020205020404" pitchFamily="49" charset="0"/>
-                <a:cs typeface="Courier New" panose="02070309020205020404" pitchFamily="49" charset="0"/>
-              </a:rPr>
-              <a:t>  </a:t>
-            </a:r>
-            <a:r>
-              <a:rPr lang="en-US" sz="2000" dirty="0" smtClean="0">
-                <a:latin typeface="Courier New" panose="02070309020205020404" pitchFamily="49" charset="0"/>
-                <a:cs typeface="Courier New" panose="02070309020205020404" pitchFamily="49" charset="0"/>
-              </a:rPr>
-              <a:t># Prior</a:t>
-            </a:r>
-            <a:endParaRPr lang="en-US" sz="2000" dirty="0">
-              <a:latin typeface="Courier New" panose="02070309020205020404" pitchFamily="49" charset="0"/>
-              <a:cs typeface="Courier New" panose="02070309020205020404" pitchFamily="49" charset="0"/>
-            </a:endParaRPr>
-          </a:p>
-          <a:p>
-            <a:pPr marL="0" indent="0">
-              <a:buNone/>
-            </a:pPr>
-            <a:r>
-              <a:rPr lang="en-US" sz="2000" dirty="0">
-                <a:latin typeface="Courier New" panose="02070309020205020404" pitchFamily="49" charset="0"/>
-                <a:cs typeface="Courier New" panose="02070309020205020404" pitchFamily="49" charset="0"/>
-              </a:rPr>
-              <a:t>  </a:t>
-            </a:r>
-            <a:r>
-              <a:rPr lang="en-US" sz="2000" dirty="0" err="1">
-                <a:latin typeface="Courier New" panose="02070309020205020404" pitchFamily="49" charset="0"/>
-                <a:cs typeface="Courier New" panose="02070309020205020404" pitchFamily="49" charset="0"/>
-              </a:rPr>
-              <a:t>theta~dnorm</a:t>
-            </a:r>
-            <a:r>
-              <a:rPr lang="en-US" sz="2000" dirty="0">
-                <a:latin typeface="Courier New" panose="02070309020205020404" pitchFamily="49" charset="0"/>
-                <a:cs typeface="Courier New" panose="02070309020205020404" pitchFamily="49" charset="0"/>
-              </a:rPr>
-              <a:t>(1, 1/(.5*.5))</a:t>
-            </a:r>
-          </a:p>
-          <a:p>
-            <a:pPr marL="0" indent="0">
-              <a:buNone/>
-            </a:pPr>
-            <a:r>
-              <a:rPr lang="en-US" sz="2000" dirty="0">
-                <a:latin typeface="Courier New" panose="02070309020205020404" pitchFamily="49" charset="0"/>
-                <a:cs typeface="Courier New" panose="02070309020205020404" pitchFamily="49" charset="0"/>
-              </a:rPr>
-              <a:t>  logit(p) &lt;- theta</a:t>
-            </a:r>
-          </a:p>
-          <a:p>
-            <a:pPr marL="0" indent="0">
-              <a:buNone/>
-            </a:pPr>
-            <a:r>
-              <a:rPr lang="en-US" sz="2000" dirty="0">
-                <a:latin typeface="Courier New" panose="02070309020205020404" pitchFamily="49" charset="0"/>
-                <a:cs typeface="Courier New" panose="02070309020205020404" pitchFamily="49" charset="0"/>
-              </a:rPr>
-              <a:t>  # likelihood</a:t>
-            </a:r>
-          </a:p>
-          <a:p>
-            <a:pPr marL="0" indent="0">
-              <a:buNone/>
-            </a:pPr>
-            <a:r>
-              <a:rPr lang="en-US" sz="2000" dirty="0">
-                <a:latin typeface="Courier New" panose="02070309020205020404" pitchFamily="49" charset="0"/>
-                <a:cs typeface="Courier New" panose="02070309020205020404" pitchFamily="49" charset="0"/>
-              </a:rPr>
-              <a:t>  y ~ </a:t>
-            </a:r>
-            <a:r>
-              <a:rPr lang="en-US" sz="2000" dirty="0" err="1">
-                <a:latin typeface="Courier New" panose="02070309020205020404" pitchFamily="49" charset="0"/>
-                <a:cs typeface="Courier New" panose="02070309020205020404" pitchFamily="49" charset="0"/>
-              </a:rPr>
-              <a:t>dbin</a:t>
-            </a:r>
-            <a:r>
-              <a:rPr lang="en-US" sz="2000" dirty="0">
-                <a:latin typeface="Courier New" panose="02070309020205020404" pitchFamily="49" charset="0"/>
-                <a:cs typeface="Courier New" panose="02070309020205020404" pitchFamily="49" charset="0"/>
-              </a:rPr>
-              <a:t>(p, </a:t>
-            </a:r>
-            <a:r>
-              <a:rPr lang="en-US" sz="2000" dirty="0" smtClean="0">
-                <a:latin typeface="Courier New" panose="02070309020205020404" pitchFamily="49" charset="0"/>
-                <a:cs typeface="Courier New" panose="02070309020205020404" pitchFamily="49" charset="0"/>
-              </a:rPr>
-              <a:t>N)</a:t>
-            </a:r>
-            <a:endParaRPr lang="en-US" sz="2000" dirty="0">
-              <a:latin typeface="Courier New" panose="02070309020205020404" pitchFamily="49" charset="0"/>
-              <a:cs typeface="Courier New" panose="02070309020205020404" pitchFamily="49" charset="0"/>
-            </a:endParaRPr>
-          </a:p>
-          <a:p>
-            <a:pPr marL="0" indent="0">
-              <a:buNone/>
-            </a:pPr>
-            <a:r>
-              <a:rPr lang="en-US" sz="2000" dirty="0">
-                <a:latin typeface="Courier New" panose="02070309020205020404" pitchFamily="49" charset="0"/>
-                <a:cs typeface="Courier New" panose="02070309020205020404" pitchFamily="49" charset="0"/>
-              </a:rPr>
-              <a:t>}</a:t>
-            </a:r>
-          </a:p>
-        </p:txBody>
-      </p:sp>
-      <p:sp>
-        <p:nvSpPr>
-          <p:cNvPr id="4" name="Slide Number Placeholder 3"/>
-          <p:cNvSpPr>
-            <a:spLocks noGrp="1"/>
-          </p:cNvSpPr>
-          <p:nvPr>
-            <p:ph type="sldNum" sz="quarter" idx="12"/>
-          </p:nvPr>
-        </p:nvSpPr>
-        <p:spPr/>
-        <p:txBody>
-          <a:bodyPr/>
-          <a:lstStyle/>
-          <a:p>
-            <a:fld id="{A90099C9-4CB8-9A40-B745-9AB270505907}" type="slidenum">
-              <a:rPr lang="en-US" smtClean="0"/>
-              <a:t>11</a:t>
-            </a:fld>
-            <a:endParaRPr lang="en-US"/>
-          </a:p>
-        </p:txBody>
-      </p:sp>
-      <p:sp>
-        <p:nvSpPr>
-          <p:cNvPr id="5" name="Content Placeholder 2"/>
-          <p:cNvSpPr txBox="1">
-            <a:spLocks/>
-          </p:cNvSpPr>
-          <p:nvPr/>
-        </p:nvSpPr>
-        <p:spPr bwMode="auto">
-          <a:xfrm>
-            <a:off x="457200" y="1152940"/>
-            <a:ext cx="8229600" cy="2286000"/>
-          </a:xfrm>
-          <a:prstGeom prst="rect">
-            <a:avLst/>
-          </a:prstGeom>
-          <a:noFill/>
-          <a:ln>
-            <a:noFill/>
-          </a:ln>
-          <a:extLst>
-            <a:ext uri="{FAA26D3D-D897-4be2-8F04-BA451C77F1D7}">
-              <ma14:placeholderFlag xmlns:ma14="http://schemas.microsoft.com/office/mac/drawingml/2011/main" xmlns="" val="1"/>
-            </a:ext>
-            <a:ext uri="{909E8E84-426E-40dd-AFC4-6F175D3DCCD1}">
-              <a14:hiddenFill xmlns:a14="http://schemas.microsoft.com/office/drawing/2010/main" xmlns="">
-                <a:solidFill>
-                  <a:srgbClr val="FFFFFF"/>
-                </a:solidFill>
-              </a14:hiddenFill>
-            </a:ext>
-            <a:ext uri="{91240B29-F687-4f45-9708-019B960494DF}">
-              <a14:hiddenLine xmlns:a14="http://schemas.microsoft.com/office/drawing/2010/main" xmlns="" w="9525">
-                <a:solidFill>
-                  <a:srgbClr val="000000"/>
-                </a:solidFill>
-                <a:miter lim="800000"/>
-                <a:headEnd/>
-                <a:tailEnd/>
-              </a14:hiddenLine>
-            </a:ext>
-          </a:extLst>
-        </p:spPr>
-        <p:txBody>
-          <a:bodyPr vert="horz" wrap="square" lIns="91440" tIns="45720" rIns="91440" bIns="45720" numCol="1" anchor="t" anchorCtr="0" compatLnSpc="1">
-            <a:prstTxWarp prst="textNoShape">
-              <a:avLst/>
-            </a:prstTxWarp>
-          </a:bodyPr>
-          <a:lstStyle>
-            <a:lvl1pPr marL="342900" indent="-342900" algn="l" rtl="0" eaLnBrk="1" fontAlgn="base" hangingPunct="1">
-              <a:spcBef>
-                <a:spcPct val="20000"/>
-              </a:spcBef>
-              <a:spcAft>
-                <a:spcPct val="0"/>
-              </a:spcAft>
-              <a:buClr>
-                <a:schemeClr val="accent1"/>
-              </a:buClr>
-              <a:buSzPct val="65000"/>
-              <a:buFont typeface="Wingdings" charset="0"/>
-              <a:buChar char="n"/>
-              <a:defRPr sz="3000">
-                <a:solidFill>
-                  <a:schemeClr val="tx1"/>
-                </a:solidFill>
-                <a:latin typeface="+mn-lt"/>
-                <a:ea typeface="ＭＳ Ｐゴシック" charset="0"/>
-                <a:cs typeface="ＭＳ Ｐゴシック" charset="0"/>
-              </a:defRPr>
-            </a:lvl1pPr>
-            <a:lvl2pPr marL="669925" indent="-325438" algn="l" rtl="0" eaLnBrk="1" fontAlgn="base" hangingPunct="1">
-              <a:spcBef>
-                <a:spcPct val="20000"/>
-              </a:spcBef>
-              <a:spcAft>
-                <a:spcPct val="0"/>
-              </a:spcAft>
-              <a:buClr>
-                <a:schemeClr val="accent2"/>
-              </a:buClr>
-              <a:buSzPct val="60000"/>
-              <a:buFont typeface="Wingdings" charset="0"/>
-              <a:buChar char="q"/>
-              <a:defRPr sz="2600">
-                <a:solidFill>
-                  <a:schemeClr val="tx1"/>
-                </a:solidFill>
-                <a:latin typeface="+mn-lt"/>
-                <a:ea typeface="ＭＳ Ｐゴシック" charset="0"/>
-              </a:defRPr>
-            </a:lvl2pPr>
-            <a:lvl3pPr marL="1022350" indent="-350838" algn="l" rtl="0" eaLnBrk="1" fontAlgn="base" hangingPunct="1">
-              <a:spcBef>
-                <a:spcPct val="20000"/>
-              </a:spcBef>
-              <a:spcAft>
-                <a:spcPct val="0"/>
-              </a:spcAft>
-              <a:buClr>
-                <a:schemeClr val="accent1"/>
-              </a:buClr>
-              <a:buSzPct val="65000"/>
-              <a:buFont typeface="Wingdings" charset="0"/>
-              <a:buChar char="n"/>
-              <a:defRPr sz="2200">
-                <a:solidFill>
-                  <a:schemeClr val="tx1"/>
-                </a:solidFill>
-                <a:latin typeface="+mn-lt"/>
-                <a:ea typeface="ＭＳ Ｐゴシック" charset="0"/>
-              </a:defRPr>
-            </a:lvl3pPr>
-            <a:lvl4pPr marL="1339850" indent="-315913" algn="l" rtl="0" eaLnBrk="1" fontAlgn="base" hangingPunct="1">
-              <a:spcBef>
-                <a:spcPct val="20000"/>
-              </a:spcBef>
-              <a:spcAft>
-                <a:spcPct val="0"/>
-              </a:spcAft>
-              <a:buClr>
-                <a:schemeClr val="accent2"/>
-              </a:buClr>
-              <a:buSzPct val="70000"/>
-              <a:buFont typeface="Wingdings" charset="0"/>
-              <a:buChar char="q"/>
-              <a:defRPr sz="2000">
-                <a:solidFill>
-                  <a:schemeClr val="tx1"/>
-                </a:solidFill>
-                <a:latin typeface="+mn-lt"/>
-                <a:ea typeface="ＭＳ Ｐゴシック" charset="0"/>
-              </a:defRPr>
-            </a:lvl4pPr>
-            <a:lvl5pPr marL="1681163" indent="-339725" algn="l" rtl="0" eaLnBrk="1" fontAlgn="base" hangingPunct="1">
-              <a:spcBef>
-                <a:spcPct val="20000"/>
-              </a:spcBef>
-              <a:spcAft>
-                <a:spcPct val="0"/>
-              </a:spcAft>
-              <a:buClr>
-                <a:schemeClr val="accent1"/>
-              </a:buClr>
-              <a:buSzPct val="75000"/>
-              <a:buFont typeface="Wingdings" charset="0"/>
-              <a:buChar char="§"/>
-              <a:defRPr sz="2000">
-                <a:solidFill>
-                  <a:schemeClr val="tx1"/>
-                </a:solidFill>
-                <a:latin typeface="+mn-lt"/>
-                <a:ea typeface="ＭＳ Ｐゴシック" charset="0"/>
-              </a:defRPr>
-            </a:lvl5pPr>
-            <a:lvl6pPr marL="2138363" indent="-339725" algn="l" rtl="0" eaLnBrk="1" fontAlgn="base" hangingPunct="1">
-              <a:spcBef>
-                <a:spcPct val="20000"/>
-              </a:spcBef>
-              <a:spcAft>
-                <a:spcPct val="0"/>
-              </a:spcAft>
-              <a:buClr>
-                <a:schemeClr val="accent1"/>
-              </a:buClr>
-              <a:buSzPct val="75000"/>
-              <a:buFont typeface="Wingdings" pitchFamily="2" charset="2"/>
-              <a:buChar char="§"/>
-              <a:defRPr sz="2000">
-                <a:solidFill>
-                  <a:schemeClr val="tx1"/>
-                </a:solidFill>
-                <a:latin typeface="+mn-lt"/>
-              </a:defRPr>
-            </a:lvl6pPr>
-            <a:lvl7pPr marL="2595563" indent="-339725" algn="l" rtl="0" eaLnBrk="1" fontAlgn="base" hangingPunct="1">
-              <a:spcBef>
-                <a:spcPct val="20000"/>
-              </a:spcBef>
-              <a:spcAft>
-                <a:spcPct val="0"/>
-              </a:spcAft>
-              <a:buClr>
-                <a:schemeClr val="accent1"/>
-              </a:buClr>
-              <a:buSzPct val="75000"/>
-              <a:buFont typeface="Wingdings" pitchFamily="2" charset="2"/>
-              <a:buChar char="§"/>
-              <a:defRPr sz="2000">
-                <a:solidFill>
-                  <a:schemeClr val="tx1"/>
-                </a:solidFill>
-                <a:latin typeface="+mn-lt"/>
-              </a:defRPr>
-            </a:lvl7pPr>
-            <a:lvl8pPr marL="3052763" indent="-339725" algn="l" rtl="0" eaLnBrk="1" fontAlgn="base" hangingPunct="1">
-              <a:spcBef>
-                <a:spcPct val="20000"/>
-              </a:spcBef>
-              <a:spcAft>
-                <a:spcPct val="0"/>
-              </a:spcAft>
-              <a:buClr>
-                <a:schemeClr val="accent1"/>
-              </a:buClr>
-              <a:buSzPct val="75000"/>
-              <a:buFont typeface="Wingdings" pitchFamily="2" charset="2"/>
-              <a:buChar char="§"/>
-              <a:defRPr sz="2000">
-                <a:solidFill>
-                  <a:schemeClr val="tx1"/>
-                </a:solidFill>
-                <a:latin typeface="+mn-lt"/>
-              </a:defRPr>
-            </a:lvl8pPr>
-            <a:lvl9pPr marL="3509963" indent="-339725" algn="l" rtl="0" eaLnBrk="1" fontAlgn="base" hangingPunct="1">
-              <a:spcBef>
-                <a:spcPct val="20000"/>
-              </a:spcBef>
-              <a:spcAft>
-                <a:spcPct val="0"/>
-              </a:spcAft>
-              <a:buClr>
-                <a:schemeClr val="accent1"/>
-              </a:buClr>
-              <a:buSzPct val="75000"/>
-              <a:buFont typeface="Wingdings" pitchFamily="2" charset="2"/>
-              <a:buChar char="§"/>
-              <a:defRPr sz="2000">
-                <a:solidFill>
-                  <a:schemeClr val="tx1"/>
-                </a:solidFill>
-                <a:latin typeface="+mn-lt"/>
-              </a:defRPr>
-            </a:lvl9pPr>
-          </a:lstStyle>
-          <a:p>
-            <a:pPr defTabSz="914400"/>
-            <a:r>
-              <a:rPr lang="en-US" kern="0" dirty="0" smtClean="0"/>
-              <a:t>Once happy with the model, introduce the data and fit it (draw samples)</a:t>
-            </a:r>
-          </a:p>
-          <a:p>
-            <a:pPr defTabSz="914400"/>
-            <a:r>
-              <a:rPr lang="en-US" kern="0" dirty="0" smtClean="0"/>
-              <a:t>We check for signs of non-convergence</a:t>
-            </a:r>
-          </a:p>
-          <a:p>
-            <a:pPr defTabSz="914400"/>
-            <a:r>
-              <a:rPr lang="en-US" kern="0" dirty="0" smtClean="0"/>
-              <a:t>[Demo in R]</a:t>
-            </a:r>
-            <a:endParaRPr lang="en-US" sz="2000" kern="0" dirty="0">
-              <a:latin typeface="Courier New" panose="02070309020205020404" pitchFamily="49" charset="0"/>
-              <a:cs typeface="Courier New" panose="02070309020205020404" pitchFamily="49" charset="0"/>
-            </a:endParaRPr>
-          </a:p>
-        </p:txBody>
-      </p:sp>
-    </p:spTree>
-    <p:extLst>
-      <p:ext uri="{BB962C8B-B14F-4D97-AF65-F5344CB8AC3E}">
-        <p14:creationId xmlns:p14="http://schemas.microsoft.com/office/powerpoint/2010/main" val="215962344"/>
-      </p:ext>
-    </p:extLst>
-  </p:cSld>
-  <p:clrMapOvr>
-    <a:masterClrMapping/>
-  </p:clrMapOvr>
-</p:sld>
-</file>
-
-<file path=ppt/slides/slide12.xml><?xml version="1.0" encoding="utf-8"?>
-<p:sld xmlns:a="http://schemas.openxmlformats.org/drawingml/2006/main" xmlns:r="http://schemas.openxmlformats.org/officeDocument/2006/relationships" xmlns:p="http://schemas.openxmlformats.org/presentationml/2006/main">
-  <p:cSld>
-    <p:spTree>
-      <p:nvGrpSpPr>
-        <p:cNvPr id="1" name=""/>
-        <p:cNvGrpSpPr/>
-        <p:nvPr/>
-      </p:nvGrpSpPr>
-      <p:grpSpPr>
-        <a:xfrm>
-          <a:off x="0" y="0"/>
-          <a:ext cx="0" cy="0"/>
-          <a:chOff x="0" y="0"/>
-          <a:chExt cx="0" cy="0"/>
-        </a:xfrm>
-      </p:grpSpPr>
-      <p:sp>
-        <p:nvSpPr>
-          <p:cNvPr id="2" name="Title 1"/>
-          <p:cNvSpPr>
-            <a:spLocks noGrp="1"/>
-          </p:cNvSpPr>
-          <p:nvPr>
-            <p:ph type="title"/>
-          </p:nvPr>
-        </p:nvSpPr>
-        <p:spPr/>
-        <p:txBody>
-          <a:bodyPr/>
-          <a:lstStyle/>
-          <a:p>
-            <a:r>
-              <a:rPr lang="en-US" dirty="0" smtClean="0"/>
-              <a:t>Exercise</a:t>
-            </a:r>
-            <a:endParaRPr lang="en-US" dirty="0"/>
-          </a:p>
-        </p:txBody>
-      </p:sp>
-      <p:sp>
-        <p:nvSpPr>
-          <p:cNvPr id="3" name="Content Placeholder 2"/>
-          <p:cNvSpPr>
-            <a:spLocks noGrp="1"/>
-          </p:cNvSpPr>
-          <p:nvPr>
-            <p:ph idx="1"/>
-          </p:nvPr>
-        </p:nvSpPr>
-        <p:spPr/>
-        <p:txBody>
-          <a:bodyPr/>
-          <a:lstStyle/>
-          <a:p>
-            <a:r>
-              <a:rPr lang="en-US" dirty="0" smtClean="0"/>
-              <a:t>Update model and R code to accept 3 individual replicates of the experiment</a:t>
-            </a:r>
-          </a:p>
-          <a:p>
-            <a:pPr marL="0" indent="0">
-              <a:buNone/>
-            </a:pPr>
-            <a:r>
-              <a:rPr lang="pt-BR" sz="2400" dirty="0">
-                <a:latin typeface="Courier New" panose="02070309020205020404" pitchFamily="49" charset="0"/>
-                <a:cs typeface="Courier New" panose="02070309020205020404" pitchFamily="49" charset="0"/>
-              </a:rPr>
-              <a:t>dat2 &lt;- list(y=c(15, 12, 11), N=c(20,20,20), R=3)</a:t>
-            </a:r>
-          </a:p>
-          <a:p>
-            <a:pPr marL="0" indent="0">
-              <a:buNone/>
-            </a:pPr>
-            <a:r>
-              <a:rPr lang="pt-BR" sz="2400" dirty="0" smtClean="0">
-                <a:latin typeface="Courier New" panose="02070309020205020404" pitchFamily="49" charset="0"/>
-                <a:cs typeface="Courier New" panose="02070309020205020404" pitchFamily="49" charset="0"/>
-              </a:rPr>
-              <a:t>dat3 </a:t>
-            </a:r>
-            <a:r>
-              <a:rPr lang="pt-BR" sz="2400" dirty="0">
-                <a:latin typeface="Courier New" panose="02070309020205020404" pitchFamily="49" charset="0"/>
-                <a:cs typeface="Courier New" panose="02070309020205020404" pitchFamily="49" charset="0"/>
-              </a:rPr>
-              <a:t>&lt;- list(y=c(15, 12, 11, 12, 4, 15, 17, 12, 16, 14),</a:t>
-            </a:r>
-          </a:p>
-          <a:p>
-            <a:pPr marL="0" indent="0">
-              <a:buNone/>
-            </a:pPr>
-            <a:r>
-              <a:rPr lang="pt-BR" sz="2400" dirty="0">
-                <a:latin typeface="Courier New" panose="02070309020205020404" pitchFamily="49" charset="0"/>
-                <a:cs typeface="Courier New" panose="02070309020205020404" pitchFamily="49" charset="0"/>
-              </a:rPr>
-              <a:t>             N=rep(20, 10), R=10)</a:t>
-            </a:r>
-          </a:p>
-          <a:p>
-            <a:r>
-              <a:rPr lang="en-US" dirty="0" smtClean="0"/>
-              <a:t>Then repeat with data set 3. Plot priors vs posterior for theta.</a:t>
-            </a:r>
-            <a:endParaRPr lang="en-US" dirty="0"/>
-          </a:p>
-        </p:txBody>
-      </p:sp>
-      <p:sp>
-        <p:nvSpPr>
-          <p:cNvPr id="4" name="Slide Number Placeholder 3"/>
-          <p:cNvSpPr>
-            <a:spLocks noGrp="1"/>
-          </p:cNvSpPr>
-          <p:nvPr>
-            <p:ph type="sldNum" sz="quarter" idx="12"/>
-          </p:nvPr>
-        </p:nvSpPr>
-        <p:spPr/>
-        <p:txBody>
-          <a:bodyPr/>
-          <a:lstStyle/>
-          <a:p>
-            <a:fld id="{A90099C9-4CB8-9A40-B745-9AB270505907}" type="slidenum">
-              <a:rPr lang="en-US" smtClean="0"/>
-              <a:t>12</a:t>
-            </a:fld>
-            <a:endParaRPr lang="en-US"/>
-          </a:p>
-        </p:txBody>
-      </p:sp>
-    </p:spTree>
-    <p:extLst>
-      <p:ext uri="{BB962C8B-B14F-4D97-AF65-F5344CB8AC3E}">
-        <p14:creationId xmlns:p14="http://schemas.microsoft.com/office/powerpoint/2010/main" val="4009323578"/>
-      </p:ext>
-    </p:extLst>
-  </p:cSld>
-  <p:clrMapOvr>
-    <a:masterClrMapping/>
-  </p:clrMapOvr>
-</p:sld>
-</file>
-
-<file path=ppt/slides/slide13.xml><?xml version="1.0" encoding="utf-8"?>
-<p:sld xmlns:a="http://schemas.openxmlformats.org/drawingml/2006/main" xmlns:r="http://schemas.openxmlformats.org/officeDocument/2006/relationships" xmlns:p="http://schemas.openxmlformats.org/presentationml/2006/main">
-  <p:cSld>
-    <p:spTree>
-      <p:nvGrpSpPr>
-        <p:cNvPr id="1" name=""/>
-        <p:cNvGrpSpPr/>
-        <p:nvPr/>
-      </p:nvGrpSpPr>
-      <p:grpSpPr>
-        <a:xfrm>
-          <a:off x="0" y="0"/>
-          <a:ext cx="0" cy="0"/>
-          <a:chOff x="0" y="0"/>
-          <a:chExt cx="0" cy="0"/>
-        </a:xfrm>
-      </p:grpSpPr>
-      <p:sp>
-        <p:nvSpPr>
-          <p:cNvPr id="2" name="Title 1"/>
-          <p:cNvSpPr>
-            <a:spLocks noGrp="1"/>
-          </p:cNvSpPr>
-          <p:nvPr>
-            <p:ph type="title"/>
-          </p:nvPr>
-        </p:nvSpPr>
-        <p:spPr/>
-        <p:txBody>
-          <a:bodyPr/>
-          <a:lstStyle/>
-          <a:p>
-            <a:r>
-              <a:rPr lang="en-US" dirty="0" smtClean="0"/>
-              <a:t>Checking the model</a:t>
-            </a:r>
-            <a:endParaRPr lang="en-US" dirty="0"/>
-          </a:p>
-        </p:txBody>
-      </p:sp>
-      <p:sp>
-        <p:nvSpPr>
-          <p:cNvPr id="3" name="Content Placeholder 2"/>
-          <p:cNvSpPr>
-            <a:spLocks noGrp="1"/>
-          </p:cNvSpPr>
-          <p:nvPr>
-            <p:ph idx="1"/>
-          </p:nvPr>
-        </p:nvSpPr>
-        <p:spPr/>
-        <p:txBody>
-          <a:bodyPr/>
-          <a:lstStyle/>
-          <a:p>
-            <a:r>
-              <a:rPr lang="en-US" dirty="0" err="1" smtClean="0"/>
-              <a:t>Rember</a:t>
-            </a:r>
-            <a:r>
-              <a:rPr lang="en-US" dirty="0" smtClean="0"/>
-              <a:t> that MCMC is a method for fitting (drawing samples)</a:t>
-            </a:r>
-          </a:p>
-          <a:p>
-            <a:r>
-              <a:rPr lang="en-US" dirty="0" smtClean="0"/>
-              <a:t>Convergence does not mean the model fits well</a:t>
-            </a:r>
-          </a:p>
-          <a:p>
-            <a:r>
-              <a:rPr lang="en-US" dirty="0" smtClean="0"/>
-              <a:t>So how do we tell if our model is appropriate for the data?</a:t>
-            </a:r>
-          </a:p>
-          <a:p>
-            <a:r>
-              <a:rPr lang="en-US" dirty="0" smtClean="0"/>
-              <a:t>One common way is a </a:t>
-            </a:r>
-            <a:r>
-              <a:rPr lang="en-US" i="1" dirty="0" smtClean="0"/>
-              <a:t>posterior predictive distribution</a:t>
-            </a:r>
-            <a:r>
-              <a:rPr lang="en-US" dirty="0" smtClean="0"/>
-              <a:t>.</a:t>
-            </a:r>
-            <a:endParaRPr lang="en-US" dirty="0"/>
-          </a:p>
-        </p:txBody>
-      </p:sp>
-      <p:sp>
-        <p:nvSpPr>
-          <p:cNvPr id="4" name="Slide Number Placeholder 3"/>
-          <p:cNvSpPr>
-            <a:spLocks noGrp="1"/>
-          </p:cNvSpPr>
-          <p:nvPr>
-            <p:ph type="sldNum" sz="quarter" idx="12"/>
-          </p:nvPr>
-        </p:nvSpPr>
-        <p:spPr/>
-        <p:txBody>
-          <a:bodyPr/>
-          <a:lstStyle/>
-          <a:p>
-            <a:fld id="{A90099C9-4CB8-9A40-B745-9AB270505907}" type="slidenum">
-              <a:rPr lang="en-US" smtClean="0"/>
-              <a:t>13</a:t>
-            </a:fld>
-            <a:endParaRPr lang="en-US"/>
-          </a:p>
-        </p:txBody>
-      </p:sp>
-    </p:spTree>
-    <p:extLst>
-      <p:ext uri="{BB962C8B-B14F-4D97-AF65-F5344CB8AC3E}">
-        <p14:creationId xmlns:p14="http://schemas.microsoft.com/office/powerpoint/2010/main" val="2706302167"/>
-      </p:ext>
-    </p:extLst>
-  </p:cSld>
-  <p:clrMapOvr>
-    <a:masterClrMapping/>
-  </p:clrMapOvr>
-</p:sld>
-</file>
-
-<file path=ppt/slides/slide14.xml><?xml version="1.0" encoding="utf-8"?>
-<p:sld xmlns:a="http://schemas.openxmlformats.org/drawingml/2006/main" xmlns:r="http://schemas.openxmlformats.org/officeDocument/2006/relationships" xmlns:p="http://schemas.openxmlformats.org/presentationml/2006/main">
-  <p:cSld>
-    <p:spTree>
-      <p:nvGrpSpPr>
-        <p:cNvPr id="1" name=""/>
-        <p:cNvGrpSpPr/>
-        <p:nvPr/>
-      </p:nvGrpSpPr>
-      <p:grpSpPr>
-        <a:xfrm>
-          <a:off x="0" y="0"/>
-          <a:ext cx="0" cy="0"/>
-          <a:chOff x="0" y="0"/>
-          <a:chExt cx="0" cy="0"/>
-        </a:xfrm>
-      </p:grpSpPr>
-      <p:sp>
-        <p:nvSpPr>
-          <p:cNvPr id="2" name="Title 1"/>
-          <p:cNvSpPr>
-            <a:spLocks noGrp="1"/>
-          </p:cNvSpPr>
-          <p:nvPr>
-            <p:ph type="title"/>
-          </p:nvPr>
-        </p:nvSpPr>
-        <p:spPr/>
-        <p:txBody>
-          <a:bodyPr/>
-          <a:lstStyle/>
-          <a:p>
-            <a:r>
-              <a:rPr lang="en-US" dirty="0" smtClean="0"/>
-              <a:t>Posterior predictive distribution</a:t>
-            </a:r>
-            <a:endParaRPr lang="en-US" dirty="0"/>
-          </a:p>
-        </p:txBody>
-      </p:sp>
-      <p:sp>
-        <p:nvSpPr>
-          <p:cNvPr id="3" name="Content Placeholder 2"/>
-          <p:cNvSpPr>
-            <a:spLocks noGrp="1"/>
-          </p:cNvSpPr>
-          <p:nvPr>
-            <p:ph idx="1"/>
-          </p:nvPr>
-        </p:nvSpPr>
-        <p:spPr/>
-        <p:txBody>
-          <a:bodyPr/>
-          <a:lstStyle/>
-          <a:p>
-            <a:r>
-              <a:rPr lang="en-US" dirty="0" err="1" smtClean="0"/>
-              <a:t>Rember</a:t>
-            </a:r>
-            <a:r>
-              <a:rPr lang="en-US" dirty="0" smtClean="0"/>
-              <a:t> that MCMC is a method for fitting (drawing samples)</a:t>
-            </a:r>
-          </a:p>
-          <a:p>
-            <a:r>
-              <a:rPr lang="en-US" dirty="0" smtClean="0"/>
-              <a:t>Convergence does not mean the model fits well</a:t>
-            </a:r>
-          </a:p>
-          <a:p>
-            <a:r>
-              <a:rPr lang="en-US" dirty="0" smtClean="0"/>
-              <a:t>So how do we tell if our model is appropriate for the data?</a:t>
-            </a:r>
-          </a:p>
-          <a:p>
-            <a:r>
-              <a:rPr lang="en-US" dirty="0" smtClean="0"/>
-              <a:t>One common way is a </a:t>
-            </a:r>
-            <a:r>
-              <a:rPr lang="en-US" i="1" dirty="0" smtClean="0"/>
-              <a:t>posterior predictive distribution</a:t>
-            </a:r>
-            <a:r>
-              <a:rPr lang="en-US" dirty="0" smtClean="0"/>
-              <a:t>.</a:t>
-            </a:r>
-            <a:endParaRPr lang="en-US" dirty="0"/>
-          </a:p>
-        </p:txBody>
-      </p:sp>
-      <p:sp>
-        <p:nvSpPr>
-          <p:cNvPr id="4" name="Slide Number Placeholder 3"/>
-          <p:cNvSpPr>
-            <a:spLocks noGrp="1"/>
-          </p:cNvSpPr>
-          <p:nvPr>
-            <p:ph type="sldNum" sz="quarter" idx="12"/>
-          </p:nvPr>
-        </p:nvSpPr>
-        <p:spPr/>
-        <p:txBody>
-          <a:bodyPr/>
-          <a:lstStyle/>
-          <a:p>
-            <a:fld id="{A90099C9-4CB8-9A40-B745-9AB270505907}" type="slidenum">
-              <a:rPr lang="en-US" smtClean="0"/>
-              <a:t>14</a:t>
-            </a:fld>
-            <a:endParaRPr lang="en-US"/>
-          </a:p>
-        </p:txBody>
-      </p:sp>
-    </p:spTree>
-    <p:extLst>
-      <p:ext uri="{BB962C8B-B14F-4D97-AF65-F5344CB8AC3E}">
-        <p14:creationId xmlns:p14="http://schemas.microsoft.com/office/powerpoint/2010/main" val="95596783"/>
-      </p:ext>
-    </p:extLst>
-  </p:cSld>
-  <p:clrMapOvr>
-    <a:masterClrMapping/>
-  </p:clrMapOvr>
-</p:sld>
-</file>
-
-<file path=ppt/slides/slide15.xml><?xml version="1.0" encoding="utf-8"?>
-<p:sld xmlns:a="http://schemas.openxmlformats.org/drawingml/2006/main" xmlns:r="http://schemas.openxmlformats.org/officeDocument/2006/relationships" xmlns:p="http://schemas.openxmlformats.org/presentationml/2006/main">
-  <p:cSld>
-    <p:spTree>
-      <p:nvGrpSpPr>
-        <p:cNvPr id="1" name=""/>
-        <p:cNvGrpSpPr/>
-        <p:nvPr/>
-      </p:nvGrpSpPr>
-      <p:grpSpPr>
-        <a:xfrm>
-          <a:off x="0" y="0"/>
-          <a:ext cx="0" cy="0"/>
-          <a:chOff x="0" y="0"/>
-          <a:chExt cx="0" cy="0"/>
-        </a:xfrm>
-      </p:grpSpPr>
-      <p:sp>
-        <p:nvSpPr>
-          <p:cNvPr id="2" name="Title 1"/>
-          <p:cNvSpPr>
-            <a:spLocks noGrp="1"/>
-          </p:cNvSpPr>
-          <p:nvPr>
-            <p:ph type="title"/>
-          </p:nvPr>
-        </p:nvSpPr>
-        <p:spPr/>
-        <p:txBody>
-          <a:bodyPr/>
-          <a:lstStyle/>
-          <a:p>
-            <a:r>
-              <a:rPr lang="en-US" dirty="0" smtClean="0"/>
-              <a:t>Posterior predictive distribution</a:t>
-            </a:r>
-            <a:endParaRPr lang="en-US" dirty="0"/>
-          </a:p>
-        </p:txBody>
-      </p:sp>
-      <p:sp>
-        <p:nvSpPr>
-          <p:cNvPr id="3" name="Content Placeholder 2"/>
-          <p:cNvSpPr>
-            <a:spLocks noGrp="1"/>
-          </p:cNvSpPr>
-          <p:nvPr>
-            <p:ph idx="1"/>
-          </p:nvPr>
-        </p:nvSpPr>
-        <p:spPr/>
-        <p:txBody>
-          <a:bodyPr/>
-          <a:lstStyle/>
-          <a:p>
-            <a:r>
-              <a:rPr lang="en-US" dirty="0" smtClean="0"/>
-              <a:t>The idea is to replicate the data generating process given the posterior distribution</a:t>
-            </a:r>
-          </a:p>
-          <a:p>
-            <a:r>
-              <a:rPr lang="en-US" dirty="0" smtClean="0"/>
-              <a:t>Can do it in R or inside the model</a:t>
-            </a:r>
-          </a:p>
-          <a:p>
-            <a:r>
-              <a:rPr lang="en-US" dirty="0" smtClean="0"/>
-              <a:t>We then compare the observed data, to those that the model predicts *would be* observed</a:t>
-            </a:r>
-          </a:p>
-          <a:p>
-            <a:r>
-              <a:rPr lang="en-US" dirty="0" smtClean="0"/>
-              <a:t>The real data should fall within the observed, or the model is not adequately describing the process</a:t>
-            </a:r>
-            <a:endParaRPr lang="en-US" dirty="0"/>
-          </a:p>
-        </p:txBody>
-      </p:sp>
-      <p:sp>
-        <p:nvSpPr>
-          <p:cNvPr id="4" name="Slide Number Placeholder 3"/>
-          <p:cNvSpPr>
-            <a:spLocks noGrp="1"/>
-          </p:cNvSpPr>
-          <p:nvPr>
-            <p:ph type="sldNum" sz="quarter" idx="12"/>
-          </p:nvPr>
-        </p:nvSpPr>
-        <p:spPr/>
-        <p:txBody>
-          <a:bodyPr/>
-          <a:lstStyle/>
-          <a:p>
-            <a:fld id="{A90099C9-4CB8-9A40-B745-9AB270505907}" type="slidenum">
-              <a:rPr lang="en-US" smtClean="0"/>
-              <a:t>15</a:t>
-            </a:fld>
-            <a:endParaRPr lang="en-US"/>
-          </a:p>
-        </p:txBody>
-      </p:sp>
-    </p:spTree>
-    <p:extLst>
-      <p:ext uri="{BB962C8B-B14F-4D97-AF65-F5344CB8AC3E}">
-        <p14:creationId xmlns:p14="http://schemas.microsoft.com/office/powerpoint/2010/main" val="3741304508"/>
-      </p:ext>
-    </p:extLst>
-  </p:cSld>
-  <p:clrMapOvr>
-    <a:masterClrMapping/>
-  </p:clrMapOvr>
-</p:sld>
-</file>
-
-<file path=ppt/slides/slide16.xml><?xml version="1.0" encoding="utf-8"?>
-<p:sld xmlns:a="http://schemas.openxmlformats.org/drawingml/2006/main" xmlns:r="http://schemas.openxmlformats.org/officeDocument/2006/relationships" xmlns:p="http://schemas.openxmlformats.org/presentationml/2006/main">
-  <p:cSld>
-    <p:spTree>
-      <p:nvGrpSpPr>
-        <p:cNvPr id="1" name=""/>
-        <p:cNvGrpSpPr/>
-        <p:nvPr/>
-      </p:nvGrpSpPr>
-      <p:grpSpPr>
-        <a:xfrm>
-          <a:off x="0" y="0"/>
-          <a:ext cx="0" cy="0"/>
-          <a:chOff x="0" y="0"/>
-          <a:chExt cx="0" cy="0"/>
-        </a:xfrm>
-      </p:grpSpPr>
-      <p:sp>
-        <p:nvSpPr>
-          <p:cNvPr id="2" name="Title 1"/>
-          <p:cNvSpPr>
-            <a:spLocks noGrp="1"/>
-          </p:cNvSpPr>
-          <p:nvPr>
-            <p:ph type="title"/>
-          </p:nvPr>
-        </p:nvSpPr>
-        <p:spPr/>
-        <p:txBody>
-          <a:bodyPr/>
-          <a:lstStyle/>
-          <a:p>
-            <a:r>
-              <a:rPr lang="en-US" dirty="0" smtClean="0"/>
-              <a:t>Posterior predictive distribution</a:t>
-            </a:r>
-            <a:endParaRPr lang="en-US" dirty="0"/>
-          </a:p>
-        </p:txBody>
-      </p:sp>
-      <p:sp>
-        <p:nvSpPr>
-          <p:cNvPr id="3" name="Content Placeholder 2"/>
-          <p:cNvSpPr>
-            <a:spLocks noGrp="1"/>
-          </p:cNvSpPr>
-          <p:nvPr>
-            <p:ph idx="1"/>
-          </p:nvPr>
-        </p:nvSpPr>
-        <p:spPr/>
-        <p:txBody>
-          <a:bodyPr/>
-          <a:lstStyle/>
-          <a:p>
-            <a:r>
-              <a:rPr lang="en-US" dirty="0" smtClean="0"/>
-              <a:t>Specifically, if we have a posterior sample </a:t>
-            </a:r>
-            <a:r>
-              <a:rPr lang="el-GR" dirty="0" smtClean="0"/>
-              <a:t>θ</a:t>
-            </a:r>
-            <a:r>
-              <a:rPr lang="en-US" dirty="0" smtClean="0"/>
-              <a:t>* then we can simulate a new data point y* by generating it from the process</a:t>
-            </a:r>
-          </a:p>
-          <a:p>
-            <a:r>
-              <a:rPr lang="en-US" dirty="0" smtClean="0"/>
-              <a:t>E.g., in our case y*=</a:t>
-            </a:r>
-            <a:r>
-              <a:rPr lang="en-US" dirty="0" err="1" smtClean="0"/>
-              <a:t>rbinom</a:t>
-            </a:r>
-            <a:r>
-              <a:rPr lang="en-US" dirty="0" smtClean="0"/>
-              <a:t>(1, 20, p*). This gives one predicted data point. Repeat for all values of </a:t>
-            </a:r>
-            <a:r>
-              <a:rPr lang="el-GR" dirty="0" smtClean="0"/>
-              <a:t>θ</a:t>
-            </a:r>
-            <a:r>
-              <a:rPr lang="en-US" dirty="0" smtClean="0"/>
-              <a:t>* to form a distribution.</a:t>
-            </a:r>
-          </a:p>
-          <a:p>
-            <a:r>
-              <a:rPr lang="en-US" dirty="0" smtClean="0"/>
-              <a:t>Then compare this (often visually) to the observed data</a:t>
-            </a:r>
-            <a:r>
-              <a:rPr lang="en-US" dirty="0"/>
-              <a:t> </a:t>
-            </a:r>
-            <a:r>
-              <a:rPr lang="en-US" dirty="0" smtClean="0"/>
-              <a:t>and look for bad patterns</a:t>
-            </a:r>
-          </a:p>
-        </p:txBody>
-      </p:sp>
-      <p:sp>
-        <p:nvSpPr>
-          <p:cNvPr id="4" name="Slide Number Placeholder 3"/>
-          <p:cNvSpPr>
-            <a:spLocks noGrp="1"/>
-          </p:cNvSpPr>
-          <p:nvPr>
-            <p:ph type="sldNum" sz="quarter" idx="12"/>
-          </p:nvPr>
-        </p:nvSpPr>
-        <p:spPr/>
-        <p:txBody>
-          <a:bodyPr/>
-          <a:lstStyle/>
-          <a:p>
-            <a:fld id="{A90099C9-4CB8-9A40-B745-9AB270505907}" type="slidenum">
-              <a:rPr lang="en-US" smtClean="0"/>
-              <a:t>16</a:t>
-            </a:fld>
-            <a:endParaRPr lang="en-US"/>
-          </a:p>
-        </p:txBody>
-      </p:sp>
-    </p:spTree>
-    <p:extLst>
-      <p:ext uri="{BB962C8B-B14F-4D97-AF65-F5344CB8AC3E}">
-        <p14:creationId xmlns:p14="http://schemas.microsoft.com/office/powerpoint/2010/main" val="3083214741"/>
-      </p:ext>
-    </p:extLst>
-  </p:cSld>
-  <p:clrMapOvr>
-    <a:masterClrMapping/>
-  </p:clrMapOvr>
-</p:sld>
-</file>
-
-<file path=ppt/slides/slide17.xml><?xml version="1.0" encoding="utf-8"?>
-<p:sld xmlns:a="http://schemas.openxmlformats.org/drawingml/2006/main" xmlns:r="http://schemas.openxmlformats.org/officeDocument/2006/relationships" xmlns:p="http://schemas.openxmlformats.org/presentationml/2006/main">
-  <p:cSld>
-    <p:spTree>
-      <p:nvGrpSpPr>
-        <p:cNvPr id="1" name=""/>
-        <p:cNvGrpSpPr/>
-        <p:nvPr/>
-      </p:nvGrpSpPr>
-      <p:grpSpPr>
-        <a:xfrm>
-          <a:off x="0" y="0"/>
-          <a:ext cx="0" cy="0"/>
-          <a:chOff x="0" y="0"/>
-          <a:chExt cx="0" cy="0"/>
-        </a:xfrm>
-      </p:grpSpPr>
-      <p:sp>
-        <p:nvSpPr>
-          <p:cNvPr id="2" name="Title 1"/>
-          <p:cNvSpPr>
-            <a:spLocks noGrp="1"/>
-          </p:cNvSpPr>
-          <p:nvPr>
-            <p:ph type="title"/>
-          </p:nvPr>
-        </p:nvSpPr>
-        <p:spPr/>
-        <p:txBody>
-          <a:bodyPr/>
-          <a:lstStyle/>
-          <a:p>
-            <a:r>
-              <a:rPr lang="en-US" dirty="0" smtClean="0"/>
-              <a:t>Exercise</a:t>
-            </a:r>
-            <a:endParaRPr lang="en-US" dirty="0"/>
-          </a:p>
-        </p:txBody>
-      </p:sp>
-      <p:sp>
-        <p:nvSpPr>
-          <p:cNvPr id="3" name="Content Placeholder 2"/>
-          <p:cNvSpPr>
-            <a:spLocks noGrp="1"/>
-          </p:cNvSpPr>
-          <p:nvPr>
-            <p:ph idx="1"/>
-          </p:nvPr>
-        </p:nvSpPr>
-        <p:spPr/>
-        <p:txBody>
-          <a:bodyPr/>
-          <a:lstStyle/>
-          <a:p>
-            <a:r>
-              <a:rPr lang="en-US" dirty="0" smtClean="0"/>
-              <a:t>Take the previous JAGS model and add a posterior predictive distribution, one for each replicate for each sample</a:t>
-            </a:r>
-          </a:p>
-          <a:p>
-            <a:r>
-              <a:rPr lang="en-US" dirty="0" smtClean="0"/>
-              <a:t>[Hint</a:t>
-            </a:r>
-            <a:r>
-              <a:rPr lang="en-US" dirty="0"/>
-              <a:t>: </a:t>
-            </a:r>
-            <a:r>
-              <a:rPr lang="en-US" dirty="0" err="1"/>
-              <a:t>ypred</a:t>
-            </a:r>
-            <a:r>
-              <a:rPr lang="en-US" dirty="0"/>
-              <a:t>[</a:t>
-            </a:r>
-            <a:r>
-              <a:rPr lang="en-US" dirty="0" err="1"/>
-              <a:t>i</a:t>
-            </a:r>
-            <a:r>
-              <a:rPr lang="en-US" dirty="0"/>
-              <a:t>] ~ </a:t>
-            </a:r>
-            <a:r>
-              <a:rPr lang="en-US" dirty="0" err="1"/>
-              <a:t>dbin</a:t>
-            </a:r>
-            <a:r>
-              <a:rPr lang="en-US" dirty="0"/>
-              <a:t>(</a:t>
-            </a:r>
-            <a:r>
-              <a:rPr lang="en-US" dirty="0" err="1"/>
-              <a:t>p,N</a:t>
-            </a:r>
-            <a:r>
-              <a:rPr lang="en-US" dirty="0"/>
-              <a:t>[</a:t>
-            </a:r>
-            <a:r>
-              <a:rPr lang="en-US" dirty="0" err="1"/>
-              <a:t>i</a:t>
-            </a:r>
-            <a:r>
-              <a:rPr lang="en-US" dirty="0" smtClean="0"/>
-              <a:t>]) will actually do random number generation like </a:t>
-            </a:r>
-            <a:r>
-              <a:rPr lang="en-US" dirty="0" err="1" smtClean="0"/>
-              <a:t>rbinom</a:t>
-            </a:r>
-            <a:r>
-              <a:rPr lang="en-US" dirty="0"/>
-              <a:t>]</a:t>
-            </a:r>
-            <a:endParaRPr lang="en-US" dirty="0" smtClean="0"/>
-          </a:p>
-          <a:p>
-            <a:r>
-              <a:rPr lang="en-US" dirty="0" smtClean="0"/>
-              <a:t>Plot the distribution of replicate vs posterior predictive and then add the real data on top</a:t>
-            </a:r>
-          </a:p>
-          <a:p>
-            <a:r>
-              <a:rPr lang="en-US" dirty="0" smtClean="0"/>
-              <a:t>[Hint: use jittering for visual clarity]</a:t>
-            </a:r>
-            <a:endParaRPr lang="en-US" dirty="0"/>
-          </a:p>
-        </p:txBody>
-      </p:sp>
-      <p:sp>
-        <p:nvSpPr>
-          <p:cNvPr id="4" name="Slide Number Placeholder 3"/>
-          <p:cNvSpPr>
-            <a:spLocks noGrp="1"/>
-          </p:cNvSpPr>
-          <p:nvPr>
-            <p:ph type="sldNum" sz="quarter" idx="12"/>
-          </p:nvPr>
-        </p:nvSpPr>
-        <p:spPr/>
-        <p:txBody>
-          <a:bodyPr/>
-          <a:lstStyle/>
-          <a:p>
-            <a:fld id="{A90099C9-4CB8-9A40-B745-9AB270505907}" type="slidenum">
-              <a:rPr lang="en-US" smtClean="0"/>
-              <a:t>17</a:t>
-            </a:fld>
-            <a:endParaRPr lang="en-US"/>
-          </a:p>
-        </p:txBody>
-      </p:sp>
-    </p:spTree>
-    <p:extLst>
-      <p:ext uri="{BB962C8B-B14F-4D97-AF65-F5344CB8AC3E}">
-        <p14:creationId xmlns:p14="http://schemas.microsoft.com/office/powerpoint/2010/main" val="3174636266"/>
-      </p:ext>
-    </p:extLst>
-  </p:cSld>
-  <p:clrMapOvr>
-    <a:masterClrMapping/>
-  </p:clrMapOvr>
-</p:sld>
-</file>
-
-<file path=ppt/slides/slide18.xml><?xml version="1.0" encoding="utf-8"?>
-<p:sld xmlns:a="http://schemas.openxmlformats.org/drawingml/2006/main" xmlns:r="http://schemas.openxmlformats.org/officeDocument/2006/relationships" xmlns:p="http://schemas.openxmlformats.org/presentationml/2006/main">
-  <p:cSld>
-    <p:spTree>
-      <p:nvGrpSpPr>
-        <p:cNvPr id="1" name=""/>
-        <p:cNvGrpSpPr/>
-        <p:nvPr/>
-      </p:nvGrpSpPr>
-      <p:grpSpPr>
-        <a:xfrm>
-          <a:off x="0" y="0"/>
-          <a:ext cx="0" cy="0"/>
-          <a:chOff x="0" y="0"/>
-          <a:chExt cx="0" cy="0"/>
-        </a:xfrm>
-      </p:grpSpPr>
-      <p:sp>
-        <p:nvSpPr>
-          <p:cNvPr id="2" name="Title 1"/>
-          <p:cNvSpPr>
-            <a:spLocks noGrp="1"/>
-          </p:cNvSpPr>
-          <p:nvPr>
-            <p:ph type="title"/>
-          </p:nvPr>
-        </p:nvSpPr>
-        <p:spPr/>
-        <p:txBody>
-          <a:bodyPr/>
-          <a:lstStyle/>
-          <a:p>
-            <a:r>
-              <a:rPr lang="en-US" dirty="0" smtClean="0"/>
-              <a:t>Bayesian model selection</a:t>
-            </a:r>
-            <a:endParaRPr lang="en-US" dirty="0"/>
-          </a:p>
-        </p:txBody>
-      </p:sp>
-      <p:sp>
-        <p:nvSpPr>
-          <p:cNvPr id="3" name="Content Placeholder 2"/>
-          <p:cNvSpPr>
-            <a:spLocks noGrp="1"/>
-          </p:cNvSpPr>
-          <p:nvPr>
-            <p:ph idx="1"/>
-          </p:nvPr>
-        </p:nvSpPr>
-        <p:spPr>
-          <a:xfrm>
-            <a:off x="457200" y="1172818"/>
-            <a:ext cx="8229600" cy="4958108"/>
-          </a:xfrm>
-        </p:spPr>
-        <p:txBody>
-          <a:bodyPr/>
-          <a:lstStyle/>
-          <a:p>
-            <a:r>
-              <a:rPr lang="en-US" dirty="0" smtClean="0"/>
-              <a:t>Model selection is not trivial. There are many existing tools and more being developed.</a:t>
-            </a:r>
-          </a:p>
-          <a:p>
-            <a:r>
-              <a:rPr lang="en-US" dirty="0" smtClean="0"/>
-              <a:t>According to Hobbs &amp; </a:t>
-            </a:r>
-            <a:r>
-              <a:rPr lang="en-US" dirty="0" err="1" smtClean="0"/>
-              <a:t>Hooten</a:t>
-            </a:r>
-            <a:r>
-              <a:rPr lang="en-US" dirty="0" smtClean="0"/>
-              <a:t> (2018)</a:t>
-            </a:r>
-          </a:p>
-          <a:p>
-            <a:pPr marL="858837" lvl="1" indent="-514350">
-              <a:buFont typeface="+mj-lt"/>
-              <a:buAutoNum type="arabicPeriod"/>
-            </a:pPr>
-            <a:r>
-              <a:rPr lang="en-US" dirty="0" smtClean="0"/>
-              <a:t>Out of sample is the best approach if possible</a:t>
-            </a:r>
-          </a:p>
-          <a:p>
-            <a:pPr marL="858837" lvl="1" indent="-514350">
-              <a:buFont typeface="+mj-lt"/>
-              <a:buAutoNum type="arabicPeriod"/>
-            </a:pPr>
-            <a:r>
-              <a:rPr lang="en-US" dirty="0" smtClean="0"/>
-              <a:t>K-fold cross validation good but slow</a:t>
-            </a:r>
-          </a:p>
-          <a:p>
-            <a:pPr marL="858837" lvl="1" indent="-514350">
-              <a:buFont typeface="+mj-lt"/>
-              <a:buAutoNum type="arabicPeriod"/>
-            </a:pPr>
-            <a:r>
-              <a:rPr lang="en-US" dirty="0" smtClean="0"/>
-              <a:t>DIC is good when prediction is important and model is slow, works best when (# pars &lt;&lt; # data)</a:t>
-            </a:r>
-          </a:p>
-          <a:p>
-            <a:pPr marL="858837" lvl="1" indent="-514350">
-              <a:buFont typeface="+mj-lt"/>
-              <a:buAutoNum type="arabicPeriod"/>
-            </a:pPr>
-            <a:r>
-              <a:rPr lang="en-US" dirty="0" smtClean="0"/>
-              <a:t>WAIC good for hierarchical models</a:t>
-            </a:r>
-            <a:endParaRPr lang="en-US" dirty="0"/>
-          </a:p>
-        </p:txBody>
-      </p:sp>
-      <p:sp>
-        <p:nvSpPr>
-          <p:cNvPr id="4" name="Slide Number Placeholder 3"/>
-          <p:cNvSpPr>
-            <a:spLocks noGrp="1"/>
-          </p:cNvSpPr>
-          <p:nvPr>
-            <p:ph type="sldNum" sz="quarter" idx="12"/>
-          </p:nvPr>
-        </p:nvSpPr>
-        <p:spPr/>
-        <p:txBody>
-          <a:bodyPr/>
-          <a:lstStyle/>
-          <a:p>
-            <a:fld id="{A90099C9-4CB8-9A40-B745-9AB270505907}" type="slidenum">
-              <a:rPr lang="en-US" smtClean="0"/>
-              <a:t>18</a:t>
-            </a:fld>
-            <a:endParaRPr lang="en-US"/>
-          </a:p>
-        </p:txBody>
-      </p:sp>
-      <p:sp>
-        <p:nvSpPr>
-          <p:cNvPr id="5" name="TextBox 4"/>
-          <p:cNvSpPr txBox="1"/>
-          <p:nvPr/>
-        </p:nvSpPr>
-        <p:spPr>
-          <a:xfrm>
-            <a:off x="457200" y="6500191"/>
-            <a:ext cx="4472609" cy="369332"/>
-          </a:xfrm>
-          <a:prstGeom prst="rect">
-            <a:avLst/>
-          </a:prstGeom>
-          <a:noFill/>
-        </p:spPr>
-        <p:txBody>
-          <a:bodyPr wrap="square" rtlCol="0">
-            <a:spAutoFit/>
-          </a:bodyPr>
-          <a:lstStyle/>
-          <a:p>
-            <a:r>
-              <a:rPr lang="en-US" dirty="0" smtClean="0"/>
-              <a:t>Hobbs &amp; </a:t>
-            </a:r>
-            <a:r>
-              <a:rPr lang="en-US" dirty="0" err="1" smtClean="0"/>
-              <a:t>Hooten</a:t>
-            </a:r>
-            <a:r>
-              <a:rPr lang="en-US" dirty="0" smtClean="0"/>
-              <a:t> (2018)</a:t>
-            </a:r>
-            <a:endParaRPr lang="en-US" dirty="0"/>
-          </a:p>
-        </p:txBody>
-      </p:sp>
-    </p:spTree>
-    <p:extLst>
-      <p:ext uri="{BB962C8B-B14F-4D97-AF65-F5344CB8AC3E}">
-        <p14:creationId xmlns:p14="http://schemas.microsoft.com/office/powerpoint/2010/main" val="1601783514"/>
-      </p:ext>
-    </p:extLst>
-  </p:cSld>
-  <p:clrMapOvr>
-    <a:masterClrMapping/>
-  </p:clrMapOvr>
-</p:sld>
-</file>
-
-<file path=ppt/slides/slide19.xml><?xml version="1.0" encoding="utf-8"?>
-<p:sld xmlns:a="http://schemas.openxmlformats.org/drawingml/2006/main" xmlns:r="http://schemas.openxmlformats.org/officeDocument/2006/relationships" xmlns:p="http://schemas.openxmlformats.org/presentationml/2006/main">
-  <p:cSld>
-    <p:spTree>
-      <p:nvGrpSpPr>
-        <p:cNvPr id="1" name=""/>
-        <p:cNvGrpSpPr/>
-        <p:nvPr/>
-      </p:nvGrpSpPr>
-      <p:grpSpPr>
-        <a:xfrm>
-          <a:off x="0" y="0"/>
-          <a:ext cx="0" cy="0"/>
-          <a:chOff x="0" y="0"/>
-          <a:chExt cx="0" cy="0"/>
-        </a:xfrm>
-      </p:grpSpPr>
-      <p:sp>
-        <p:nvSpPr>
-          <p:cNvPr id="2" name="Title 1"/>
-          <p:cNvSpPr>
-            <a:spLocks noGrp="1"/>
-          </p:cNvSpPr>
-          <p:nvPr>
-            <p:ph type="title"/>
-          </p:nvPr>
-        </p:nvSpPr>
-        <p:spPr/>
-        <p:txBody>
-          <a:bodyPr/>
-          <a:lstStyle/>
-          <a:p>
-            <a:r>
-              <a:rPr lang="en-US" dirty="0" smtClean="0"/>
-              <a:t>Bayesian model selection</a:t>
-            </a:r>
-            <a:endParaRPr lang="en-US" dirty="0"/>
-          </a:p>
-        </p:txBody>
-      </p:sp>
-      <p:sp>
-        <p:nvSpPr>
-          <p:cNvPr id="3" name="Content Placeholder 2"/>
-          <p:cNvSpPr>
-            <a:spLocks noGrp="1"/>
-          </p:cNvSpPr>
-          <p:nvPr>
-            <p:ph idx="1"/>
-          </p:nvPr>
-        </p:nvSpPr>
-        <p:spPr/>
-        <p:txBody>
-          <a:bodyPr/>
-          <a:lstStyle/>
-          <a:p>
-            <a:endParaRPr lang="en-US" dirty="0"/>
-          </a:p>
-        </p:txBody>
-      </p:sp>
-      <p:sp>
-        <p:nvSpPr>
-          <p:cNvPr id="4" name="Slide Number Placeholder 3"/>
-          <p:cNvSpPr>
-            <a:spLocks noGrp="1"/>
-          </p:cNvSpPr>
-          <p:nvPr>
-            <p:ph type="sldNum" sz="quarter" idx="12"/>
-          </p:nvPr>
-        </p:nvSpPr>
-        <p:spPr/>
-        <p:txBody>
-          <a:bodyPr/>
-          <a:lstStyle/>
-          <a:p>
-            <a:fld id="{A90099C9-4CB8-9A40-B745-9AB270505907}" type="slidenum">
-              <a:rPr lang="en-US" smtClean="0"/>
-              <a:t>19</a:t>
-            </a:fld>
-            <a:endParaRPr lang="en-US"/>
-          </a:p>
-        </p:txBody>
-      </p:sp>
-      <p:pic>
-        <p:nvPicPr>
-          <p:cNvPr id="5" name="Picture 4"/>
-          <p:cNvPicPr>
-            <a:picLocks noChangeAspect="1"/>
-          </p:cNvPicPr>
-          <p:nvPr/>
-        </p:nvPicPr>
-        <p:blipFill>
-          <a:blip r:embed="rId2"/>
-          <a:stretch>
-            <a:fillRect/>
-          </a:stretch>
-        </p:blipFill>
-        <p:spPr>
-          <a:xfrm>
-            <a:off x="65349" y="1071564"/>
-            <a:ext cx="9078651" cy="5301284"/>
-          </a:xfrm>
-          <a:prstGeom prst="rect">
-            <a:avLst/>
-          </a:prstGeom>
-        </p:spPr>
-      </p:pic>
-      <p:sp>
-        <p:nvSpPr>
-          <p:cNvPr id="6" name="TextBox 5"/>
-          <p:cNvSpPr txBox="1"/>
-          <p:nvPr/>
-        </p:nvSpPr>
-        <p:spPr>
-          <a:xfrm>
-            <a:off x="457200" y="6500191"/>
-            <a:ext cx="4472609" cy="369332"/>
-          </a:xfrm>
-          <a:prstGeom prst="rect">
-            <a:avLst/>
-          </a:prstGeom>
-          <a:noFill/>
-        </p:spPr>
-        <p:txBody>
-          <a:bodyPr wrap="square" rtlCol="0">
-            <a:spAutoFit/>
-          </a:bodyPr>
-          <a:lstStyle/>
-          <a:p>
-            <a:r>
-              <a:rPr lang="en-US" dirty="0" smtClean="0"/>
-              <a:t>Hobbs &amp; </a:t>
-            </a:r>
-            <a:r>
-              <a:rPr lang="en-US" dirty="0" err="1" smtClean="0"/>
-              <a:t>Hooten</a:t>
-            </a:r>
-            <a:r>
-              <a:rPr lang="en-US" dirty="0" smtClean="0"/>
-              <a:t> (2018)</a:t>
-            </a:r>
-            <a:endParaRPr lang="en-US" dirty="0"/>
-          </a:p>
-        </p:txBody>
-      </p:sp>
-    </p:spTree>
-    <p:extLst>
-      <p:ext uri="{BB962C8B-B14F-4D97-AF65-F5344CB8AC3E}">
-        <p14:creationId xmlns:p14="http://schemas.microsoft.com/office/powerpoint/2010/main" val="3985124899"/>
-      </p:ext>
-    </p:extLst>
-  </p:cSld>
-  <p:clrMapOvr>
-    <a:masterClrMapping/>
-  </p:clrMapOvr>
-</p:sld>
-</file>
-
 <file path=ppt/slides/slide2.xml><?xml version="1.0" encoding="utf-8"?>
 <p:sld xmlns:a="http://schemas.openxmlformats.org/drawingml/2006/main" xmlns:r="http://schemas.openxmlformats.org/officeDocument/2006/relationships" xmlns:p="http://schemas.openxmlformats.org/presentationml/2006/main">
   <p:cSld>
@@ -7833,13 +5981,7 @@
       </p:grpSpPr>
       <p:sp>
         <p:nvSpPr>
-          <p:cNvPr id="2" name="Title 1">
-            <a:extLst>
-              <a:ext uri="{FF2B5EF4-FFF2-40B4-BE49-F238E27FC236}">
-                <a16:creationId xmlns:a16="http://schemas.microsoft.com/office/drawing/2014/main" id="{3F85E31D-5021-4B9C-A2F6-6670EA453677}"/>
-              </a:ext>
-            </a:extLst>
-          </p:cNvPr>
+          <p:cNvPr id="2" name="Title 1"/>
           <p:cNvSpPr>
             <a:spLocks noGrp="1"/>
           </p:cNvSpPr>
@@ -7862,13 +6004,7 @@
       </p:sp>
       <p:sp>
         <p:nvSpPr>
-          <p:cNvPr id="3" name="Content Placeholder 2">
-            <a:extLst>
-              <a:ext uri="{FF2B5EF4-FFF2-40B4-BE49-F238E27FC236}">
-                <a16:creationId xmlns:a16="http://schemas.microsoft.com/office/drawing/2014/main" id="{28B492CE-B56B-411E-ACCC-F83AC37AA46D}"/>
-              </a:ext>
-            </a:extLst>
-          </p:cNvPr>
+          <p:cNvPr id="3" name="Content Placeholder 2"/>
           <p:cNvSpPr>
             <a:spLocks noGrp="1"/>
           </p:cNvSpPr>
@@ -7876,116 +6012,36 @@
             <p:ph idx="1"/>
           </p:nvPr>
         </p:nvSpPr>
-        <p:spPr>
-          <a:xfrm>
-            <a:off x="628650" y="1331849"/>
-            <a:ext cx="7886700" cy="4777306"/>
-          </a:xfrm>
-        </p:spPr>
+        <p:spPr/>
         <p:txBody>
           <a:bodyPr/>
           <a:lstStyle/>
           <a:p>
             <a:r>
               <a:rPr lang="en-US" dirty="0" smtClean="0"/>
-              <a:t>The posterior probability of the parameters given data is: </a:t>
-            </a:r>
-          </a:p>
-          <a:p>
-            <a:r>
-              <a:rPr lang="es-CL" dirty="0" smtClean="0"/>
-              <a:t>P(</a:t>
-            </a:r>
-            <a:r>
-              <a:rPr lang="el-GR" dirty="0"/>
-              <a:t>θ </a:t>
-            </a:r>
-            <a:r>
-              <a:rPr lang="es-CL" dirty="0" smtClean="0"/>
-              <a:t>|y)=</a:t>
-            </a:r>
-            <a:r>
-              <a:rPr lang="es-CL" dirty="0" err="1" smtClean="0"/>
-              <a:t>cP</a:t>
-            </a:r>
-            <a:r>
-              <a:rPr lang="es-CL" dirty="0" smtClean="0"/>
-              <a:t>(</a:t>
-            </a:r>
-            <a:r>
-              <a:rPr lang="el-GR" dirty="0"/>
-              <a:t>θ</a:t>
-            </a:r>
-            <a:r>
-              <a:rPr lang="es-CL" dirty="0" smtClean="0"/>
-              <a:t>)P(y|</a:t>
-            </a:r>
-            <a:r>
-              <a:rPr lang="el-GR" dirty="0" smtClean="0"/>
-              <a:t>θ</a:t>
-            </a:r>
-            <a:r>
-              <a:rPr lang="es-CL" dirty="0" smtClean="0"/>
-              <a:t>)</a:t>
-            </a:r>
-          </a:p>
-          <a:p>
-            <a:r>
-              <a:rPr lang="es-CL" dirty="0" smtClean="0"/>
-              <a:t>Posterior </a:t>
-            </a:r>
-            <a:r>
-              <a:rPr lang="es-CL" dirty="0"/>
-              <a:t>= (</a:t>
-            </a:r>
-            <a:r>
-              <a:rPr lang="es-CL" dirty="0" err="1"/>
-              <a:t>constant</a:t>
-            </a:r>
-            <a:r>
-              <a:rPr lang="es-CL" dirty="0"/>
-              <a:t>)(prior)(</a:t>
-            </a:r>
-            <a:r>
-              <a:rPr lang="es-CL" dirty="0" err="1"/>
-              <a:t>likelihood</a:t>
-            </a:r>
-            <a:r>
-              <a:rPr lang="es-CL" dirty="0"/>
-              <a:t>) </a:t>
-            </a:r>
-            <a:endParaRPr lang="es-CL" dirty="0" smtClean="0"/>
+              <a:t>In the lecture we used posterior predictive distributions to examine model self-consistency</a:t>
+            </a:r>
           </a:p>
           <a:p>
             <a:r>
               <a:rPr lang="en-US" dirty="0" smtClean="0"/>
-              <a:t>To do inference (mean, median, quantiles) we must integrate </a:t>
+              <a:t>The extra covariates appeared to allow the model to fit the data better</a:t>
             </a:r>
           </a:p>
           <a:p>
             <a:r>
               <a:rPr lang="en-US" dirty="0" smtClean="0"/>
-              <a:t>Integration is done with MCMC which draws correlated samples</a:t>
-            </a:r>
-          </a:p>
-          <a:p>
-            <a:r>
-              <a:rPr lang="en-US" dirty="0" smtClean="0"/>
-              <a:t>Must check for signs of non-convergence</a:t>
-            </a:r>
+              <a:t>Let’s test this using DIC</a:t>
+            </a:r>
+          </a:p>
+          <a:p>
             <a:endParaRPr lang="en-US" dirty="0"/>
           </a:p>
         </p:txBody>
       </p:sp>
       <p:sp>
         <p:nvSpPr>
-          <p:cNvPr id="4" name="Slide Number Placeholder 3">
-            <a:extLst>
-              <a:ext uri="{FF2B5EF4-FFF2-40B4-BE49-F238E27FC236}">
-                <a16:creationId xmlns:a16="http://schemas.microsoft.com/office/drawing/2014/main" id="{EC538D91-6F8B-42BB-A135-BD948D230469}"/>
-              </a:ext>
-            </a:extLst>
-          </p:cNvPr>
+          <p:cNvPr id="4" name="Slide Number Placeholder 3"/>
           <p:cNvSpPr>
             <a:spLocks noGrp="1"/>
           </p:cNvSpPr>
@@ -8009,98 +6065,7 @@
     </p:spTree>
     <p:extLst>
       <p:ext uri="{BB962C8B-B14F-4D97-AF65-F5344CB8AC3E}">
-        <p14:creationId xmlns:p14="http://schemas.microsoft.com/office/powerpoint/2010/main" val="1596127496"/>
-      </p:ext>
-    </p:extLst>
-  </p:cSld>
-  <p:clrMapOvr>
-    <a:masterClrMapping/>
-  </p:clrMapOvr>
-</p:sld>
-</file>
-
-<file path=ppt/slides/slide20.xml><?xml version="1.0" encoding="utf-8"?>
-<p:sld xmlns:a="http://schemas.openxmlformats.org/drawingml/2006/main" xmlns:r="http://schemas.openxmlformats.org/officeDocument/2006/relationships" xmlns:p="http://schemas.openxmlformats.org/presentationml/2006/main">
-  <p:cSld>
-    <p:spTree>
-      <p:nvGrpSpPr>
-        <p:cNvPr id="1" name=""/>
-        <p:cNvGrpSpPr/>
-        <p:nvPr/>
-      </p:nvGrpSpPr>
-      <p:grpSpPr>
-        <a:xfrm>
-          <a:off x="0" y="0"/>
-          <a:ext cx="0" cy="0"/>
-          <a:chOff x="0" y="0"/>
-          <a:chExt cx="0" cy="0"/>
-        </a:xfrm>
-      </p:grpSpPr>
-      <p:sp>
-        <p:nvSpPr>
-          <p:cNvPr id="2" name="Title 1"/>
-          <p:cNvSpPr>
-            <a:spLocks noGrp="1"/>
-          </p:cNvSpPr>
-          <p:nvPr>
-            <p:ph type="title"/>
-          </p:nvPr>
-        </p:nvSpPr>
-        <p:spPr/>
-        <p:txBody>
-          <a:bodyPr/>
-          <a:lstStyle/>
-          <a:p>
-            <a:endParaRPr lang="en-US"/>
-          </a:p>
-        </p:txBody>
-      </p:sp>
-      <p:sp>
-        <p:nvSpPr>
-          <p:cNvPr id="3" name="Content Placeholder 2"/>
-          <p:cNvSpPr>
-            <a:spLocks noGrp="1"/>
-          </p:cNvSpPr>
-          <p:nvPr>
-            <p:ph idx="1"/>
-          </p:nvPr>
-        </p:nvSpPr>
-        <p:spPr/>
-        <p:txBody>
-          <a:bodyPr/>
-          <a:lstStyle/>
-          <a:p>
-            <a:endParaRPr lang="en-US"/>
-          </a:p>
-        </p:txBody>
-      </p:sp>
-      <p:sp>
-        <p:nvSpPr>
-          <p:cNvPr id="4" name="Slide Number Placeholder 3"/>
-          <p:cNvSpPr>
-            <a:spLocks noGrp="1"/>
-          </p:cNvSpPr>
-          <p:nvPr>
-            <p:ph type="sldNum" sz="quarter" idx="12"/>
-          </p:nvPr>
-        </p:nvSpPr>
-        <p:spPr/>
-        <p:txBody>
-          <a:bodyPr/>
-          <a:lstStyle/>
-          <a:p>
-            <a:fld id="{A90099C9-4CB8-9A40-B745-9AB270505907}" type="slidenum">
-              <a:rPr lang="en-US" smtClean="0"/>
-              <a:t>20</a:t>
-            </a:fld>
-            <a:endParaRPr lang="en-US"/>
-          </a:p>
-        </p:txBody>
-      </p:sp>
-    </p:spTree>
-    <p:extLst>
-      <p:ext uri="{BB962C8B-B14F-4D97-AF65-F5344CB8AC3E}">
-        <p14:creationId xmlns:p14="http://schemas.microsoft.com/office/powerpoint/2010/main" val="2003360887"/>
+        <p14:creationId xmlns:p14="http://schemas.microsoft.com/office/powerpoint/2010/main" val="3664262033"/>
       </p:ext>
     </p:extLst>
   </p:cSld>
@@ -8144,7 +6109,7 @@
           <a:p>
             <a:r>
               <a:rPr lang="en-US" dirty="0" smtClean="0"/>
-              <a:t>Building Bayesian models</a:t>
+              <a:t>Exercise</a:t>
             </a:r>
             <a:endParaRPr lang="en-US" dirty="0"/>
           </a:p>
@@ -8160,55 +6125,38 @@
             <p:ph idx="1"/>
           </p:nvPr>
         </p:nvSpPr>
-        <p:spPr>
-          <a:xfrm>
-            <a:off x="457200" y="1043610"/>
-            <a:ext cx="8229600" cy="5087316"/>
-          </a:xfrm>
-        </p:spPr>
+        <p:spPr/>
         <p:txBody>
           <a:bodyPr/>
           <a:lstStyle/>
           <a:p>
             <a:r>
-              <a:rPr lang="en-US" dirty="0" err="1" smtClean="0"/>
-              <a:t>Gelman</a:t>
-            </a:r>
-            <a:r>
               <a:rPr lang="en-US" dirty="0" smtClean="0"/>
-              <a:t> et al (2014) recommend three basic steps</a:t>
+              <a:t>Fit the 3 versions of the model (use separate .jags files)</a:t>
+            </a:r>
+          </a:p>
+          <a:p>
+            <a:r>
+              <a:rPr lang="en-US" dirty="0" smtClean="0"/>
+              <a:t>Recreate posterior predictive plots for all three</a:t>
+            </a:r>
+          </a:p>
+          <a:p>
+            <a:r>
+              <a:rPr lang="en-US" dirty="0" smtClean="0"/>
+              <a:t>Which model does DIC select?</a:t>
+            </a:r>
+          </a:p>
+          <a:p>
+            <a:r>
+              <a:rPr lang="en-US" dirty="0" smtClean="0"/>
+              <a:t>[What should you use for priors on </a:t>
+            </a:r>
+            <a:r>
+              <a:rPr lang="en-US" dirty="0" smtClean="0"/>
+              <a:t>coefficients?]</a:t>
             </a:r>
             <a:endParaRPr lang="en-US" dirty="0"/>
-          </a:p>
-          <a:p>
-            <a:pPr marL="514350" indent="-514350">
-              <a:buFont typeface="+mj-lt"/>
-              <a:buAutoNum type="arabicPeriod"/>
-            </a:pPr>
-            <a:r>
-              <a:rPr lang="en-US" dirty="0" smtClean="0"/>
-              <a:t>Set up a joint probability distribution for all observable and unobservable quantities, consistent with underlying expertise</a:t>
-            </a:r>
-          </a:p>
-          <a:p>
-            <a:pPr marL="514350" indent="-514350">
-              <a:buFont typeface="+mj-lt"/>
-              <a:buAutoNum type="arabicPeriod"/>
-            </a:pPr>
-            <a:r>
-              <a:rPr lang="en-US" dirty="0" smtClean="0"/>
-              <a:t>Condition on the observed data and fit the model to get a posterior distribution</a:t>
-            </a:r>
-          </a:p>
-          <a:p>
-            <a:pPr marL="514350" indent="-514350">
-              <a:buFont typeface="+mj-lt"/>
-              <a:buAutoNum type="arabicPeriod"/>
-            </a:pPr>
-            <a:r>
-              <a:rPr lang="en-US" dirty="0" smtClean="0"/>
-              <a:t>Evaluate the fit of the model. Are conclusions reasonable, sensitive to assumptions?</a:t>
-            </a:r>
           </a:p>
         </p:txBody>
       </p:sp>
@@ -8238,7 +6186,7 @@
     </p:spTree>
     <p:extLst>
       <p:ext uri="{BB962C8B-B14F-4D97-AF65-F5344CB8AC3E}">
-        <p14:creationId xmlns:p14="http://schemas.microsoft.com/office/powerpoint/2010/main" val="1232356034"/>
+        <p14:creationId xmlns:p14="http://schemas.microsoft.com/office/powerpoint/2010/main" val="3470775957"/>
       </p:ext>
     </p:extLst>
   </p:cSld>
@@ -8280,81 +6228,117 @@
           <a:bodyPr/>
           <a:lstStyle/>
           <a:p>
+            <a:endParaRPr lang="en-US"/>
+          </a:p>
+        </p:txBody>
+      </p:sp>
+      <p:sp>
+        <p:nvSpPr>
+          <p:cNvPr id="3" name="Content Placeholder 2"/>
+          <p:cNvSpPr>
+            <a:spLocks noGrp="1"/>
+          </p:cNvSpPr>
+          <p:nvPr>
+            <p:ph idx="1"/>
+          </p:nvPr>
+        </p:nvSpPr>
+        <p:spPr/>
+        <p:txBody>
+          <a:bodyPr/>
+          <a:lstStyle/>
+          <a:p>
             <a:r>
               <a:rPr lang="en-US" dirty="0" smtClean="0"/>
-              <a:t>Setting up the model: data generation</a:t>
+              <a:t>We will try 3 versions of our binomial survival model (GLM)</a:t>
+            </a:r>
+          </a:p>
+          <a:p>
+            <a:r>
+              <a:rPr lang="en-US" dirty="0" smtClean="0"/>
+              <a:t>Fit3=from lecture</a:t>
+            </a:r>
+          </a:p>
+          <a:p>
+            <a:r>
+              <a:rPr lang="en-US" dirty="0" smtClean="0"/>
+              <a:t>Fit4=with covariate x1</a:t>
+            </a:r>
+          </a:p>
+          <a:p>
+            <a:r>
+              <a:rPr lang="en-US" dirty="0" smtClean="0"/>
+              <a:t>Fit5=with covariate x1 and x2</a:t>
+            </a:r>
+          </a:p>
+          <a:p>
+            <a:pPr marL="0" indent="0">
+              <a:buNone/>
+            </a:pPr>
+            <a:r>
+              <a:rPr lang="en-US" sz="1400" dirty="0">
+                <a:latin typeface="Courier New" panose="02070309020205020404" pitchFamily="49" charset="0"/>
+                <a:cs typeface="Courier New" panose="02070309020205020404" pitchFamily="49" charset="0"/>
+              </a:rPr>
+              <a:t>x1 &lt;- c(9.450, 8.079, 7.686, 8.003, 2.882, 11.095, 10.696, 8.263, 12.043,</a:t>
+            </a:r>
+          </a:p>
+          <a:p>
+            <a:pPr marL="0" indent="0">
+              <a:buNone/>
+            </a:pPr>
+            <a:r>
+              <a:rPr lang="en-US" sz="1400" dirty="0">
+                <a:latin typeface="Courier New" panose="02070309020205020404" pitchFamily="49" charset="0"/>
+                <a:cs typeface="Courier New" panose="02070309020205020404" pitchFamily="49" charset="0"/>
+              </a:rPr>
+              <a:t>        9.238)</a:t>
+            </a:r>
+          </a:p>
+          <a:p>
+            <a:pPr marL="0" indent="0">
+              <a:buNone/>
+            </a:pPr>
+            <a:r>
+              <a:rPr lang="en-US" sz="1400" dirty="0">
+                <a:latin typeface="Courier New" panose="02070309020205020404" pitchFamily="49" charset="0"/>
+                <a:cs typeface="Courier New" panose="02070309020205020404" pitchFamily="49" charset="0"/>
+              </a:rPr>
+              <a:t>x2 &lt;- c(0.08, 0.252, 0.158, 0.25, 0.081, 0.037, 0.002, 0.042, 0.053,</a:t>
+            </a:r>
+          </a:p>
+          <a:p>
+            <a:pPr marL="0" indent="0">
+              <a:buNone/>
+            </a:pPr>
+            <a:r>
+              <a:rPr lang="en-US" sz="1400" dirty="0">
+                <a:latin typeface="Courier New" panose="02070309020205020404" pitchFamily="49" charset="0"/>
+                <a:cs typeface="Courier New" panose="02070309020205020404" pitchFamily="49" charset="0"/>
+              </a:rPr>
+              <a:t>        -0.02, 0.141, -0.001, -0.078, 0.103, -0.076, 0.037, 0.071, 0.113,</a:t>
+            </a:r>
+          </a:p>
+          <a:p>
+            <a:pPr marL="0" indent="0">
+              <a:buNone/>
+            </a:pPr>
+            <a:r>
+              <a:rPr lang="en-US" sz="1400" dirty="0">
+                <a:latin typeface="Courier New" panose="02070309020205020404" pitchFamily="49" charset="0"/>
+                <a:cs typeface="Courier New" panose="02070309020205020404" pitchFamily="49" charset="0"/>
+              </a:rPr>
+              <a:t>        0.23, 0.246)</a:t>
+            </a:r>
+          </a:p>
+          <a:p>
+            <a:pPr marL="0" indent="0">
+              <a:buNone/>
+            </a:pPr>
+            <a:r>
+              <a:rPr lang="en-US" dirty="0" smtClean="0"/>
+              <a:t>Assume these covariates affect theta</a:t>
             </a:r>
             <a:endParaRPr lang="en-US" dirty="0"/>
-          </a:p>
-        </p:txBody>
-      </p:sp>
-      <p:sp>
-        <p:nvSpPr>
-          <p:cNvPr id="3" name="Content Placeholder 2"/>
-          <p:cNvSpPr>
-            <a:spLocks noGrp="1"/>
-          </p:cNvSpPr>
-          <p:nvPr>
-            <p:ph idx="1"/>
-          </p:nvPr>
-        </p:nvSpPr>
-        <p:spPr>
-          <a:xfrm>
-            <a:off x="457200" y="1182757"/>
-            <a:ext cx="8229600" cy="4530725"/>
-          </a:xfrm>
-        </p:spPr>
-        <p:txBody>
-          <a:bodyPr/>
-          <a:lstStyle/>
-          <a:p>
-            <a:r>
-              <a:rPr lang="en-US" dirty="0" smtClean="0"/>
-              <a:t>Specify the data-generating process</a:t>
-            </a:r>
-          </a:p>
-          <a:p>
-            <a:pPr lvl="1"/>
-            <a:r>
-              <a:rPr lang="en-US" dirty="0" smtClean="0"/>
-              <a:t>What is the structure of the model?</a:t>
-            </a:r>
-          </a:p>
-          <a:p>
-            <a:pPr lvl="1"/>
-            <a:r>
-              <a:rPr lang="en-US" dirty="0" smtClean="0"/>
-              <a:t>What kind of data can arise from it?</a:t>
-            </a:r>
-          </a:p>
-          <a:p>
-            <a:pPr lvl="1"/>
-            <a:r>
-              <a:rPr lang="en-US" dirty="0" smtClean="0"/>
-              <a:t>These determine the likelihood</a:t>
-            </a:r>
-          </a:p>
-          <a:p>
-            <a:r>
-              <a:rPr lang="en-US" dirty="0" smtClean="0"/>
-              <a:t>E.g., somatic growth always increases and  can never be negative</a:t>
-            </a:r>
-          </a:p>
-          <a:p>
-            <a:r>
-              <a:rPr lang="en-US" dirty="0"/>
-              <a:t>I</a:t>
-            </a:r>
-            <a:r>
-              <a:rPr lang="en-US" dirty="0" smtClean="0"/>
-              <a:t>mperfect measurements can be lower than truth but never negative  </a:t>
-            </a:r>
-          </a:p>
-          <a:p>
-            <a:r>
-              <a:rPr lang="en-US" dirty="0" smtClean="0"/>
-              <a:t>So we chose a VB growth curve with log-normal error</a:t>
-            </a:r>
           </a:p>
         </p:txBody>
       </p:sp>
@@ -8384,7 +6368,7 @@
     </p:spTree>
     <p:extLst>
       <p:ext uri="{BB962C8B-B14F-4D97-AF65-F5344CB8AC3E}">
-        <p14:creationId xmlns:p14="http://schemas.microsoft.com/office/powerpoint/2010/main" val="237376877"/>
+        <p14:creationId xmlns:p14="http://schemas.microsoft.com/office/powerpoint/2010/main" val="2003360887"/>
       </p:ext>
     </p:extLst>
   </p:cSld>
@@ -8426,11 +6410,7 @@
           <a:bodyPr/>
           <a:lstStyle/>
           <a:p>
-            <a:r>
-              <a:rPr lang="en-US" dirty="0" smtClean="0"/>
-              <a:t>Setting up the model: the prior</a:t>
-            </a:r>
-            <a:endParaRPr lang="en-US" dirty="0"/>
+            <a:endParaRPr lang="en-US"/>
           </a:p>
         </p:txBody>
       </p:sp>
@@ -8444,44 +6424,12 @@
             <p:ph idx="1"/>
           </p:nvPr>
         </p:nvSpPr>
-        <p:spPr>
-          <a:xfrm>
-            <a:off x="457200" y="1182757"/>
-            <a:ext cx="8229600" cy="4530725"/>
-          </a:xfrm>
-        </p:spPr>
+        <p:spPr/>
         <p:txBody>
           <a:bodyPr/>
           <a:lstStyle/>
           <a:p>
-            <a:r>
-              <a:rPr lang="en-US" dirty="0" smtClean="0"/>
-              <a:t>Identify the unknown parameters of this process and specify priors</a:t>
-            </a:r>
-          </a:p>
-          <a:p>
-            <a:r>
-              <a:rPr lang="en-US" dirty="0" smtClean="0"/>
-              <a:t>This is the controversial “subjective” step</a:t>
-            </a:r>
-          </a:p>
-          <a:p>
-            <a:r>
-              <a:rPr lang="en-US" dirty="0" smtClean="0"/>
-              <a:t>Sometimes we have information from previous studies, while sometimes explicit expert opinion.</a:t>
-            </a:r>
-          </a:p>
-          <a:p>
-            <a:r>
-              <a:rPr lang="en-US" dirty="0" smtClean="0"/>
-              <a:t>Other times it is not as clear what to use.</a:t>
-            </a:r>
-          </a:p>
-          <a:p>
-            <a:r>
-              <a:rPr lang="en-US" dirty="0" smtClean="0"/>
-              <a:t>What do we “know” about a system **before** we have data?</a:t>
-            </a:r>
+            <a:endParaRPr lang="en-US"/>
           </a:p>
         </p:txBody>
       </p:sp>
@@ -8511,7 +6459,7 @@
     </p:spTree>
     <p:extLst>
       <p:ext uri="{BB962C8B-B14F-4D97-AF65-F5344CB8AC3E}">
-        <p14:creationId xmlns:p14="http://schemas.microsoft.com/office/powerpoint/2010/main" val="642077871"/>
+        <p14:creationId xmlns:p14="http://schemas.microsoft.com/office/powerpoint/2010/main" val="573071360"/>
       </p:ext>
     </p:extLst>
   </p:cSld>
@@ -8553,11 +6501,7 @@
           <a:bodyPr/>
           <a:lstStyle/>
           <a:p>
-            <a:r>
-              <a:rPr lang="en-US" dirty="0" smtClean="0"/>
-              <a:t>Advice for setting priors</a:t>
-            </a:r>
-            <a:endParaRPr lang="en-US" dirty="0"/>
+            <a:endParaRPr lang="en-US"/>
           </a:p>
         </p:txBody>
       </p:sp>
@@ -8571,77 +6515,12 @@
             <p:ph idx="1"/>
           </p:nvPr>
         </p:nvSpPr>
-        <p:spPr>
-          <a:xfrm>
-            <a:off x="457200" y="1162878"/>
-            <a:ext cx="8229600" cy="4968047"/>
-          </a:xfrm>
-        </p:spPr>
+        <p:spPr/>
         <p:txBody>
           <a:bodyPr/>
           <a:lstStyle/>
           <a:p>
-            <a:r>
-              <a:rPr lang="en-US" dirty="0" smtClean="0"/>
-              <a:t>Terms “vague”, “weakly informative” etc. are not defined</a:t>
-            </a:r>
-          </a:p>
-          <a:p>
-            <a:r>
-              <a:rPr lang="en-US" dirty="0" smtClean="0"/>
-              <a:t>It is often best when parameters are roughly on unit scale</a:t>
-            </a:r>
-          </a:p>
-          <a:p>
-            <a:pPr lvl="1"/>
-            <a:r>
-              <a:rPr lang="en-US" dirty="0" smtClean="0"/>
-              <a:t>E.g., standardize predictors, divide by scale</a:t>
-            </a:r>
-          </a:p>
-          <a:p>
-            <a:pPr lvl="1"/>
-            <a:r>
-              <a:rPr lang="en-US" dirty="0" smtClean="0"/>
-              <a:t>If true priors are easier to interpret</a:t>
-            </a:r>
-          </a:p>
-          <a:p>
-            <a:r>
-              <a:rPr lang="en-US" dirty="0" smtClean="0"/>
-              <a:t>Avoid hard constraints unless there’s a physical reason, e.g., </a:t>
-            </a:r>
-            <a:r>
-              <a:rPr lang="el-GR" dirty="0" smtClean="0"/>
-              <a:t>θ</a:t>
-            </a:r>
-            <a:r>
-              <a:rPr lang="en-US" dirty="0" smtClean="0"/>
-              <a:t>&gt;0 or 0&lt;p&lt;1.</a:t>
-            </a:r>
-          </a:p>
-          <a:p>
-            <a:r>
-              <a:rPr lang="en-US" dirty="0" smtClean="0"/>
-              <a:t>E.g., if you think </a:t>
-            </a:r>
-            <a:r>
-              <a:rPr lang="en-US" dirty="0"/>
-              <a:t>0</a:t>
-            </a:r>
-            <a:r>
-              <a:rPr lang="en-US" dirty="0" smtClean="0"/>
-              <a:t>&lt;</a:t>
-            </a:r>
-            <a:r>
-              <a:rPr lang="el-GR" dirty="0"/>
-              <a:t> θ </a:t>
-            </a:r>
-            <a:r>
-              <a:rPr lang="en-US" dirty="0" smtClean="0"/>
-              <a:t>&lt;1, use N(.5,.5) instead of U(0,1)</a:t>
-            </a:r>
-            <a:endParaRPr lang="en-US" dirty="0"/>
+            <a:endParaRPr lang="en-US"/>
           </a:p>
         </p:txBody>
       </p:sp>
@@ -8668,39 +6547,10 @@
           </a:p>
         </p:txBody>
       </p:sp>
-      <p:sp>
-        <p:nvSpPr>
-          <p:cNvPr id="5" name="TextBox 4"/>
-          <p:cNvSpPr txBox="1"/>
-          <p:nvPr/>
-        </p:nvSpPr>
-        <p:spPr>
-          <a:xfrm>
-            <a:off x="695739" y="6430617"/>
-            <a:ext cx="7250703" cy="369332"/>
-          </a:xfrm>
-          <a:prstGeom prst="rect">
-            <a:avLst/>
-          </a:prstGeom>
-          <a:noFill/>
-        </p:spPr>
-        <p:txBody>
-          <a:bodyPr wrap="none" rtlCol="0">
-            <a:spAutoFit/>
-          </a:bodyPr>
-          <a:lstStyle/>
-          <a:p>
-            <a:r>
-              <a:rPr lang="en-US" dirty="0"/>
-              <a:t>https://github.com/stan-dev/stan/wiki/Prior-Choice-Recommendations</a:t>
-            </a:r>
-          </a:p>
-        </p:txBody>
-      </p:sp>
     </p:spTree>
     <p:extLst>
       <p:ext uri="{BB962C8B-B14F-4D97-AF65-F5344CB8AC3E}">
-        <p14:creationId xmlns:p14="http://schemas.microsoft.com/office/powerpoint/2010/main" val="3356287829"/>
+        <p14:creationId xmlns:p14="http://schemas.microsoft.com/office/powerpoint/2010/main" val="2356479383"/>
       </p:ext>
     </p:extLst>
   </p:cSld>
@@ -8744,7 +6594,7 @@
           <a:p>
             <a:r>
               <a:rPr lang="en-US" dirty="0" smtClean="0"/>
-              <a:t>Setting up the model: the prior</a:t>
+              <a:t>Homework</a:t>
             </a:r>
             <a:endParaRPr lang="en-US" dirty="0"/>
           </a:p>
@@ -8760,32 +6610,34 @@
             <p:ph idx="1"/>
           </p:nvPr>
         </p:nvSpPr>
-        <p:spPr>
-          <a:xfrm>
-            <a:off x="457200" y="1182757"/>
-            <a:ext cx="8229600" cy="4530725"/>
-          </a:xfrm>
-        </p:spPr>
+        <p:spPr/>
         <p:txBody>
           <a:bodyPr/>
           <a:lstStyle/>
           <a:p>
             <a:r>
               <a:rPr lang="en-US" dirty="0" smtClean="0"/>
-              <a:t>It is also recommended to plot the prior vs the marginal posterior after the fact.</a:t>
+              <a:t>Use the results to select which model you think is most appropriate.</a:t>
             </a:r>
           </a:p>
           <a:p>
             <a:r>
               <a:rPr lang="en-US" dirty="0" smtClean="0"/>
-              <a:t>Exploring different priors like this can help gauge the sensitivity </a:t>
-            </a:r>
-          </a:p>
-          <a:p>
-            <a:endParaRPr lang="en-US" dirty="0" smtClean="0"/>
-          </a:p>
-          <a:p>
-            <a:endParaRPr lang="en-US" dirty="0" smtClean="0"/>
+              <a:t>Write down the model, likelihood and priors.</a:t>
+            </a:r>
+          </a:p>
+          <a:p>
+            <a:r>
+              <a:rPr lang="en-US" dirty="0" smtClean="0"/>
+              <a:t>Calculate the probability of survival greater than 0.8. P(p&gt;0.8) from this model</a:t>
+            </a:r>
+          </a:p>
+          <a:p>
+            <a:r>
+              <a:rPr lang="en-US" dirty="0" smtClean="0"/>
+              <a:t>Read the paper</a:t>
+            </a:r>
+            <a:endParaRPr lang="en-US" dirty="0"/>
           </a:p>
         </p:txBody>
       </p:sp>
@@ -8815,619 +6667,7 @@
     </p:spTree>
     <p:extLst>
       <p:ext uri="{BB962C8B-B14F-4D97-AF65-F5344CB8AC3E}">
-        <p14:creationId xmlns:p14="http://schemas.microsoft.com/office/powerpoint/2010/main" val="1560878415"/>
-      </p:ext>
-    </p:extLst>
-  </p:cSld>
-  <p:clrMapOvr>
-    <a:masterClrMapping/>
-  </p:clrMapOvr>
-</p:sld>
-</file>
-
-<file path=ppt/slides/slide8.xml><?xml version="1.0" encoding="utf-8"?>
-<p:sld xmlns:a="http://schemas.openxmlformats.org/drawingml/2006/main" xmlns:r="http://schemas.openxmlformats.org/officeDocument/2006/relationships" xmlns:p="http://schemas.openxmlformats.org/presentationml/2006/main">
-  <p:cSld>
-    <p:spTree>
-      <p:nvGrpSpPr>
-        <p:cNvPr id="1" name=""/>
-        <p:cNvGrpSpPr/>
-        <p:nvPr/>
-      </p:nvGrpSpPr>
-      <p:grpSpPr>
-        <a:xfrm>
-          <a:off x="0" y="0"/>
-          <a:ext cx="0" cy="0"/>
-          <a:chOff x="0" y="0"/>
-          <a:chExt cx="0" cy="0"/>
-        </a:xfrm>
-      </p:grpSpPr>
-      <p:sp>
-        <p:nvSpPr>
-          <p:cNvPr id="2" name="Title 1"/>
-          <p:cNvSpPr>
-            <a:spLocks noGrp="1"/>
-          </p:cNvSpPr>
-          <p:nvPr>
-            <p:ph type="title"/>
-          </p:nvPr>
-        </p:nvSpPr>
-        <p:spPr/>
-        <p:txBody>
-          <a:bodyPr/>
-          <a:lstStyle/>
-          <a:p>
-            <a:r>
-              <a:rPr lang="en-US" dirty="0" smtClean="0"/>
-              <a:t>The prior predictive distribution</a:t>
-            </a:r>
-            <a:endParaRPr lang="en-US" dirty="0"/>
-          </a:p>
-        </p:txBody>
-      </p:sp>
-      <p:sp>
-        <p:nvSpPr>
-          <p:cNvPr id="3" name="Content Placeholder 2"/>
-          <p:cNvSpPr>
-            <a:spLocks noGrp="1"/>
-          </p:cNvSpPr>
-          <p:nvPr>
-            <p:ph idx="1"/>
-          </p:nvPr>
-        </p:nvSpPr>
-        <p:spPr>
-          <a:xfrm>
-            <a:off x="457200" y="1182757"/>
-            <a:ext cx="8229600" cy="4530725"/>
-          </a:xfrm>
-        </p:spPr>
-        <p:txBody>
-          <a:bodyPr/>
-          <a:lstStyle/>
-          <a:p>
-            <a:r>
-              <a:rPr lang="en-US" dirty="0" smtClean="0"/>
-              <a:t>Almost always we know something. E.g.</a:t>
-            </a:r>
-            <a:r>
-              <a:rPr lang="en-US" dirty="0"/>
-              <a:t/>
-            </a:r>
-            <a:br>
-              <a:rPr lang="en-US" dirty="0"/>
-            </a:br>
-            <a:r>
-              <a:rPr lang="en-US" dirty="0"/>
-              <a:t>“we can be fairly sure that we won’t observe any particularly healthy </a:t>
-            </a:r>
-            <a:r>
-              <a:rPr lang="en-US" dirty="0" smtClean="0"/>
-              <a:t>[birds] cruising </a:t>
-            </a:r>
-            <a:r>
-              <a:rPr lang="en-US" dirty="0"/>
-              <a:t>near the speed of </a:t>
-            </a:r>
-            <a:r>
-              <a:rPr lang="en-US" dirty="0" smtClean="0"/>
-              <a:t>light”</a:t>
-            </a:r>
-            <a:r>
-              <a:rPr lang="en-US" baseline="30000" dirty="0" smtClean="0"/>
-              <a:t>1</a:t>
-            </a:r>
-          </a:p>
-          <a:p>
-            <a:r>
-              <a:rPr lang="en-US" dirty="0" smtClean="0"/>
-              <a:t>We identify a meaningful statistic (e.g., speed) and ensure that:</a:t>
-            </a:r>
-          </a:p>
-          <a:p>
-            <a:pPr lvl="1"/>
-            <a:r>
-              <a:rPr lang="en-US" dirty="0" smtClean="0"/>
-              <a:t>Few values are beyond the threshold (extreme is unreasonable but not impossible)  </a:t>
-            </a:r>
-          </a:p>
-          <a:p>
-            <a:pPr lvl="1"/>
-            <a:r>
-              <a:rPr lang="en-US" dirty="0" smtClean="0"/>
-              <a:t>But not excessive values beyond them</a:t>
-            </a:r>
-          </a:p>
-          <a:p>
-            <a:pPr lvl="1"/>
-            <a:r>
-              <a:rPr lang="en-US" dirty="0" smtClean="0"/>
-              <a:t>This is *before* the data is added</a:t>
-            </a:r>
-          </a:p>
-        </p:txBody>
-      </p:sp>
-      <p:sp>
-        <p:nvSpPr>
-          <p:cNvPr id="4" name="Slide Number Placeholder 3"/>
-          <p:cNvSpPr>
-            <a:spLocks noGrp="1"/>
-          </p:cNvSpPr>
-          <p:nvPr>
-            <p:ph type="sldNum" sz="quarter" idx="12"/>
-          </p:nvPr>
-        </p:nvSpPr>
-        <p:spPr/>
-        <p:txBody>
-          <a:bodyPr/>
-          <a:lstStyle/>
-          <a:p>
-            <a:fld id="{A90099C9-4CB8-9A40-B745-9AB270505907}" type="slidenum">
-              <a:rPr lang="en-US" smtClean="0"/>
-              <a:t>8</a:t>
-            </a:fld>
-            <a:endParaRPr lang="en-US"/>
-          </a:p>
-        </p:txBody>
-      </p:sp>
-      <p:sp>
-        <p:nvSpPr>
-          <p:cNvPr id="5" name="TextBox 4"/>
-          <p:cNvSpPr txBox="1"/>
-          <p:nvPr/>
-        </p:nvSpPr>
-        <p:spPr>
-          <a:xfrm>
-            <a:off x="198783" y="6449149"/>
-            <a:ext cx="8746434" cy="338554"/>
-          </a:xfrm>
-          <a:prstGeom prst="rect">
-            <a:avLst/>
-          </a:prstGeom>
-          <a:noFill/>
-        </p:spPr>
-        <p:txBody>
-          <a:bodyPr wrap="square" rtlCol="0">
-            <a:spAutoFit/>
-          </a:bodyPr>
-          <a:lstStyle/>
-          <a:p>
-            <a:r>
-              <a:rPr lang="en-US" sz="1600" baseline="30000" dirty="0" smtClean="0"/>
-              <a:t>1</a:t>
-            </a:r>
-            <a:r>
-              <a:rPr lang="en-US" sz="1600" dirty="0" smtClean="0"/>
-              <a:t> </a:t>
-            </a:r>
-            <a:r>
-              <a:rPr lang="en-US" sz="1600" dirty="0"/>
-              <a:t>https://betanalpha.github.io/assets/case_studies/principled_bayesian_workflow.html</a:t>
-            </a:r>
-          </a:p>
-        </p:txBody>
-      </p:sp>
-    </p:spTree>
-    <p:extLst>
-      <p:ext uri="{BB962C8B-B14F-4D97-AF65-F5344CB8AC3E}">
-        <p14:creationId xmlns:p14="http://schemas.microsoft.com/office/powerpoint/2010/main" val="1836854798"/>
-      </p:ext>
-    </p:extLst>
-  </p:cSld>
-  <p:clrMapOvr>
-    <a:masterClrMapping/>
-  </p:clrMapOvr>
-</p:sld>
-</file>
-
-<file path=ppt/slides/slide9.xml><?xml version="1.0" encoding="utf-8"?>
-<p:sld xmlns:a="http://schemas.openxmlformats.org/drawingml/2006/main" xmlns:r="http://schemas.openxmlformats.org/officeDocument/2006/relationships" xmlns:p="http://schemas.openxmlformats.org/presentationml/2006/main">
-  <p:cSld>
-    <p:spTree>
-      <p:nvGrpSpPr>
-        <p:cNvPr id="1" name=""/>
-        <p:cNvGrpSpPr/>
-        <p:nvPr/>
-      </p:nvGrpSpPr>
-      <p:grpSpPr>
-        <a:xfrm>
-          <a:off x="0" y="0"/>
-          <a:ext cx="0" cy="0"/>
-          <a:chOff x="0" y="0"/>
-          <a:chExt cx="0" cy="0"/>
-        </a:xfrm>
-      </p:grpSpPr>
-      <p:sp>
-        <p:nvSpPr>
-          <p:cNvPr id="2" name="Title 1"/>
-          <p:cNvSpPr>
-            <a:spLocks noGrp="1"/>
-          </p:cNvSpPr>
-          <p:nvPr>
-            <p:ph type="title"/>
-          </p:nvPr>
-        </p:nvSpPr>
-        <p:spPr/>
-        <p:txBody>
-          <a:bodyPr/>
-          <a:lstStyle/>
-          <a:p>
-            <a:r>
-              <a:rPr lang="en-US" dirty="0" smtClean="0"/>
-              <a:t>The prior predictive distribution</a:t>
-            </a:r>
-            <a:endParaRPr lang="en-US" dirty="0"/>
-          </a:p>
-        </p:txBody>
-      </p:sp>
-      <p:sp>
-        <p:nvSpPr>
-          <p:cNvPr id="3" name="Content Placeholder 2"/>
-          <p:cNvSpPr>
-            <a:spLocks noGrp="1"/>
-          </p:cNvSpPr>
-          <p:nvPr>
-            <p:ph idx="1"/>
-          </p:nvPr>
-        </p:nvSpPr>
-        <p:spPr>
-          <a:xfrm>
-            <a:off x="457200" y="1600200"/>
-            <a:ext cx="4552122" cy="4530725"/>
-          </a:xfrm>
-        </p:spPr>
-        <p:txBody>
-          <a:bodyPr/>
-          <a:lstStyle/>
-          <a:p>
-            <a:r>
-              <a:rPr lang="en-US" dirty="0" smtClean="0"/>
-              <a:t>Run model with priors and model structure</a:t>
-            </a:r>
-          </a:p>
-          <a:p>
-            <a:r>
-              <a:rPr lang="en-US" dirty="0" smtClean="0"/>
-              <a:t>But *no data*</a:t>
-            </a:r>
-          </a:p>
-          <a:p>
-            <a:r>
-              <a:rPr lang="en-US" dirty="0" smtClean="0"/>
-              <a:t>Plot histogram of meaningful statistic</a:t>
-            </a:r>
-          </a:p>
-          <a:p>
-            <a:r>
-              <a:rPr lang="en-US" dirty="0" smtClean="0"/>
-              <a:t>Is it realistic? </a:t>
-            </a:r>
-          </a:p>
-          <a:p>
-            <a:r>
-              <a:rPr lang="en-US" dirty="0" smtClean="0"/>
-              <a:t>If not, priors do not reflect your expertise</a:t>
-            </a:r>
-            <a:endParaRPr lang="en-US" dirty="0"/>
-          </a:p>
-        </p:txBody>
-      </p:sp>
-      <p:sp>
-        <p:nvSpPr>
-          <p:cNvPr id="4" name="Slide Number Placeholder 3"/>
-          <p:cNvSpPr>
-            <a:spLocks noGrp="1"/>
-          </p:cNvSpPr>
-          <p:nvPr>
-            <p:ph type="sldNum" sz="quarter" idx="12"/>
-          </p:nvPr>
-        </p:nvSpPr>
-        <p:spPr/>
-        <p:txBody>
-          <a:bodyPr/>
-          <a:lstStyle/>
-          <a:p>
-            <a:fld id="{A90099C9-4CB8-9A40-B745-9AB270505907}" type="slidenum">
-              <a:rPr lang="en-US" smtClean="0"/>
-              <a:t>9</a:t>
-            </a:fld>
-            <a:endParaRPr lang="en-US"/>
-          </a:p>
-        </p:txBody>
-      </p:sp>
-      <p:pic>
-        <p:nvPicPr>
-          <p:cNvPr id="5" name="Picture 4"/>
-          <p:cNvPicPr>
-            <a:picLocks noChangeAspect="1"/>
-          </p:cNvPicPr>
-          <p:nvPr/>
-        </p:nvPicPr>
-        <p:blipFill rotWithShape="1">
-          <a:blip r:embed="rId2"/>
-          <a:srcRect l="17275" b="11768"/>
-          <a:stretch/>
-        </p:blipFill>
-        <p:spPr>
-          <a:xfrm>
-            <a:off x="5193403" y="2150411"/>
-            <a:ext cx="3950597" cy="2202927"/>
-          </a:xfrm>
-          <a:prstGeom prst="rect">
-            <a:avLst/>
-          </a:prstGeom>
-        </p:spPr>
-      </p:pic>
-      <p:sp>
-        <p:nvSpPr>
-          <p:cNvPr id="6" name="TextBox 5"/>
-          <p:cNvSpPr txBox="1"/>
-          <p:nvPr/>
-        </p:nvSpPr>
-        <p:spPr>
-          <a:xfrm>
-            <a:off x="6566919" y="4310521"/>
-            <a:ext cx="1739348" cy="369332"/>
-          </a:xfrm>
-          <a:prstGeom prst="rect">
-            <a:avLst/>
-          </a:prstGeom>
-          <a:noFill/>
-        </p:spPr>
-        <p:txBody>
-          <a:bodyPr wrap="square" rtlCol="0">
-            <a:spAutoFit/>
-          </a:bodyPr>
-          <a:lstStyle/>
-          <a:p>
-            <a:r>
-              <a:rPr lang="en-US" dirty="0" err="1" smtClean="0"/>
-              <a:t>Statisic</a:t>
-            </a:r>
-            <a:endParaRPr lang="en-US" dirty="0"/>
-          </a:p>
-        </p:txBody>
-      </p:sp>
-      <p:sp>
-        <p:nvSpPr>
-          <p:cNvPr id="7" name="TextBox 6"/>
-          <p:cNvSpPr txBox="1"/>
-          <p:nvPr/>
-        </p:nvSpPr>
-        <p:spPr>
-          <a:xfrm>
-            <a:off x="6299027" y="1699591"/>
-            <a:ext cx="1373982" cy="369332"/>
-          </a:xfrm>
-          <a:prstGeom prst="rect">
-            <a:avLst/>
-          </a:prstGeom>
-          <a:noFill/>
-        </p:spPr>
-        <p:txBody>
-          <a:bodyPr wrap="square" rtlCol="0">
-            <a:spAutoFit/>
-          </a:bodyPr>
-          <a:lstStyle/>
-          <a:p>
-            <a:r>
-              <a:rPr lang="en-US" dirty="0" smtClean="0"/>
-              <a:t>Thresholds</a:t>
-            </a:r>
-            <a:endParaRPr lang="en-US" dirty="0"/>
-          </a:p>
-        </p:txBody>
-      </p:sp>
-      <p:cxnSp>
-        <p:nvCxnSpPr>
-          <p:cNvPr id="9" name="Straight Arrow Connector 8"/>
-          <p:cNvCxnSpPr>
-            <a:stCxn id="7" idx="1"/>
-          </p:cNvCxnSpPr>
-          <p:nvPr/>
-        </p:nvCxnSpPr>
-        <p:spPr>
-          <a:xfrm flipH="1">
-            <a:off x="6013175" y="1884257"/>
-            <a:ext cx="285852" cy="491195"/>
-          </a:xfrm>
-          <a:prstGeom prst="straightConnector1">
-            <a:avLst/>
-          </a:prstGeom>
-          <a:ln>
-            <a:tailEnd type="triangle"/>
-          </a:ln>
-        </p:spPr>
-        <p:style>
-          <a:lnRef idx="2">
-            <a:schemeClr val="dk1"/>
-          </a:lnRef>
-          <a:fillRef idx="0">
-            <a:schemeClr val="dk1"/>
-          </a:fillRef>
-          <a:effectRef idx="1">
-            <a:schemeClr val="dk1"/>
-          </a:effectRef>
-          <a:fontRef idx="minor">
-            <a:schemeClr val="tx1"/>
-          </a:fontRef>
-        </p:style>
-      </p:cxnSp>
-      <p:cxnSp>
-        <p:nvCxnSpPr>
-          <p:cNvPr id="10" name="Straight Arrow Connector 9"/>
-          <p:cNvCxnSpPr>
-            <a:stCxn id="7" idx="3"/>
-          </p:cNvCxnSpPr>
-          <p:nvPr/>
-        </p:nvCxnSpPr>
-        <p:spPr>
-          <a:xfrm>
-            <a:off x="7673009" y="1884257"/>
-            <a:ext cx="222440" cy="454997"/>
-          </a:xfrm>
-          <a:prstGeom prst="straightConnector1">
-            <a:avLst/>
-          </a:prstGeom>
-          <a:ln>
-            <a:tailEnd type="triangle"/>
-          </a:ln>
-        </p:spPr>
-        <p:style>
-          <a:lnRef idx="2">
-            <a:schemeClr val="dk1"/>
-          </a:lnRef>
-          <a:fillRef idx="0">
-            <a:schemeClr val="dk1"/>
-          </a:fillRef>
-          <a:effectRef idx="1">
-            <a:schemeClr val="dk1"/>
-          </a:effectRef>
-          <a:fontRef idx="minor">
-            <a:schemeClr val="tx1"/>
-          </a:fontRef>
-        </p:style>
-      </p:cxnSp>
-      <p:sp>
-        <p:nvSpPr>
-          <p:cNvPr id="14" name="TextBox 13"/>
-          <p:cNvSpPr txBox="1"/>
-          <p:nvPr/>
-        </p:nvSpPr>
-        <p:spPr>
-          <a:xfrm>
-            <a:off x="6013175" y="5126983"/>
-            <a:ext cx="2090997" cy="646331"/>
-          </a:xfrm>
-          <a:prstGeom prst="rect">
-            <a:avLst/>
-          </a:prstGeom>
-          <a:noFill/>
-        </p:spPr>
-        <p:txBody>
-          <a:bodyPr wrap="square" rtlCol="0">
-            <a:spAutoFit/>
-          </a:bodyPr>
-          <a:lstStyle/>
-          <a:p>
-            <a:r>
-              <a:rPr lang="en-US" dirty="0" smtClean="0"/>
-              <a:t>Extremes unlikely but possible</a:t>
-            </a:r>
-            <a:endParaRPr lang="en-US" dirty="0"/>
-          </a:p>
-        </p:txBody>
-      </p:sp>
-      <p:cxnSp>
-        <p:nvCxnSpPr>
-          <p:cNvPr id="15" name="Straight Arrow Connector 14"/>
-          <p:cNvCxnSpPr>
-            <a:stCxn id="14" idx="1"/>
-          </p:cNvCxnSpPr>
-          <p:nvPr/>
-        </p:nvCxnSpPr>
-        <p:spPr>
-          <a:xfrm flipH="1" flipV="1">
-            <a:off x="5724940" y="4211129"/>
-            <a:ext cx="288235" cy="1239020"/>
-          </a:xfrm>
-          <a:prstGeom prst="straightConnector1">
-            <a:avLst/>
-          </a:prstGeom>
-          <a:ln>
-            <a:tailEnd type="triangle"/>
-          </a:ln>
-        </p:spPr>
-        <p:style>
-          <a:lnRef idx="2">
-            <a:schemeClr val="dk1"/>
-          </a:lnRef>
-          <a:fillRef idx="0">
-            <a:schemeClr val="dk1"/>
-          </a:fillRef>
-          <a:effectRef idx="1">
-            <a:schemeClr val="dk1"/>
-          </a:effectRef>
-          <a:fontRef idx="minor">
-            <a:schemeClr val="tx1"/>
-          </a:fontRef>
-        </p:style>
-      </p:cxnSp>
-      <p:cxnSp>
-        <p:nvCxnSpPr>
-          <p:cNvPr id="16" name="Straight Arrow Connector 15"/>
-          <p:cNvCxnSpPr>
-            <a:stCxn id="14" idx="3"/>
-          </p:cNvCxnSpPr>
-          <p:nvPr/>
-        </p:nvCxnSpPr>
-        <p:spPr>
-          <a:xfrm flipV="1">
-            <a:off x="8104172" y="4310521"/>
-            <a:ext cx="642264" cy="1139628"/>
-          </a:xfrm>
-          <a:prstGeom prst="straightConnector1">
-            <a:avLst/>
-          </a:prstGeom>
-          <a:ln>
-            <a:tailEnd type="triangle"/>
-          </a:ln>
-        </p:spPr>
-        <p:style>
-          <a:lnRef idx="2">
-            <a:schemeClr val="dk1"/>
-          </a:lnRef>
-          <a:fillRef idx="0">
-            <a:schemeClr val="dk1"/>
-          </a:fillRef>
-          <a:effectRef idx="1">
-            <a:schemeClr val="dk1"/>
-          </a:effectRef>
-          <a:fontRef idx="minor">
-            <a:schemeClr val="tx1"/>
-          </a:fontRef>
-        </p:style>
-      </p:cxnSp>
-      <p:sp>
-        <p:nvSpPr>
-          <p:cNvPr id="25" name="TextBox 24"/>
-          <p:cNvSpPr txBox="1"/>
-          <p:nvPr/>
-        </p:nvSpPr>
-        <p:spPr>
-          <a:xfrm>
-            <a:off x="198783" y="6449149"/>
-            <a:ext cx="8746434" cy="338554"/>
-          </a:xfrm>
-          <a:prstGeom prst="rect">
-            <a:avLst/>
-          </a:prstGeom>
-          <a:noFill/>
-        </p:spPr>
-        <p:txBody>
-          <a:bodyPr wrap="square" rtlCol="0">
-            <a:spAutoFit/>
-          </a:bodyPr>
-          <a:lstStyle/>
-          <a:p>
-            <a:r>
-              <a:rPr lang="en-US" sz="1600" baseline="30000" dirty="0" smtClean="0"/>
-              <a:t>1</a:t>
-            </a:r>
-            <a:r>
-              <a:rPr lang="en-US" sz="1600" dirty="0" smtClean="0"/>
-              <a:t> </a:t>
-            </a:r>
-            <a:r>
-              <a:rPr lang="en-US" sz="1600" dirty="0"/>
-              <a:t>https://betanalpha.github.io/assets/case_studies/principled_bayesian_workflow.html</a:t>
-            </a:r>
-          </a:p>
-        </p:txBody>
-      </p:sp>
-    </p:spTree>
-    <p:extLst>
-      <p:ext uri="{BB962C8B-B14F-4D97-AF65-F5344CB8AC3E}">
-        <p14:creationId xmlns:p14="http://schemas.microsoft.com/office/powerpoint/2010/main" val="1223898634"/>
+        <p14:creationId xmlns:p14="http://schemas.microsoft.com/office/powerpoint/2010/main" val="1197929867"/>
       </p:ext>
     </p:extLst>
   </p:cSld>

</xml_diff>

<commit_message>
Finalize day3 and other updates
</commit_message>
<xml_diff>
--- a/dia3/lab3_selection.pptx
+++ b/dia3/lab3_selection.pptx
@@ -10,10 +10,10 @@
   <p:sldIdLst>
     <p:sldId id="323" r:id="rId2"/>
     <p:sldId id="355" r:id="rId3"/>
-    <p:sldId id="356" r:id="rId4"/>
-    <p:sldId id="353" r:id="rId5"/>
-    <p:sldId id="357" r:id="rId6"/>
-    <p:sldId id="358" r:id="rId7"/>
+    <p:sldId id="360" r:id="rId4"/>
+    <p:sldId id="361" r:id="rId5"/>
+    <p:sldId id="353" r:id="rId6"/>
+    <p:sldId id="356" r:id="rId7"/>
     <p:sldId id="359" r:id="rId8"/>
   </p:sldIdLst>
   <p:sldSz cx="9144000" cy="6858000" type="screen4x3"/>
@@ -218,7 +218,7 @@
           <a:p>
             <a:fld id="{9EC8F33C-A7AA-43A7-BCA9-F081EA0B4664}" type="datetimeFigureOut">
               <a:rPr lang="en-US" smtClean="0"/>
-              <a:t>1/11/2019</a:t>
+              <a:t>1/15/2019</a:t>
             </a:fld>
             <a:endParaRPr lang="en-US"/>
           </a:p>
@@ -567,7 +567,7 @@
           </a:ln>
           <a:extLst>
             <a:ext uri="{909E8E84-426E-40dd-AFC4-6F175D3DCCD1}">
-              <a14:hiddenFill xmlns:a14="http://schemas.microsoft.com/office/drawing/2010/main" xmlns="">
+              <a14:hiddenFill xmlns="" xmlns:a14="http://schemas.microsoft.com/office/drawing/2010/main">
                 <a:solidFill>
                   <a:srgbClr val="FFFFFF"/>
                 </a:solidFill>
@@ -610,7 +610,7 @@
           </a:ln>
           <a:extLst>
             <a:ext uri="{909E8E84-426E-40dd-AFC4-6F175D3DCCD1}">
-              <a14:hiddenFill xmlns:a14="http://schemas.microsoft.com/office/drawing/2010/main" xmlns="">
+              <a14:hiddenFill xmlns="" xmlns:a14="http://schemas.microsoft.com/office/drawing/2010/main">
                 <a:noFill/>
               </a14:hiddenFill>
             </a:ext>
@@ -709,7 +709,7 @@
           <a:p>
             <a:fld id="{9A356AEA-056F-417E-9B38-4BA8743FE6C4}" type="datetime1">
               <a:rPr lang="en-US" smtClean="0"/>
-              <a:t>1/11/2019</a:t>
+              <a:t>1/15/2019</a:t>
             </a:fld>
             <a:endParaRPr lang="en-US"/>
           </a:p>
@@ -896,7 +896,7 @@
           <a:p>
             <a:fld id="{09867F7C-1948-4907-9EBC-DD38682B5188}" type="datetime1">
               <a:rPr lang="en-US" smtClean="0"/>
-              <a:t>1/11/2019</a:t>
+              <a:t>1/15/2019</a:t>
             </a:fld>
             <a:endParaRPr lang="en-US"/>
           </a:p>
@@ -1092,7 +1092,7 @@
           <a:p>
             <a:fld id="{A5996870-3492-4879-A20C-50CF7F25E309}" type="datetime1">
               <a:rPr lang="en-US" smtClean="0"/>
-              <a:t>1/11/2019</a:t>
+              <a:t>1/15/2019</a:t>
             </a:fld>
             <a:endParaRPr lang="en-US"/>
           </a:p>
@@ -1344,7 +1344,7 @@
           <a:p>
             <a:fld id="{3339509F-2835-4D20-8448-C5CCD453FC4A}" type="datetime1">
               <a:rPr lang="en-US" smtClean="0"/>
-              <a:t>1/11/2019</a:t>
+              <a:t>1/15/2019</a:t>
             </a:fld>
             <a:endParaRPr lang="en-US"/>
           </a:p>
@@ -1568,7 +1568,7 @@
           <a:p>
             <a:fld id="{7A6EDDDE-DBE4-4114-B865-EC3A2920782E}" type="datetime1">
               <a:rPr lang="en-US" smtClean="0"/>
-              <a:t>1/11/2019</a:t>
+              <a:t>1/15/2019</a:t>
             </a:fld>
             <a:endParaRPr lang="en-US"/>
           </a:p>
@@ -1876,7 +1876,7 @@
           <a:p>
             <a:fld id="{8DA96907-43AE-4B1E-B5FF-6853ADDA5697}" type="datetime1">
               <a:rPr lang="en-US" smtClean="0"/>
-              <a:t>1/11/2019</a:t>
+              <a:t>1/15/2019</a:t>
             </a:fld>
             <a:endParaRPr lang="en-US"/>
           </a:p>
@@ -2044,7 +2044,7 @@
           <a:p>
             <a:fld id="{2E65DF97-DE0F-4515-8F8D-0E1C627BC4E9}" type="datetime1">
               <a:rPr lang="en-US" smtClean="0"/>
-              <a:t>1/11/2019</a:t>
+              <a:t>1/15/2019</a:t>
             </a:fld>
             <a:endParaRPr lang="en-US"/>
           </a:p>
@@ -2356,7 +2356,7 @@
           <a:p>
             <a:fld id="{23B9FD00-80D5-4EA7-B536-8F4F2C3959C9}" type="datetime1">
               <a:rPr lang="en-US" smtClean="0"/>
-              <a:t>1/11/2019</a:t>
+              <a:t>1/15/2019</a:t>
             </a:fld>
             <a:endParaRPr lang="en-US"/>
           </a:p>
@@ -2668,7 +2668,7 @@
           <a:p>
             <a:fld id="{DAC77084-4DB4-4A23-9870-BF49183ACB4C}" type="datetime1">
               <a:rPr lang="en-US" smtClean="0"/>
-              <a:t>1/11/2019</a:t>
+              <a:t>1/15/2019</a:t>
             </a:fld>
             <a:endParaRPr lang="en-US"/>
           </a:p>
@@ -2854,7 +2854,7 @@
           <a:p>
             <a:fld id="{6E487ECE-0D8C-4AFB-BD35-997F06E0971C}" type="datetime1">
               <a:rPr lang="en-US" smtClean="0"/>
-              <a:t>1/11/2019</a:t>
+              <a:t>1/15/2019</a:t>
             </a:fld>
             <a:endParaRPr lang="en-US"/>
           </a:p>
@@ -3063,7 +3063,7 @@
           <a:p>
             <a:fld id="{D4F6DC8D-78A1-49CC-B033-F77D87B04958}" type="datetime1">
               <a:rPr lang="en-US" smtClean="0"/>
-              <a:t>1/11/2019</a:t>
+              <a:t>1/15/2019</a:t>
             </a:fld>
             <a:endParaRPr lang="en-US"/>
           </a:p>
@@ -3366,7 +3366,7 @@
           <a:p>
             <a:fld id="{3BCF4A7C-A413-48DA-9211-5240CAEE1DD4}" type="datetime1">
               <a:rPr lang="en-US" smtClean="0"/>
-              <a:t>1/11/2019</a:t>
+              <a:t>1/15/2019</a:t>
             </a:fld>
             <a:endParaRPr lang="en-US"/>
           </a:p>
@@ -3808,7 +3808,7 @@
           <a:p>
             <a:fld id="{AAE887C4-8D00-4515-BD6B-6D6B646F02F7}" type="datetime1">
               <a:rPr lang="en-US" smtClean="0"/>
-              <a:t>1/11/2019</a:t>
+              <a:t>1/15/2019</a:t>
             </a:fld>
             <a:endParaRPr lang="en-US"/>
           </a:p>
@@ -3943,7 +3943,7 @@
           <a:p>
             <a:fld id="{10C13C5A-776A-4D2B-A91E-2ACB7D90E7CC}" type="datetime1">
               <a:rPr lang="en-US" smtClean="0"/>
-              <a:t>1/11/2019</a:t>
+              <a:t>1/15/2019</a:t>
             </a:fld>
             <a:endParaRPr lang="en-US"/>
           </a:p>
@@ -4056,7 +4056,7 @@
           <a:p>
             <a:fld id="{00A5D59F-6FC3-492C-BAE3-F50C9D1FBA31}" type="datetime1">
               <a:rPr lang="en-US" smtClean="0"/>
-              <a:t>1/11/2019</a:t>
+              <a:t>1/15/2019</a:t>
             </a:fld>
             <a:endParaRPr lang="en-US"/>
           </a:p>
@@ -4349,7 +4349,7 @@
           <a:p>
             <a:fld id="{CD78B45F-E474-4F2F-801A-58FC9FE22655}" type="datetime1">
               <a:rPr lang="en-US" smtClean="0"/>
-              <a:t>1/11/2019</a:t>
+              <a:t>1/15/2019</a:t>
             </a:fld>
             <a:endParaRPr lang="en-US"/>
           </a:p>
@@ -4623,7 +4623,7 @@
           <a:p>
             <a:fld id="{FDF35450-A835-4587-8F84-782057674F92}" type="datetime1">
               <a:rPr lang="en-US" smtClean="0"/>
-              <a:t>1/11/2019</a:t>
+              <a:t>1/15/2019</a:t>
             </a:fld>
             <a:endParaRPr lang="en-US"/>
           </a:p>
@@ -4745,17 +4745,17 @@
           </a:ln>
           <a:extLst>
             <a:ext uri="{FAA26D3D-D897-4be2-8F04-BA451C77F1D7}">
-              <ma14:placeholderFlag xmlns:ma14="http://schemas.microsoft.com/office/mac/drawingml/2011/main" xmlns="" val="1"/>
+              <ma14:placeholderFlag xmlns="" xmlns:ma14="http://schemas.microsoft.com/office/mac/drawingml/2011/main" val="1"/>
             </a:ext>
             <a:ext uri="{909E8E84-426E-40dd-AFC4-6F175D3DCCD1}">
-              <a14:hiddenFill xmlns:a14="http://schemas.microsoft.com/office/drawing/2010/main" xmlns="">
+              <a14:hiddenFill xmlns="" xmlns:a14="http://schemas.microsoft.com/office/drawing/2010/main">
                 <a:solidFill>
                   <a:srgbClr val="FFFFFF"/>
                 </a:solidFill>
               </a14:hiddenFill>
             </a:ext>
             <a:ext uri="{91240B29-F687-4f45-9708-019B960494DF}">
-              <a14:hiddenLine xmlns:a14="http://schemas.microsoft.com/office/drawing/2010/main" xmlns="" w="9525">
+              <a14:hiddenLine xmlns="" xmlns:a14="http://schemas.microsoft.com/office/drawing/2010/main" w="9525">
                 <a:solidFill>
                   <a:srgbClr val="000000"/>
                 </a:solidFill>
@@ -4807,17 +4807,17 @@
           </a:ln>
           <a:extLst>
             <a:ext uri="{FAA26D3D-D897-4be2-8F04-BA451C77F1D7}">
-              <ma14:placeholderFlag xmlns:ma14="http://schemas.microsoft.com/office/mac/drawingml/2011/main" xmlns="" val="1"/>
+              <ma14:placeholderFlag xmlns="" xmlns:ma14="http://schemas.microsoft.com/office/mac/drawingml/2011/main" val="1"/>
             </a:ext>
             <a:ext uri="{909E8E84-426E-40dd-AFC4-6F175D3DCCD1}">
-              <a14:hiddenFill xmlns:a14="http://schemas.microsoft.com/office/drawing/2010/main" xmlns="">
+              <a14:hiddenFill xmlns="" xmlns:a14="http://schemas.microsoft.com/office/drawing/2010/main">
                 <a:solidFill>
                   <a:srgbClr val="FFFFFF"/>
                 </a:solidFill>
               </a14:hiddenFill>
             </a:ext>
             <a:ext uri="{91240B29-F687-4f45-9708-019B960494DF}">
-              <a14:hiddenLine xmlns:a14="http://schemas.microsoft.com/office/drawing/2010/main" xmlns="" w="9525">
+              <a14:hiddenLine xmlns="" xmlns:a14="http://schemas.microsoft.com/office/drawing/2010/main" w="9525">
                 <a:solidFill>
                   <a:srgbClr val="000000"/>
                 </a:solidFill>
@@ -4917,7 +4917,7 @@
           <a:p>
             <a:fld id="{F6803E09-2A09-4EEA-8E99-292225B5EDFC}" type="datetime1">
               <a:rPr lang="en-US" smtClean="0"/>
-              <a:t>1/11/2019</a:t>
+              <a:t>1/15/2019</a:t>
             </a:fld>
             <a:endParaRPr lang="en-US"/>
           </a:p>
@@ -5085,7 +5085,7 @@
           </a:ln>
           <a:extLst>
             <a:ext uri="{909E8E84-426E-40dd-AFC4-6F175D3DCCD1}">
-              <a14:hiddenFill xmlns:a14="http://schemas.microsoft.com/office/drawing/2010/main" xmlns="">
+              <a14:hiddenFill xmlns="" xmlns:a14="http://schemas.microsoft.com/office/drawing/2010/main">
                 <a:solidFill>
                   <a:srgbClr val="FFFFFF"/>
                 </a:solidFill>
@@ -5128,7 +5128,7 @@
           </a:ln>
           <a:extLst>
             <a:ext uri="{909E8E84-426E-40dd-AFC4-6F175D3DCCD1}">
-              <a14:hiddenFill xmlns:a14="http://schemas.microsoft.com/office/drawing/2010/main" xmlns="">
+              <a14:hiddenFill xmlns="" xmlns:a14="http://schemas.microsoft.com/office/drawing/2010/main">
                 <a:noFill/>
               </a14:hiddenFill>
             </a:ext>
@@ -5613,7 +5613,7 @@
           <p:cNvPr id="2" name="Title 1">
             <a:extLst>
               <a:ext uri="{FF2B5EF4-FFF2-40B4-BE49-F238E27FC236}">
-                <a16:creationId xmlns="" xmlns:a16="http://schemas.microsoft.com/office/drawing/2014/main" id="{4819A39B-28BB-4873-9914-8FEE18891DD4}"/>
+                <a16:creationId xmlns:a16="http://schemas.microsoft.com/office/drawing/2014/main" xmlns="" id="{4819A39B-28BB-4873-9914-8FEE18891DD4}"/>
               </a:ext>
             </a:extLst>
           </p:cNvPr>
@@ -5632,26 +5632,26 @@
           <a:lstStyle/>
           <a:p>
             <a:r>
-              <a:rPr lang="es-ES" dirty="0" err="1" smtClean="0"/>
+              <a:rPr lang="es-419" noProof="0" dirty="0" err="1" smtClean="0"/>
               <a:t>Bayesian</a:t>
             </a:r>
             <a:r>
-              <a:rPr lang="es-ES" dirty="0" smtClean="0"/>
+              <a:rPr lang="es-419" noProof="0" dirty="0" smtClean="0"/>
               <a:t> </a:t>
             </a:r>
             <a:r>
-              <a:rPr lang="es-ES" dirty="0" err="1" smtClean="0"/>
+              <a:rPr lang="es-419" noProof="0" dirty="0" err="1" smtClean="0"/>
               <a:t>model</a:t>
             </a:r>
             <a:r>
-              <a:rPr lang="es-ES" dirty="0" smtClean="0"/>
+              <a:rPr lang="es-419" noProof="0" dirty="0" smtClean="0"/>
               <a:t> </a:t>
             </a:r>
             <a:r>
-              <a:rPr lang="es-ES" dirty="0" err="1" smtClean="0"/>
+              <a:rPr lang="es-419" noProof="0" dirty="0" err="1" smtClean="0"/>
               <a:t>selection</a:t>
             </a:r>
-            <a:endParaRPr lang="es-CL" noProof="0" dirty="0"/>
+            <a:endParaRPr lang="es-419" noProof="0" dirty="0"/>
           </a:p>
         </p:txBody>
       </p:sp>
@@ -5660,7 +5660,7 @@
           <p:cNvPr id="5" name="Subtitle 2">
             <a:extLst>
               <a:ext uri="{FF2B5EF4-FFF2-40B4-BE49-F238E27FC236}">
-                <a16:creationId xmlns="" xmlns:a16="http://schemas.microsoft.com/office/drawing/2014/main" id="{2BECD79D-0B3A-44C2-A155-03EC2A6A5D3B}"/>
+                <a16:creationId xmlns:a16="http://schemas.microsoft.com/office/drawing/2014/main" xmlns="" id="{2BECD79D-0B3A-44C2-A155-03EC2A6A5D3B}"/>
               </a:ext>
             </a:extLst>
           </p:cNvPr>
@@ -5683,17 +5683,17 @@
           </a:ln>
           <a:extLst>
             <a:ext uri="{FAA26D3D-D897-4be2-8F04-BA451C77F1D7}">
-              <ma14:placeholderFlag xmlns:ma14="http://schemas.microsoft.com/office/mac/drawingml/2011/main" xmlns="" val="1"/>
+              <ma14:placeholderFlag xmlns="" xmlns:ma14="http://schemas.microsoft.com/office/mac/drawingml/2011/main" val="1"/>
             </a:ext>
             <a:ext uri="{909E8E84-426E-40dd-AFC4-6F175D3DCCD1}">
-              <a14:hiddenFill xmlns:a14="http://schemas.microsoft.com/office/drawing/2010/main" xmlns="">
+              <a14:hiddenFill xmlns="" xmlns:a14="http://schemas.microsoft.com/office/drawing/2010/main">
                 <a:solidFill>
                   <a:srgbClr val="FFFFFF"/>
                 </a:solidFill>
               </a14:hiddenFill>
             </a:ext>
             <a:ext uri="{91240B29-F687-4f45-9708-019B960494DF}">
-              <a14:hiddenLine xmlns:a14="http://schemas.microsoft.com/office/drawing/2010/main" xmlns="" w="9525">
+              <a14:hiddenLine xmlns="" xmlns:a14="http://schemas.microsoft.com/office/drawing/2010/main" w="9525">
                 <a:solidFill>
                   <a:srgbClr val="000000"/>
                 </a:solidFill>
@@ -5995,10 +5995,10 @@
           <a:lstStyle/>
           <a:p>
             <a:r>
-              <a:rPr lang="en-US" dirty="0" smtClean="0"/>
+              <a:rPr lang="es-419" noProof="0" dirty="0" err="1" smtClean="0"/>
               <a:t>Recap</a:t>
             </a:r>
-            <a:endParaRPr lang="en-US" dirty="0"/>
+            <a:endParaRPr lang="es-419" noProof="0" dirty="0"/>
           </a:p>
         </p:txBody>
       </p:sp>
@@ -6018,24 +6018,102 @@
           <a:lstStyle/>
           <a:p>
             <a:r>
-              <a:rPr lang="en-US" dirty="0" smtClean="0"/>
-              <a:t>In the lecture we used posterior predictive distributions to examine model self-consistency</a:t>
-            </a:r>
-          </a:p>
-          <a:p>
-            <a:r>
-              <a:rPr lang="en-US" dirty="0" smtClean="0"/>
-              <a:t>The extra covariates appeared to allow the model to fit the data better</a:t>
-            </a:r>
-          </a:p>
-          <a:p>
-            <a:r>
-              <a:rPr lang="en-US" dirty="0" smtClean="0"/>
-              <a:t>Let’s test this using DIC</a:t>
-            </a:r>
-          </a:p>
-          <a:p>
-            <a:endParaRPr lang="en-US" dirty="0"/>
+              <a:rPr lang="es-419" noProof="0" dirty="0" smtClean="0"/>
+              <a:t>Usamos </a:t>
+            </a:r>
+            <a:r>
+              <a:rPr lang="es-419" i="1" noProof="0" dirty="0" smtClean="0"/>
+              <a:t>p</a:t>
+            </a:r>
+            <a:r>
+              <a:rPr lang="es-419" i="1" noProof="0" dirty="0" smtClean="0"/>
+              <a:t>osterior </a:t>
+            </a:r>
+            <a:r>
+              <a:rPr lang="es-419" i="1" noProof="0" dirty="0" err="1" smtClean="0"/>
+              <a:t>predictive</a:t>
+            </a:r>
+            <a:r>
+              <a:rPr lang="es-419" i="1" noProof="0" dirty="0" smtClean="0"/>
+              <a:t> </a:t>
+            </a:r>
+            <a:r>
+              <a:rPr lang="es-419" i="1" noProof="0" dirty="0" err="1" smtClean="0"/>
+              <a:t>distributions</a:t>
+            </a:r>
+            <a:r>
+              <a:rPr lang="es-419" noProof="0" dirty="0" smtClean="0"/>
+              <a:t> para probar “</a:t>
+            </a:r>
+            <a:r>
+              <a:rPr lang="es-419" noProof="0" dirty="0" err="1" smtClean="0"/>
+              <a:t>model</a:t>
+            </a:r>
+            <a:r>
+              <a:rPr lang="es-419" noProof="0" dirty="0" smtClean="0"/>
+              <a:t> </a:t>
+            </a:r>
+            <a:r>
+              <a:rPr lang="es-419" noProof="0" dirty="0" err="1" smtClean="0"/>
+              <a:t>self-consistency</a:t>
+            </a:r>
+            <a:r>
+              <a:rPr lang="es-419" noProof="0" dirty="0" smtClean="0"/>
+              <a:t>”</a:t>
+            </a:r>
+          </a:p>
+          <a:p>
+            <a:r>
+              <a:rPr lang="es-419" dirty="0" smtClean="0"/>
+              <a:t>El modelo tuvo un dato que no era bueno</a:t>
+            </a:r>
+          </a:p>
+          <a:p>
+            <a:r>
+              <a:rPr lang="es-419" noProof="0" dirty="0" err="1" smtClean="0"/>
+              <a:t>Quizas</a:t>
+            </a:r>
+            <a:r>
+              <a:rPr lang="es-419" noProof="0" dirty="0" smtClean="0"/>
+              <a:t> con extra estructura con </a:t>
+            </a:r>
+            <a:r>
+              <a:rPr lang="es-419" noProof="0" dirty="0" err="1" smtClean="0"/>
+              <a:t>covariables</a:t>
+            </a:r>
+            <a:r>
+              <a:rPr lang="es-419" noProof="0" dirty="0" smtClean="0"/>
+              <a:t> el modelo puede explicar los datos</a:t>
+            </a:r>
+          </a:p>
+          <a:p>
+            <a:r>
+              <a:rPr lang="es-419" noProof="0" dirty="0" smtClean="0"/>
+              <a:t>Vamos a usar </a:t>
+            </a:r>
+            <a:r>
+              <a:rPr lang="es-419" i="1" noProof="0" dirty="0" smtClean="0"/>
+              <a:t>posterior </a:t>
+            </a:r>
+            <a:r>
+              <a:rPr lang="es-419" i="1" noProof="0" dirty="0" err="1" smtClean="0"/>
+              <a:t>predictive</a:t>
+            </a:r>
+            <a:r>
+              <a:rPr lang="es-419" i="1" noProof="0" dirty="0" smtClean="0"/>
+              <a:t> </a:t>
+            </a:r>
+            <a:r>
+              <a:rPr lang="es-419" i="1" noProof="0" dirty="0" err="1" smtClean="0"/>
+              <a:t>distribution</a:t>
+            </a:r>
+            <a:r>
+              <a:rPr lang="es-419" noProof="0" dirty="0" smtClean="0"/>
+              <a:t> y DIC</a:t>
+            </a:r>
+          </a:p>
+          <a:p>
+            <a:endParaRPr lang="es-419" noProof="0" dirty="0"/>
           </a:p>
         </p:txBody>
       </p:sp>
@@ -6108,10 +6186,26 @@
           <a:lstStyle/>
           <a:p>
             <a:r>
-              <a:rPr lang="en-US" dirty="0" smtClean="0"/>
-              <a:t>Exercise</a:t>
-            </a:r>
-            <a:endParaRPr lang="en-US" dirty="0"/>
+              <a:rPr lang="es-419" noProof="0" dirty="0" err="1" smtClean="0"/>
+              <a:t>Bayesian</a:t>
+            </a:r>
+            <a:r>
+              <a:rPr lang="es-419" noProof="0" dirty="0" smtClean="0"/>
+              <a:t> </a:t>
+            </a:r>
+            <a:r>
+              <a:rPr lang="es-419" noProof="0" dirty="0" err="1" smtClean="0"/>
+              <a:t>model</a:t>
+            </a:r>
+            <a:r>
+              <a:rPr lang="es-419" noProof="0" dirty="0" smtClean="0"/>
+              <a:t> </a:t>
+            </a:r>
+            <a:r>
+              <a:rPr lang="es-419" noProof="0" dirty="0" err="1" smtClean="0"/>
+              <a:t>selection</a:t>
+            </a:r>
+            <a:endParaRPr lang="es-419" noProof="0" dirty="0"/>
           </a:p>
         </p:txBody>
       </p:sp>
@@ -6125,38 +6219,397 @@
             <p:ph idx="1"/>
           </p:nvPr>
         </p:nvSpPr>
-        <p:spPr/>
+        <p:spPr>
+          <a:xfrm>
+            <a:off x="457200" y="1172818"/>
+            <a:ext cx="8229600" cy="4958108"/>
+          </a:xfrm>
+        </p:spPr>
         <p:txBody>
           <a:bodyPr/>
           <a:lstStyle/>
           <a:p>
             <a:r>
-              <a:rPr lang="en-US" dirty="0" smtClean="0"/>
-              <a:t>Fit the 3 versions of the model (use separate .jags files)</a:t>
-            </a:r>
-          </a:p>
-          <a:p>
-            <a:r>
-              <a:rPr lang="en-US" dirty="0" smtClean="0"/>
-              <a:t>Recreate posterior predictive plots for all three</a:t>
-            </a:r>
-          </a:p>
-          <a:p>
-            <a:r>
-              <a:rPr lang="en-US" dirty="0" smtClean="0"/>
-              <a:t>Which model does DIC select?</a:t>
-            </a:r>
-          </a:p>
-          <a:p>
-            <a:r>
-              <a:rPr lang="en-US" dirty="0" smtClean="0"/>
-              <a:t>[What should you use for priors on </a:t>
-            </a:r>
-            <a:r>
-              <a:rPr lang="en-US" dirty="0" smtClean="0"/>
-              <a:t>coefficients?]</a:t>
-            </a:r>
-            <a:endParaRPr lang="en-US" dirty="0"/>
+              <a:rPr lang="es-419" noProof="0" dirty="0" err="1" smtClean="0"/>
+              <a:t>Model</a:t>
+            </a:r>
+            <a:r>
+              <a:rPr lang="es-419" noProof="0" dirty="0" smtClean="0"/>
+              <a:t> </a:t>
+            </a:r>
+            <a:r>
+              <a:rPr lang="es-419" noProof="0" dirty="0" err="1" smtClean="0"/>
+              <a:t>selection</a:t>
+            </a:r>
+            <a:r>
+              <a:rPr lang="es-419" noProof="0" dirty="0" smtClean="0"/>
+              <a:t> </a:t>
+            </a:r>
+            <a:r>
+              <a:rPr lang="es-419" noProof="0" dirty="0" err="1" smtClean="0"/>
+              <a:t>is</a:t>
+            </a:r>
+            <a:r>
+              <a:rPr lang="es-419" noProof="0" dirty="0" smtClean="0"/>
+              <a:t> </a:t>
+            </a:r>
+            <a:r>
+              <a:rPr lang="es-419" noProof="0" dirty="0" err="1" smtClean="0"/>
+              <a:t>not</a:t>
+            </a:r>
+            <a:r>
+              <a:rPr lang="es-419" noProof="0" dirty="0" smtClean="0"/>
+              <a:t> trivial. </a:t>
+            </a:r>
+            <a:r>
+              <a:rPr lang="es-419" noProof="0" dirty="0" err="1" smtClean="0"/>
+              <a:t>There</a:t>
+            </a:r>
+            <a:r>
+              <a:rPr lang="es-419" noProof="0" dirty="0" smtClean="0"/>
+              <a:t> are </a:t>
+            </a:r>
+            <a:r>
+              <a:rPr lang="es-419" noProof="0" dirty="0" err="1" smtClean="0"/>
+              <a:t>many</a:t>
+            </a:r>
+            <a:r>
+              <a:rPr lang="es-419" noProof="0" dirty="0" smtClean="0"/>
+              <a:t> </a:t>
+            </a:r>
+            <a:r>
+              <a:rPr lang="es-419" noProof="0" dirty="0" err="1" smtClean="0"/>
+              <a:t>existing</a:t>
+            </a:r>
+            <a:r>
+              <a:rPr lang="es-419" noProof="0" dirty="0" smtClean="0"/>
+              <a:t> </a:t>
+            </a:r>
+            <a:r>
+              <a:rPr lang="es-419" noProof="0" dirty="0" err="1" smtClean="0"/>
+              <a:t>tools</a:t>
+            </a:r>
+            <a:r>
+              <a:rPr lang="es-419" noProof="0" dirty="0" smtClean="0"/>
+              <a:t> and more </a:t>
+            </a:r>
+            <a:r>
+              <a:rPr lang="es-419" noProof="0" dirty="0" err="1" smtClean="0"/>
+              <a:t>being</a:t>
+            </a:r>
+            <a:r>
+              <a:rPr lang="es-419" noProof="0" dirty="0" smtClean="0"/>
+              <a:t> </a:t>
+            </a:r>
+            <a:r>
+              <a:rPr lang="es-419" noProof="0" dirty="0" err="1" smtClean="0"/>
+              <a:t>developed</a:t>
+            </a:r>
+            <a:r>
+              <a:rPr lang="es-419" noProof="0" dirty="0" smtClean="0"/>
+              <a:t>.</a:t>
+            </a:r>
+          </a:p>
+          <a:p>
+            <a:r>
+              <a:rPr lang="es-419" noProof="0" dirty="0" err="1" smtClean="0"/>
+              <a:t>According</a:t>
+            </a:r>
+            <a:r>
+              <a:rPr lang="es-419" noProof="0" dirty="0" smtClean="0"/>
+              <a:t> to </a:t>
+            </a:r>
+            <a:r>
+              <a:rPr lang="es-419" noProof="0" dirty="0" err="1" smtClean="0"/>
+              <a:t>Hobbs</a:t>
+            </a:r>
+            <a:r>
+              <a:rPr lang="es-419" noProof="0" dirty="0" smtClean="0"/>
+              <a:t> &amp; </a:t>
+            </a:r>
+            <a:r>
+              <a:rPr lang="es-419" noProof="0" dirty="0" err="1" smtClean="0"/>
+              <a:t>Hooten</a:t>
+            </a:r>
+            <a:r>
+              <a:rPr lang="es-419" noProof="0" dirty="0" smtClean="0"/>
+              <a:t> (2018)</a:t>
+            </a:r>
+          </a:p>
+          <a:p>
+            <a:pPr marL="858837" lvl="1" indent="-514350">
+              <a:buFont typeface="+mj-lt"/>
+              <a:buAutoNum type="arabicPeriod"/>
+            </a:pPr>
+            <a:r>
+              <a:rPr lang="es-419" noProof="0" dirty="0" err="1" smtClean="0"/>
+              <a:t>Out</a:t>
+            </a:r>
+            <a:r>
+              <a:rPr lang="es-419" noProof="0" dirty="0" smtClean="0"/>
+              <a:t> of </a:t>
+            </a:r>
+            <a:r>
+              <a:rPr lang="es-419" noProof="0" dirty="0" err="1" smtClean="0"/>
+              <a:t>sample</a:t>
+            </a:r>
+            <a:r>
+              <a:rPr lang="es-419" noProof="0" dirty="0" smtClean="0"/>
+              <a:t> </a:t>
+            </a:r>
+            <a:r>
+              <a:rPr lang="es-419" noProof="0" dirty="0" err="1" smtClean="0"/>
+              <a:t>is</a:t>
+            </a:r>
+            <a:r>
+              <a:rPr lang="es-419" noProof="0" dirty="0" smtClean="0"/>
+              <a:t> </a:t>
+            </a:r>
+            <a:r>
+              <a:rPr lang="es-419" noProof="0" dirty="0" err="1" smtClean="0"/>
+              <a:t>the</a:t>
+            </a:r>
+            <a:r>
+              <a:rPr lang="es-419" noProof="0" dirty="0" smtClean="0"/>
+              <a:t> </a:t>
+            </a:r>
+            <a:r>
+              <a:rPr lang="es-419" noProof="0" dirty="0" err="1" smtClean="0"/>
+              <a:t>best</a:t>
+            </a:r>
+            <a:r>
+              <a:rPr lang="es-419" noProof="0" dirty="0" smtClean="0"/>
+              <a:t> </a:t>
+            </a:r>
+            <a:r>
+              <a:rPr lang="es-419" noProof="0" dirty="0" err="1" smtClean="0"/>
+              <a:t>approach</a:t>
+            </a:r>
+            <a:r>
+              <a:rPr lang="es-419" noProof="0" dirty="0" smtClean="0"/>
+              <a:t> </a:t>
+            </a:r>
+            <a:r>
+              <a:rPr lang="es-419" noProof="0" dirty="0" err="1" smtClean="0"/>
+              <a:t>if</a:t>
+            </a:r>
+            <a:r>
+              <a:rPr lang="es-419" noProof="0" dirty="0" smtClean="0"/>
+              <a:t> </a:t>
+            </a:r>
+            <a:r>
+              <a:rPr lang="es-419" noProof="0" dirty="0" err="1" smtClean="0"/>
+              <a:t>possible</a:t>
+            </a:r>
+            <a:endParaRPr lang="es-419" noProof="0" dirty="0" smtClean="0"/>
+          </a:p>
+          <a:p>
+            <a:pPr marL="858837" lvl="1" indent="-514350">
+              <a:buFont typeface="+mj-lt"/>
+              <a:buAutoNum type="arabicPeriod"/>
+            </a:pPr>
+            <a:r>
+              <a:rPr lang="es-419" noProof="0" dirty="0" smtClean="0"/>
+              <a:t>K-</a:t>
+            </a:r>
+            <a:r>
+              <a:rPr lang="es-419" noProof="0" dirty="0" err="1" smtClean="0"/>
+              <a:t>fold</a:t>
+            </a:r>
+            <a:r>
+              <a:rPr lang="es-419" noProof="0" dirty="0" smtClean="0"/>
+              <a:t> </a:t>
+            </a:r>
+            <a:r>
+              <a:rPr lang="es-419" noProof="0" dirty="0" err="1" smtClean="0"/>
+              <a:t>cross</a:t>
+            </a:r>
+            <a:r>
+              <a:rPr lang="es-419" noProof="0" dirty="0" smtClean="0"/>
+              <a:t> </a:t>
+            </a:r>
+            <a:r>
+              <a:rPr lang="es-419" noProof="0" dirty="0" err="1" smtClean="0"/>
+              <a:t>validation</a:t>
+            </a:r>
+            <a:r>
+              <a:rPr lang="es-419" noProof="0" dirty="0" smtClean="0"/>
+              <a:t> </a:t>
+            </a:r>
+            <a:r>
+              <a:rPr lang="es-419" noProof="0" dirty="0" err="1" smtClean="0"/>
+              <a:t>good</a:t>
+            </a:r>
+            <a:r>
+              <a:rPr lang="es-419" noProof="0" dirty="0" smtClean="0"/>
+              <a:t> </a:t>
+            </a:r>
+            <a:r>
+              <a:rPr lang="es-419" noProof="0" dirty="0" err="1" smtClean="0"/>
+              <a:t>but</a:t>
+            </a:r>
+            <a:r>
+              <a:rPr lang="es-419" noProof="0" dirty="0" smtClean="0"/>
+              <a:t> </a:t>
+            </a:r>
+            <a:r>
+              <a:rPr lang="es-419" noProof="0" dirty="0" err="1" smtClean="0"/>
+              <a:t>slow</a:t>
+            </a:r>
+            <a:endParaRPr lang="es-419" noProof="0" dirty="0" smtClean="0"/>
+          </a:p>
+          <a:p>
+            <a:pPr marL="858837" lvl="1" indent="-514350">
+              <a:buFont typeface="+mj-lt"/>
+              <a:buAutoNum type="arabicPeriod"/>
+            </a:pPr>
+            <a:r>
+              <a:rPr lang="es-419" noProof="0" dirty="0" smtClean="0"/>
+              <a:t>DIC </a:t>
+            </a:r>
+            <a:r>
+              <a:rPr lang="es-419" noProof="0" dirty="0" err="1" smtClean="0"/>
+              <a:t>is</a:t>
+            </a:r>
+            <a:r>
+              <a:rPr lang="es-419" noProof="0" dirty="0" smtClean="0"/>
+              <a:t> </a:t>
+            </a:r>
+            <a:r>
+              <a:rPr lang="es-419" noProof="0" dirty="0" err="1" smtClean="0"/>
+              <a:t>good</a:t>
+            </a:r>
+            <a:r>
+              <a:rPr lang="es-419" noProof="0" dirty="0" smtClean="0"/>
+              <a:t> </a:t>
+            </a:r>
+            <a:r>
+              <a:rPr lang="es-419" noProof="0" dirty="0" err="1" smtClean="0"/>
+              <a:t>when</a:t>
+            </a:r>
+            <a:r>
+              <a:rPr lang="es-419" noProof="0" dirty="0" smtClean="0"/>
+              <a:t> </a:t>
+            </a:r>
+            <a:r>
+              <a:rPr lang="es-419" noProof="0" dirty="0" err="1" smtClean="0"/>
+              <a:t>prediction</a:t>
+            </a:r>
+            <a:r>
+              <a:rPr lang="es-419" noProof="0" dirty="0" smtClean="0"/>
+              <a:t> </a:t>
+            </a:r>
+            <a:r>
+              <a:rPr lang="es-419" noProof="0" dirty="0" err="1" smtClean="0"/>
+              <a:t>is</a:t>
+            </a:r>
+            <a:r>
+              <a:rPr lang="es-419" noProof="0" dirty="0" smtClean="0"/>
+              <a:t> </a:t>
+            </a:r>
+            <a:r>
+              <a:rPr lang="es-419" noProof="0" dirty="0" err="1" smtClean="0"/>
+              <a:t>important</a:t>
+            </a:r>
+            <a:r>
+              <a:rPr lang="es-419" noProof="0" dirty="0" smtClean="0"/>
+              <a:t> and </a:t>
+            </a:r>
+            <a:r>
+              <a:rPr lang="es-419" noProof="0" dirty="0" err="1" smtClean="0"/>
+              <a:t>model</a:t>
+            </a:r>
+            <a:r>
+              <a:rPr lang="es-419" noProof="0" dirty="0" smtClean="0"/>
+              <a:t> </a:t>
+            </a:r>
+            <a:r>
+              <a:rPr lang="es-419" noProof="0" dirty="0" err="1" smtClean="0"/>
+              <a:t>is</a:t>
+            </a:r>
+            <a:r>
+              <a:rPr lang="es-419" noProof="0" dirty="0" smtClean="0"/>
+              <a:t> </a:t>
+            </a:r>
+            <a:r>
+              <a:rPr lang="es-419" noProof="0" dirty="0" err="1" smtClean="0"/>
+              <a:t>slow</a:t>
+            </a:r>
+            <a:r>
+              <a:rPr lang="es-419" noProof="0" dirty="0" smtClean="0"/>
+              <a:t>, </a:t>
+            </a:r>
+            <a:r>
+              <a:rPr lang="es-419" noProof="0" dirty="0" err="1" smtClean="0"/>
+              <a:t>works</a:t>
+            </a:r>
+            <a:r>
+              <a:rPr lang="es-419" noProof="0" dirty="0" smtClean="0"/>
+              <a:t> </a:t>
+            </a:r>
+            <a:r>
+              <a:rPr lang="es-419" noProof="0" dirty="0" err="1" smtClean="0"/>
+              <a:t>best</a:t>
+            </a:r>
+            <a:r>
+              <a:rPr lang="es-419" noProof="0" dirty="0" smtClean="0"/>
+              <a:t> </a:t>
+            </a:r>
+            <a:r>
+              <a:rPr lang="es-419" noProof="0" dirty="0" err="1" smtClean="0"/>
+              <a:t>when</a:t>
+            </a:r>
+            <a:r>
+              <a:rPr lang="es-419" noProof="0" dirty="0" smtClean="0"/>
+              <a:t> (# </a:t>
+            </a:r>
+            <a:r>
+              <a:rPr lang="es-419" noProof="0" dirty="0" err="1" smtClean="0"/>
+              <a:t>pars</a:t>
+            </a:r>
+            <a:r>
+              <a:rPr lang="es-419" noProof="0" dirty="0" smtClean="0"/>
+              <a:t> &lt;&lt; # data)</a:t>
+            </a:r>
+          </a:p>
+          <a:p>
+            <a:pPr marL="858837" lvl="1" indent="-514350">
+              <a:buFont typeface="+mj-lt"/>
+              <a:buAutoNum type="arabicPeriod"/>
+            </a:pPr>
+            <a:r>
+              <a:rPr lang="es-419" noProof="0" dirty="0" smtClean="0"/>
+              <a:t>WAIC </a:t>
+            </a:r>
+            <a:r>
+              <a:rPr lang="es-419" noProof="0" dirty="0" err="1" smtClean="0"/>
+              <a:t>good</a:t>
+            </a:r>
+            <a:r>
+              <a:rPr lang="es-419" noProof="0" dirty="0" smtClean="0"/>
+              <a:t> </a:t>
+            </a:r>
+            <a:r>
+              <a:rPr lang="es-419" noProof="0" dirty="0" err="1" smtClean="0"/>
+              <a:t>for</a:t>
+            </a:r>
+            <a:r>
+              <a:rPr lang="es-419" noProof="0" dirty="0" smtClean="0"/>
+              <a:t> </a:t>
+            </a:r>
+            <a:r>
+              <a:rPr lang="es-419" noProof="0" dirty="0" err="1" smtClean="0"/>
+              <a:t>hierarchical</a:t>
+            </a:r>
+            <a:r>
+              <a:rPr lang="es-419" noProof="0" dirty="0" smtClean="0"/>
+              <a:t> </a:t>
+            </a:r>
+            <a:r>
+              <a:rPr lang="es-419" noProof="0" dirty="0" err="1" smtClean="0"/>
+              <a:t>models</a:t>
+            </a:r>
+            <a:endParaRPr lang="es-419" noProof="0" dirty="0"/>
           </a:p>
         </p:txBody>
       </p:sp>
@@ -6183,10 +6636,48 @@
           </a:p>
         </p:txBody>
       </p:sp>
+      <p:sp>
+        <p:nvSpPr>
+          <p:cNvPr id="5" name="TextBox 4"/>
+          <p:cNvSpPr txBox="1"/>
+          <p:nvPr/>
+        </p:nvSpPr>
+        <p:spPr>
+          <a:xfrm>
+            <a:off x="457200" y="6500191"/>
+            <a:ext cx="4472609" cy="369332"/>
+          </a:xfrm>
+          <a:prstGeom prst="rect">
+            <a:avLst/>
+          </a:prstGeom>
+          <a:noFill/>
+        </p:spPr>
+        <p:txBody>
+          <a:bodyPr wrap="square" rtlCol="0">
+            <a:spAutoFit/>
+          </a:bodyPr>
+          <a:lstStyle/>
+          <a:p>
+            <a:r>
+              <a:rPr lang="en-US" dirty="0" smtClean="0"/>
+              <a:t>Hobbs &amp; </a:t>
+            </a:r>
+            <a:r>
+              <a:rPr lang="en-US" dirty="0" err="1" smtClean="0"/>
+              <a:t>Hooten</a:t>
+            </a:r>
+            <a:r>
+              <a:rPr lang="en-US" dirty="0" smtClean="0"/>
+              <a:t> (2018)</a:t>
+            </a:r>
+            <a:endParaRPr lang="en-US" dirty="0"/>
+          </a:p>
+        </p:txBody>
+      </p:sp>
     </p:spTree>
     <p:extLst>
       <p:ext uri="{BB962C8B-B14F-4D97-AF65-F5344CB8AC3E}">
-        <p14:creationId xmlns:p14="http://schemas.microsoft.com/office/powerpoint/2010/main" val="3470775957"/>
+        <p14:creationId xmlns:p14="http://schemas.microsoft.com/office/powerpoint/2010/main" val="550174900"/>
       </p:ext>
     </p:extLst>
   </p:cSld>
@@ -6228,7 +6719,27 @@
           <a:bodyPr/>
           <a:lstStyle/>
           <a:p>
-            <a:endParaRPr lang="en-US"/>
+            <a:r>
+              <a:rPr lang="es-419" noProof="0" dirty="0" err="1" smtClean="0"/>
+              <a:t>Bayesian</a:t>
+            </a:r>
+            <a:r>
+              <a:rPr lang="es-419" noProof="0" dirty="0" smtClean="0"/>
+              <a:t> </a:t>
+            </a:r>
+            <a:r>
+              <a:rPr lang="es-419" noProof="0" dirty="0" err="1" smtClean="0"/>
+              <a:t>model</a:t>
+            </a:r>
+            <a:r>
+              <a:rPr lang="es-419" noProof="0" dirty="0" smtClean="0"/>
+              <a:t> </a:t>
+            </a:r>
+            <a:r>
+              <a:rPr lang="es-419" noProof="0" dirty="0" err="1" smtClean="0"/>
+              <a:t>selection</a:t>
+            </a:r>
+            <a:endParaRPr lang="es-419" noProof="0" dirty="0"/>
           </a:p>
         </p:txBody>
       </p:sp>
@@ -6247,97 +6758,6 @@
           <a:bodyPr/>
           <a:lstStyle/>
           <a:p>
-            <a:r>
-              <a:rPr lang="en-US" dirty="0" smtClean="0"/>
-              <a:t>We will try 3 versions of our binomial survival model (GLM)</a:t>
-            </a:r>
-          </a:p>
-          <a:p>
-            <a:r>
-              <a:rPr lang="en-US" dirty="0" smtClean="0"/>
-              <a:t>Fit3=from lecture</a:t>
-            </a:r>
-          </a:p>
-          <a:p>
-            <a:r>
-              <a:rPr lang="en-US" dirty="0" smtClean="0"/>
-              <a:t>Fit4=with covariate x1</a:t>
-            </a:r>
-          </a:p>
-          <a:p>
-            <a:r>
-              <a:rPr lang="en-US" dirty="0" smtClean="0"/>
-              <a:t>Fit5=with covariate x1 and x2</a:t>
-            </a:r>
-          </a:p>
-          <a:p>
-            <a:pPr marL="0" indent="0">
-              <a:buNone/>
-            </a:pPr>
-            <a:r>
-              <a:rPr lang="en-US" sz="1400" dirty="0">
-                <a:latin typeface="Courier New" panose="02070309020205020404" pitchFamily="49" charset="0"/>
-                <a:cs typeface="Courier New" panose="02070309020205020404" pitchFamily="49" charset="0"/>
-              </a:rPr>
-              <a:t>x1 &lt;- c(9.450, 8.079, 7.686, 8.003, 2.882, 11.095, 10.696, 8.263, 12.043,</a:t>
-            </a:r>
-          </a:p>
-          <a:p>
-            <a:pPr marL="0" indent="0">
-              <a:buNone/>
-            </a:pPr>
-            <a:r>
-              <a:rPr lang="en-US" sz="1400" dirty="0">
-                <a:latin typeface="Courier New" panose="02070309020205020404" pitchFamily="49" charset="0"/>
-                <a:cs typeface="Courier New" panose="02070309020205020404" pitchFamily="49" charset="0"/>
-              </a:rPr>
-              <a:t>        9.238)</a:t>
-            </a:r>
-          </a:p>
-          <a:p>
-            <a:pPr marL="0" indent="0">
-              <a:buNone/>
-            </a:pPr>
-            <a:r>
-              <a:rPr lang="en-US" sz="1400" dirty="0">
-                <a:latin typeface="Courier New" panose="02070309020205020404" pitchFamily="49" charset="0"/>
-                <a:cs typeface="Courier New" panose="02070309020205020404" pitchFamily="49" charset="0"/>
-              </a:rPr>
-              <a:t>x2 &lt;- c(0.08, 0.252, 0.158, 0.25, 0.081, 0.037, 0.002, 0.042, 0.053,</a:t>
-            </a:r>
-          </a:p>
-          <a:p>
-            <a:pPr marL="0" indent="0">
-              <a:buNone/>
-            </a:pPr>
-            <a:r>
-              <a:rPr lang="en-US" sz="1400" dirty="0">
-                <a:latin typeface="Courier New" panose="02070309020205020404" pitchFamily="49" charset="0"/>
-                <a:cs typeface="Courier New" panose="02070309020205020404" pitchFamily="49" charset="0"/>
-              </a:rPr>
-              <a:t>        -0.02, 0.141, -0.001, -0.078, 0.103, -0.076, 0.037, 0.071, 0.113,</a:t>
-            </a:r>
-          </a:p>
-          <a:p>
-            <a:pPr marL="0" indent="0">
-              <a:buNone/>
-            </a:pPr>
-            <a:r>
-              <a:rPr lang="en-US" sz="1400" dirty="0">
-                <a:latin typeface="Courier New" panose="02070309020205020404" pitchFamily="49" charset="0"/>
-                <a:cs typeface="Courier New" panose="02070309020205020404" pitchFamily="49" charset="0"/>
-              </a:rPr>
-              <a:t>        0.23, 0.246)</a:t>
-            </a:r>
-          </a:p>
-          <a:p>
-            <a:pPr marL="0" indent="0">
-              <a:buNone/>
-            </a:pPr>
-            <a:r>
-              <a:rPr lang="en-US" dirty="0" smtClean="0"/>
-              <a:t>Assume these covariates affect theta</a:t>
-            </a:r>
             <a:endParaRPr lang="en-US" dirty="0"/>
           </a:p>
         </p:txBody>
@@ -6365,10 +6785,72 @@
           </a:p>
         </p:txBody>
       </p:sp>
+      <p:pic>
+        <p:nvPicPr>
+          <p:cNvPr id="5" name="Picture 4"/>
+          <p:cNvPicPr>
+            <a:picLocks noChangeAspect="1"/>
+          </p:cNvPicPr>
+          <p:nvPr/>
+        </p:nvPicPr>
+        <p:blipFill>
+          <a:blip r:embed="rId2"/>
+          <a:stretch>
+            <a:fillRect/>
+          </a:stretch>
+        </p:blipFill>
+        <p:spPr>
+          <a:xfrm>
+            <a:off x="65349" y="1071564"/>
+            <a:ext cx="9078651" cy="5301284"/>
+          </a:xfrm>
+          <a:prstGeom prst="rect">
+            <a:avLst/>
+          </a:prstGeom>
+        </p:spPr>
+      </p:pic>
+      <p:sp>
+        <p:nvSpPr>
+          <p:cNvPr id="6" name="TextBox 5"/>
+          <p:cNvSpPr txBox="1"/>
+          <p:nvPr/>
+        </p:nvSpPr>
+        <p:spPr>
+          <a:xfrm>
+            <a:off x="457200" y="6500191"/>
+            <a:ext cx="4472609" cy="369332"/>
+          </a:xfrm>
+          <a:prstGeom prst="rect">
+            <a:avLst/>
+          </a:prstGeom>
+          <a:noFill/>
+        </p:spPr>
+        <p:txBody>
+          <a:bodyPr wrap="square" rtlCol="0">
+            <a:spAutoFit/>
+          </a:bodyPr>
+          <a:lstStyle/>
+          <a:p>
+            <a:r>
+              <a:rPr lang="en-US" dirty="0" smtClean="0"/>
+              <a:t>Hobbs &amp; </a:t>
+            </a:r>
+            <a:r>
+              <a:rPr lang="en-US" dirty="0" err="1" smtClean="0"/>
+              <a:t>Hooten</a:t>
+            </a:r>
+            <a:r>
+              <a:rPr lang="en-US" dirty="0" smtClean="0"/>
+              <a:t> (2018)</a:t>
+            </a:r>
+            <a:endParaRPr lang="en-US" dirty="0"/>
+          </a:p>
+        </p:txBody>
+      </p:sp>
     </p:spTree>
     <p:extLst>
       <p:ext uri="{BB962C8B-B14F-4D97-AF65-F5344CB8AC3E}">
-        <p14:creationId xmlns:p14="http://schemas.microsoft.com/office/powerpoint/2010/main" val="2003360887"/>
+        <p14:creationId xmlns:p14="http://schemas.microsoft.com/office/powerpoint/2010/main" val="3201156343"/>
       </p:ext>
     </p:extLst>
   </p:cSld>
@@ -6410,7 +6892,11 @@
           <a:bodyPr/>
           <a:lstStyle/>
           <a:p>
-            <a:endParaRPr lang="en-US"/>
+            <a:r>
+              <a:rPr lang="es-419" noProof="0" dirty="0" smtClean="0"/>
+              <a:t>Tarea</a:t>
+            </a:r>
+            <a:endParaRPr lang="es-419" noProof="0" dirty="0"/>
           </a:p>
         </p:txBody>
       </p:sp>
@@ -6429,7 +6915,182 @@
           <a:bodyPr/>
           <a:lstStyle/>
           <a:p>
-            <a:endParaRPr lang="en-US"/>
+            <a:r>
+              <a:rPr lang="es-419" noProof="0" dirty="0" err="1" smtClean="0"/>
+              <a:t>We</a:t>
+            </a:r>
+            <a:r>
+              <a:rPr lang="es-419" noProof="0" dirty="0" smtClean="0"/>
+              <a:t> </a:t>
+            </a:r>
+            <a:r>
+              <a:rPr lang="es-419" noProof="0" dirty="0" err="1" smtClean="0"/>
+              <a:t>will</a:t>
+            </a:r>
+            <a:r>
+              <a:rPr lang="es-419" noProof="0" dirty="0" smtClean="0"/>
+              <a:t> try 3 </a:t>
+            </a:r>
+            <a:r>
+              <a:rPr lang="es-419" noProof="0" dirty="0" err="1" smtClean="0"/>
+              <a:t>versions</a:t>
+            </a:r>
+            <a:r>
+              <a:rPr lang="es-419" noProof="0" dirty="0" smtClean="0"/>
+              <a:t> of </a:t>
+            </a:r>
+            <a:r>
+              <a:rPr lang="es-419" noProof="0" dirty="0" err="1" smtClean="0"/>
+              <a:t>our</a:t>
+            </a:r>
+            <a:r>
+              <a:rPr lang="es-419" noProof="0" dirty="0" smtClean="0"/>
+              <a:t> binomial </a:t>
+            </a:r>
+            <a:r>
+              <a:rPr lang="es-419" noProof="0" dirty="0" err="1" smtClean="0"/>
+              <a:t>survival</a:t>
+            </a:r>
+            <a:r>
+              <a:rPr lang="es-419" noProof="0" dirty="0" smtClean="0"/>
+              <a:t> </a:t>
+            </a:r>
+            <a:r>
+              <a:rPr lang="es-419" noProof="0" dirty="0" err="1" smtClean="0"/>
+              <a:t>model</a:t>
+            </a:r>
+            <a:r>
+              <a:rPr lang="es-419" noProof="0" dirty="0" smtClean="0"/>
+              <a:t> (GLM)</a:t>
+            </a:r>
+          </a:p>
+          <a:p>
+            <a:r>
+              <a:rPr lang="es-419" noProof="0" dirty="0" smtClean="0"/>
+              <a:t>Fit3= de lectura (problema con sitio 5)</a:t>
+            </a:r>
+          </a:p>
+          <a:p>
+            <a:r>
+              <a:rPr lang="es-419" noProof="0" dirty="0" smtClean="0"/>
+              <a:t>Fit4= con </a:t>
+            </a:r>
+            <a:r>
+              <a:rPr lang="es-419" dirty="0" smtClean="0"/>
+              <a:t>solo </a:t>
+            </a:r>
+            <a:r>
+              <a:rPr lang="es-419" noProof="0" dirty="0" err="1" smtClean="0"/>
+              <a:t>covariable</a:t>
+            </a:r>
+            <a:r>
+              <a:rPr lang="es-419" noProof="0" dirty="0" smtClean="0"/>
+              <a:t> x1</a:t>
+            </a:r>
+          </a:p>
+          <a:p>
+            <a:r>
+              <a:rPr lang="es-419" noProof="0" dirty="0" smtClean="0"/>
+              <a:t>Fit5= con </a:t>
+            </a:r>
+            <a:r>
+              <a:rPr lang="es-419" noProof="0" dirty="0" err="1" smtClean="0"/>
+              <a:t>covariables</a:t>
+            </a:r>
+            <a:r>
+              <a:rPr lang="es-419" noProof="0" dirty="0" smtClean="0"/>
+              <a:t> x1 y x2</a:t>
+            </a:r>
+          </a:p>
+          <a:p>
+            <a:pPr marL="0" indent="0">
+              <a:buNone/>
+            </a:pPr>
+            <a:r>
+              <a:rPr lang="es-419" sz="1400" noProof="0" dirty="0" smtClean="0">
+                <a:latin typeface="Courier New" panose="02070309020205020404" pitchFamily="49" charset="0"/>
+                <a:cs typeface="Courier New" panose="02070309020205020404" pitchFamily="49" charset="0"/>
+              </a:rPr>
+              <a:t>x1 &lt;- c(9.450, 8.079, 7.686, 8.003, 2.882, 11.095, 10.696, 8.263, 12.043,</a:t>
+            </a:r>
+          </a:p>
+          <a:p>
+            <a:pPr marL="0" indent="0">
+              <a:buNone/>
+            </a:pPr>
+            <a:r>
+              <a:rPr lang="es-419" sz="1400" noProof="0" dirty="0" smtClean="0">
+                <a:latin typeface="Courier New" panose="02070309020205020404" pitchFamily="49" charset="0"/>
+                <a:cs typeface="Courier New" panose="02070309020205020404" pitchFamily="49" charset="0"/>
+              </a:rPr>
+              <a:t>        9.238)</a:t>
+            </a:r>
+          </a:p>
+          <a:p>
+            <a:pPr marL="0" indent="0">
+              <a:buNone/>
+            </a:pPr>
+            <a:r>
+              <a:rPr lang="es-419" sz="1400" noProof="0" dirty="0" smtClean="0">
+                <a:latin typeface="Courier New" panose="02070309020205020404" pitchFamily="49" charset="0"/>
+                <a:cs typeface="Courier New" panose="02070309020205020404" pitchFamily="49" charset="0"/>
+              </a:rPr>
+              <a:t>x2 &lt;- c(0.08, 0.252, 0.158, 0.25, 0.081, 0.037, 0.002, 0.042, 0.053,</a:t>
+            </a:r>
+          </a:p>
+          <a:p>
+            <a:pPr marL="0" indent="0">
+              <a:buNone/>
+            </a:pPr>
+            <a:r>
+              <a:rPr lang="es-419" sz="1400" noProof="0" dirty="0" smtClean="0">
+                <a:latin typeface="Courier New" panose="02070309020205020404" pitchFamily="49" charset="0"/>
+                <a:cs typeface="Courier New" panose="02070309020205020404" pitchFamily="49" charset="0"/>
+              </a:rPr>
+              <a:t>        -0.02, 0.141, -0.001, -0.078, 0.103, -0.076, 0.037, 0.071, 0.113,</a:t>
+            </a:r>
+          </a:p>
+          <a:p>
+            <a:pPr marL="0" indent="0">
+              <a:buNone/>
+            </a:pPr>
+            <a:r>
+              <a:rPr lang="es-419" sz="1400" noProof="0" dirty="0" smtClean="0">
+                <a:latin typeface="Courier New" panose="02070309020205020404" pitchFamily="49" charset="0"/>
+                <a:cs typeface="Courier New" panose="02070309020205020404" pitchFamily="49" charset="0"/>
+              </a:rPr>
+              <a:t>        0.23, 0.246)</a:t>
+            </a:r>
+          </a:p>
+          <a:p>
+            <a:pPr marL="0" indent="0">
+              <a:buNone/>
+            </a:pPr>
+            <a:r>
+              <a:rPr lang="es-419" noProof="0" dirty="0" err="1" smtClean="0"/>
+              <a:t>Assume</a:t>
+            </a:r>
+            <a:r>
+              <a:rPr lang="es-419" noProof="0" dirty="0" smtClean="0"/>
+              <a:t> p</a:t>
+            </a:r>
+            <a:r>
+              <a:rPr lang="es-419" dirty="0" smtClean="0"/>
+              <a:t>= </a:t>
+            </a:r>
+            <a:r>
+              <a:rPr lang="es-419" dirty="0" err="1" smtClean="0"/>
+              <a:t>ilogit</a:t>
+            </a:r>
+            <a:r>
+              <a:rPr lang="es-419" dirty="0" smtClean="0"/>
+              <a:t>(</a:t>
+            </a:r>
+            <a:r>
+              <a:rPr lang="es-419" noProof="0" dirty="0" smtClean="0"/>
+              <a:t> theta + beta1*x1 + beta2*x2)</a:t>
+            </a:r>
+            <a:endParaRPr lang="es-419" noProof="0" dirty="0"/>
           </a:p>
         </p:txBody>
       </p:sp>
@@ -6459,7 +7120,7 @@
     </p:spTree>
     <p:extLst>
       <p:ext uri="{BB962C8B-B14F-4D97-AF65-F5344CB8AC3E}">
-        <p14:creationId xmlns:p14="http://schemas.microsoft.com/office/powerpoint/2010/main" val="573071360"/>
+        <p14:creationId xmlns:p14="http://schemas.microsoft.com/office/powerpoint/2010/main" val="2003360887"/>
       </p:ext>
     </p:extLst>
   </p:cSld>
@@ -6501,7 +7162,11 @@
           <a:bodyPr/>
           <a:lstStyle/>
           <a:p>
-            <a:endParaRPr lang="en-US"/>
+            <a:r>
+              <a:rPr lang="es-419" noProof="0" dirty="0" smtClean="0"/>
+              <a:t>Tarea</a:t>
+            </a:r>
+            <a:endParaRPr lang="es-419" noProof="0" dirty="0"/>
           </a:p>
         </p:txBody>
       </p:sp>
@@ -6520,7 +7185,256 @@
           <a:bodyPr/>
           <a:lstStyle/>
           <a:p>
-            <a:endParaRPr lang="en-US"/>
+            <a:r>
+              <a:rPr lang="es-419" noProof="0" dirty="0" err="1" smtClean="0"/>
+              <a:t>Fit</a:t>
+            </a:r>
+            <a:r>
+              <a:rPr lang="es-419" noProof="0" dirty="0" smtClean="0"/>
+              <a:t> </a:t>
+            </a:r>
+            <a:r>
+              <a:rPr lang="es-419" noProof="0" dirty="0" err="1" smtClean="0"/>
+              <a:t>the</a:t>
+            </a:r>
+            <a:r>
+              <a:rPr lang="es-419" noProof="0" dirty="0" smtClean="0"/>
+              <a:t> 3 </a:t>
+            </a:r>
+            <a:r>
+              <a:rPr lang="es-419" noProof="0" dirty="0" err="1" smtClean="0"/>
+              <a:t>versions</a:t>
+            </a:r>
+            <a:r>
+              <a:rPr lang="es-419" noProof="0" dirty="0" smtClean="0"/>
+              <a:t> of </a:t>
+            </a:r>
+            <a:r>
+              <a:rPr lang="es-419" noProof="0" dirty="0" err="1" smtClean="0"/>
+              <a:t>the</a:t>
+            </a:r>
+            <a:r>
+              <a:rPr lang="es-419" noProof="0" dirty="0" smtClean="0"/>
+              <a:t> </a:t>
+            </a:r>
+            <a:r>
+              <a:rPr lang="es-419" noProof="0" dirty="0" err="1" smtClean="0"/>
+              <a:t>model</a:t>
+            </a:r>
+            <a:r>
+              <a:rPr lang="es-419" noProof="0" dirty="0" smtClean="0"/>
+              <a:t> (use </a:t>
+            </a:r>
+            <a:r>
+              <a:rPr lang="es-419" noProof="0" dirty="0" err="1" smtClean="0"/>
+              <a:t>separate</a:t>
+            </a:r>
+            <a:r>
+              <a:rPr lang="es-419" noProof="0" dirty="0" smtClean="0"/>
+              <a:t> .</a:t>
+            </a:r>
+            <a:r>
+              <a:rPr lang="es-419" noProof="0" dirty="0" err="1" smtClean="0"/>
+              <a:t>jags</a:t>
+            </a:r>
+            <a:r>
+              <a:rPr lang="es-419" noProof="0" dirty="0" smtClean="0"/>
+              <a:t> files)</a:t>
+            </a:r>
+          </a:p>
+          <a:p>
+            <a:r>
+              <a:rPr lang="es-419" noProof="0" dirty="0" err="1" smtClean="0"/>
+              <a:t>Recreate</a:t>
+            </a:r>
+            <a:r>
+              <a:rPr lang="es-419" noProof="0" dirty="0" smtClean="0"/>
+              <a:t> posterior </a:t>
+            </a:r>
+            <a:r>
+              <a:rPr lang="es-419" noProof="0" dirty="0" err="1" smtClean="0"/>
+              <a:t>predictive</a:t>
+            </a:r>
+            <a:r>
+              <a:rPr lang="es-419" noProof="0" dirty="0" smtClean="0"/>
+              <a:t> </a:t>
+            </a:r>
+            <a:r>
+              <a:rPr lang="es-419" noProof="0" dirty="0" err="1" smtClean="0"/>
+              <a:t>plots</a:t>
+            </a:r>
+            <a:r>
+              <a:rPr lang="es-419" noProof="0" dirty="0" smtClean="0"/>
+              <a:t> </a:t>
+            </a:r>
+            <a:r>
+              <a:rPr lang="es-419" noProof="0" dirty="0" err="1" smtClean="0"/>
+              <a:t>for</a:t>
+            </a:r>
+            <a:r>
+              <a:rPr lang="es-419" noProof="0" dirty="0" smtClean="0"/>
+              <a:t> </a:t>
+            </a:r>
+            <a:r>
+              <a:rPr lang="es-419" noProof="0" dirty="0" err="1" smtClean="0"/>
+              <a:t>all</a:t>
+            </a:r>
+            <a:r>
+              <a:rPr lang="es-419" noProof="0" dirty="0" smtClean="0"/>
+              <a:t> </a:t>
+            </a:r>
+            <a:r>
+              <a:rPr lang="es-419" noProof="0" dirty="0" err="1" smtClean="0"/>
+              <a:t>three</a:t>
+            </a:r>
+            <a:endParaRPr lang="es-419" noProof="0" dirty="0" smtClean="0"/>
+          </a:p>
+          <a:p>
+            <a:r>
+              <a:rPr lang="es-419" noProof="0" dirty="0" err="1" smtClean="0"/>
+              <a:t>Which</a:t>
+            </a:r>
+            <a:r>
+              <a:rPr lang="es-419" noProof="0" dirty="0" smtClean="0"/>
+              <a:t> </a:t>
+            </a:r>
+            <a:r>
+              <a:rPr lang="es-419" noProof="0" dirty="0" err="1" smtClean="0"/>
+              <a:t>model</a:t>
+            </a:r>
+            <a:r>
+              <a:rPr lang="es-419" noProof="0" dirty="0" smtClean="0"/>
+              <a:t> </a:t>
+            </a:r>
+            <a:r>
+              <a:rPr lang="es-419" noProof="0" dirty="0" err="1" smtClean="0"/>
+              <a:t>does</a:t>
+            </a:r>
+            <a:r>
+              <a:rPr lang="es-419" noProof="0" dirty="0" smtClean="0"/>
+              <a:t> DIC </a:t>
+            </a:r>
+            <a:r>
+              <a:rPr lang="es-419" noProof="0" dirty="0" err="1" smtClean="0"/>
+              <a:t>select</a:t>
+            </a:r>
+            <a:r>
+              <a:rPr lang="es-419" dirty="0"/>
+              <a:t>? (</a:t>
+            </a:r>
+            <a:r>
+              <a:rPr lang="es-419" dirty="0" smtClean="0">
+                <a:latin typeface="Courier New" panose="02070309020205020404" pitchFamily="49" charset="0"/>
+                <a:cs typeface="Courier New" panose="02070309020205020404" pitchFamily="49" charset="0"/>
+              </a:rPr>
+              <a:t>fit3$BUGSoutput$DIC</a:t>
+            </a:r>
+            <a:r>
+              <a:rPr lang="es-419" dirty="0" smtClean="0"/>
+              <a:t> etc.)</a:t>
+            </a:r>
+            <a:endParaRPr lang="es-419" noProof="0" dirty="0" smtClean="0"/>
+          </a:p>
+          <a:p>
+            <a:r>
+              <a:rPr lang="es-419" noProof="0" dirty="0" smtClean="0"/>
+              <a:t>[</a:t>
+            </a:r>
+            <a:r>
+              <a:rPr lang="es-419" noProof="0" dirty="0" err="1" smtClean="0"/>
+              <a:t>What</a:t>
+            </a:r>
+            <a:r>
+              <a:rPr lang="es-419" noProof="0" dirty="0" smtClean="0"/>
+              <a:t> </a:t>
+            </a:r>
+            <a:r>
+              <a:rPr lang="es-419" noProof="0" dirty="0" err="1" smtClean="0"/>
+              <a:t>should</a:t>
+            </a:r>
+            <a:r>
+              <a:rPr lang="es-419" noProof="0" dirty="0" smtClean="0"/>
+              <a:t> </a:t>
+            </a:r>
+            <a:r>
+              <a:rPr lang="es-419" noProof="0" dirty="0" err="1" smtClean="0"/>
+              <a:t>you</a:t>
+            </a:r>
+            <a:r>
+              <a:rPr lang="es-419" noProof="0" dirty="0" smtClean="0"/>
+              <a:t> use </a:t>
+            </a:r>
+            <a:r>
+              <a:rPr lang="es-419" noProof="0" dirty="0" err="1" smtClean="0"/>
+              <a:t>for</a:t>
+            </a:r>
+            <a:r>
+              <a:rPr lang="es-419" noProof="0" dirty="0" smtClean="0"/>
+              <a:t> </a:t>
+            </a:r>
+            <a:r>
+              <a:rPr lang="es-419" noProof="0" dirty="0" err="1" smtClean="0"/>
+              <a:t>priors</a:t>
+            </a:r>
+            <a:r>
+              <a:rPr lang="es-419" noProof="0" dirty="0" smtClean="0"/>
+              <a:t> </a:t>
+            </a:r>
+            <a:r>
+              <a:rPr lang="es-419" noProof="0" dirty="0" err="1" smtClean="0"/>
+              <a:t>on</a:t>
+            </a:r>
+            <a:r>
+              <a:rPr lang="es-419" noProof="0" dirty="0" smtClean="0"/>
+              <a:t> </a:t>
+            </a:r>
+            <a:r>
+              <a:rPr lang="es-419" noProof="0" dirty="0" err="1" smtClean="0"/>
+              <a:t>coefficients</a:t>
+            </a:r>
+            <a:r>
+              <a:rPr lang="es-419" noProof="0" dirty="0" smtClean="0"/>
+              <a:t>?]</a:t>
+            </a:r>
+          </a:p>
+          <a:p>
+            <a:r>
+              <a:rPr lang="es-419" dirty="0" smtClean="0"/>
+              <a:t>[</a:t>
+            </a:r>
+            <a:r>
+              <a:rPr lang="es-419" dirty="0" err="1" smtClean="0"/>
+              <a:t>Suggestion</a:t>
+            </a:r>
+            <a:r>
+              <a:rPr lang="es-419" dirty="0" smtClean="0"/>
+              <a:t>: </a:t>
+            </a:r>
+            <a:r>
+              <a:rPr lang="es-419" dirty="0" err="1" smtClean="0"/>
+              <a:t>Normalize</a:t>
+            </a:r>
+            <a:r>
+              <a:rPr lang="es-419" dirty="0" smtClean="0"/>
+              <a:t> </a:t>
+            </a:r>
+            <a:r>
+              <a:rPr lang="es-419" dirty="0" err="1" smtClean="0"/>
+              <a:t>the</a:t>
+            </a:r>
+            <a:r>
+              <a:rPr lang="es-419" dirty="0" smtClean="0"/>
+              <a:t> </a:t>
+            </a:r>
+            <a:r>
+              <a:rPr lang="es-419" dirty="0" err="1" smtClean="0"/>
+              <a:t>covariates</a:t>
+            </a:r>
+            <a:r>
+              <a:rPr lang="es-419" dirty="0" smtClean="0"/>
+              <a:t>]</a:t>
+            </a:r>
+            <a:endParaRPr lang="es-419" noProof="0" dirty="0"/>
           </a:p>
         </p:txBody>
       </p:sp>
@@ -6550,7 +7464,7 @@
     </p:spTree>
     <p:extLst>
       <p:ext uri="{BB962C8B-B14F-4D97-AF65-F5344CB8AC3E}">
-        <p14:creationId xmlns:p14="http://schemas.microsoft.com/office/powerpoint/2010/main" val="2356479383"/>
+        <p14:creationId xmlns:p14="http://schemas.microsoft.com/office/powerpoint/2010/main" val="3470775957"/>
       </p:ext>
     </p:extLst>
   </p:cSld>
@@ -6593,10 +7507,10 @@
           <a:lstStyle/>
           <a:p>
             <a:r>
-              <a:rPr lang="en-US" dirty="0" smtClean="0"/>
-              <a:t>Homework</a:t>
-            </a:r>
-            <a:endParaRPr lang="en-US" dirty="0"/>
+              <a:rPr lang="es-419" noProof="0" dirty="0" smtClean="0"/>
+              <a:t>Tarea</a:t>
+            </a:r>
+            <a:endParaRPr lang="es-419" noProof="0" dirty="0"/>
           </a:p>
         </p:txBody>
       </p:sp>
@@ -6616,28 +7530,210 @@
           <a:lstStyle/>
           <a:p>
             <a:r>
-              <a:rPr lang="en-US" dirty="0" smtClean="0"/>
-              <a:t>Use the results to select which model you think is most appropriate.</a:t>
-            </a:r>
-          </a:p>
-          <a:p>
-            <a:r>
-              <a:rPr lang="en-US" dirty="0" smtClean="0"/>
-              <a:t>Write down the model, likelihood and priors.</a:t>
-            </a:r>
-          </a:p>
-          <a:p>
-            <a:r>
-              <a:rPr lang="en-US" dirty="0" smtClean="0"/>
-              <a:t>Calculate the probability of survival greater than 0.8. P(p&gt;0.8) from this model</a:t>
-            </a:r>
-          </a:p>
-          <a:p>
-            <a:r>
-              <a:rPr lang="en-US" dirty="0" smtClean="0"/>
-              <a:t>Read the paper</a:t>
-            </a:r>
-            <a:endParaRPr lang="en-US" dirty="0"/>
+              <a:rPr lang="es-419" noProof="0" dirty="0" smtClean="0"/>
+              <a:t>Use </a:t>
+            </a:r>
+            <a:r>
+              <a:rPr lang="es-419" noProof="0" dirty="0" err="1" smtClean="0"/>
+              <a:t>the</a:t>
+            </a:r>
+            <a:r>
+              <a:rPr lang="es-419" noProof="0" dirty="0" smtClean="0"/>
+              <a:t> </a:t>
+            </a:r>
+            <a:r>
+              <a:rPr lang="es-419" noProof="0" dirty="0" err="1" smtClean="0"/>
+              <a:t>results</a:t>
+            </a:r>
+            <a:r>
+              <a:rPr lang="es-419" noProof="0" dirty="0" smtClean="0"/>
+              <a:t> to </a:t>
+            </a:r>
+            <a:r>
+              <a:rPr lang="es-419" noProof="0" dirty="0" err="1" smtClean="0"/>
+              <a:t>select</a:t>
+            </a:r>
+            <a:r>
+              <a:rPr lang="es-419" noProof="0" dirty="0" smtClean="0"/>
+              <a:t> </a:t>
+            </a:r>
+            <a:r>
+              <a:rPr lang="es-419" noProof="0" dirty="0" err="1" smtClean="0"/>
+              <a:t>which</a:t>
+            </a:r>
+            <a:r>
+              <a:rPr lang="es-419" noProof="0" dirty="0" smtClean="0"/>
+              <a:t> </a:t>
+            </a:r>
+            <a:r>
+              <a:rPr lang="es-419" noProof="0" dirty="0" err="1" smtClean="0"/>
+              <a:t>model</a:t>
+            </a:r>
+            <a:r>
+              <a:rPr lang="es-419" noProof="0" dirty="0" smtClean="0"/>
+              <a:t> </a:t>
+            </a:r>
+            <a:r>
+              <a:rPr lang="es-419" noProof="0" dirty="0" err="1" smtClean="0"/>
+              <a:t>you</a:t>
+            </a:r>
+            <a:r>
+              <a:rPr lang="es-419" noProof="0" dirty="0" smtClean="0"/>
+              <a:t> </a:t>
+            </a:r>
+            <a:r>
+              <a:rPr lang="es-419" noProof="0" dirty="0" err="1" smtClean="0"/>
+              <a:t>think</a:t>
+            </a:r>
+            <a:r>
+              <a:rPr lang="es-419" noProof="0" dirty="0" smtClean="0"/>
+              <a:t> </a:t>
+            </a:r>
+            <a:r>
+              <a:rPr lang="es-419" noProof="0" dirty="0" err="1" smtClean="0"/>
+              <a:t>is</a:t>
+            </a:r>
+            <a:r>
+              <a:rPr lang="es-419" noProof="0" dirty="0" smtClean="0"/>
+              <a:t> </a:t>
+            </a:r>
+            <a:r>
+              <a:rPr lang="es-419" noProof="0" dirty="0" err="1" smtClean="0"/>
+              <a:t>most</a:t>
+            </a:r>
+            <a:r>
+              <a:rPr lang="es-419" noProof="0" dirty="0" smtClean="0"/>
+              <a:t> </a:t>
+            </a:r>
+            <a:r>
+              <a:rPr lang="es-419" noProof="0" dirty="0" err="1" smtClean="0"/>
+              <a:t>appropriate</a:t>
+            </a:r>
+            <a:r>
+              <a:rPr lang="es-419" noProof="0" dirty="0" smtClean="0"/>
+              <a:t>.</a:t>
+            </a:r>
+          </a:p>
+          <a:p>
+            <a:r>
+              <a:rPr lang="es-419" noProof="0" dirty="0" err="1" smtClean="0"/>
+              <a:t>Write</a:t>
+            </a:r>
+            <a:r>
+              <a:rPr lang="es-419" noProof="0" dirty="0" smtClean="0"/>
+              <a:t> </a:t>
+            </a:r>
+            <a:r>
+              <a:rPr lang="es-419" noProof="0" dirty="0" err="1" smtClean="0"/>
+              <a:t>down</a:t>
+            </a:r>
+            <a:r>
+              <a:rPr lang="es-419" noProof="0" dirty="0" smtClean="0"/>
+              <a:t> </a:t>
+            </a:r>
+            <a:r>
+              <a:rPr lang="es-419" noProof="0" dirty="0" err="1" smtClean="0"/>
+              <a:t>the</a:t>
+            </a:r>
+            <a:r>
+              <a:rPr lang="es-419" noProof="0" dirty="0" smtClean="0"/>
+              <a:t> </a:t>
+            </a:r>
+            <a:r>
+              <a:rPr lang="es-419" noProof="0" dirty="0" err="1" smtClean="0"/>
+              <a:t>model</a:t>
+            </a:r>
+            <a:r>
+              <a:rPr lang="es-419" noProof="0" dirty="0" smtClean="0"/>
+              <a:t>, </a:t>
+            </a:r>
+            <a:r>
+              <a:rPr lang="es-419" noProof="0" dirty="0" err="1" smtClean="0"/>
+              <a:t>likelihood</a:t>
+            </a:r>
+            <a:r>
+              <a:rPr lang="es-419" noProof="0" dirty="0" smtClean="0"/>
+              <a:t> and </a:t>
+            </a:r>
+            <a:r>
+              <a:rPr lang="es-419" noProof="0" dirty="0" err="1" smtClean="0"/>
+              <a:t>priors</a:t>
+            </a:r>
+            <a:r>
+              <a:rPr lang="es-419" noProof="0" dirty="0" smtClean="0"/>
+              <a:t>.</a:t>
+            </a:r>
+          </a:p>
+          <a:p>
+            <a:r>
+              <a:rPr lang="es-419" noProof="0" dirty="0" err="1" smtClean="0"/>
+              <a:t>Calculate</a:t>
+            </a:r>
+            <a:r>
+              <a:rPr lang="es-419" noProof="0" dirty="0" smtClean="0"/>
+              <a:t> </a:t>
+            </a:r>
+            <a:r>
+              <a:rPr lang="es-419" noProof="0" dirty="0" err="1" smtClean="0"/>
+              <a:t>the</a:t>
+            </a:r>
+            <a:r>
+              <a:rPr lang="es-419" noProof="0" dirty="0" smtClean="0"/>
+              <a:t> </a:t>
+            </a:r>
+            <a:r>
+              <a:rPr lang="es-419" noProof="0" dirty="0" err="1" smtClean="0"/>
+              <a:t>probability</a:t>
+            </a:r>
+            <a:r>
+              <a:rPr lang="es-419" noProof="0" dirty="0" smtClean="0"/>
+              <a:t> of </a:t>
+            </a:r>
+            <a:r>
+              <a:rPr lang="es-419" noProof="0" dirty="0" err="1" smtClean="0"/>
+              <a:t>survival</a:t>
+            </a:r>
+            <a:r>
+              <a:rPr lang="es-419" noProof="0" dirty="0" smtClean="0"/>
+              <a:t> </a:t>
+            </a:r>
+            <a:r>
+              <a:rPr lang="es-419" noProof="0" dirty="0" err="1" smtClean="0"/>
+              <a:t>greater</a:t>
+            </a:r>
+            <a:r>
+              <a:rPr lang="es-419" noProof="0" dirty="0" smtClean="0"/>
+              <a:t> </a:t>
+            </a:r>
+            <a:r>
+              <a:rPr lang="es-419" noProof="0" dirty="0" err="1" smtClean="0"/>
+              <a:t>than</a:t>
+            </a:r>
+            <a:r>
+              <a:rPr lang="es-419" noProof="0" dirty="0" smtClean="0"/>
+              <a:t> 0.8. P(p&gt;0.8) </a:t>
+            </a:r>
+            <a:r>
+              <a:rPr lang="es-419" noProof="0" dirty="0" err="1" smtClean="0"/>
+              <a:t>from</a:t>
+            </a:r>
+            <a:r>
+              <a:rPr lang="es-419" noProof="0" dirty="0" smtClean="0"/>
+              <a:t> </a:t>
+            </a:r>
+            <a:r>
+              <a:rPr lang="es-419" noProof="0" dirty="0" err="1" smtClean="0"/>
+              <a:t>this</a:t>
+            </a:r>
+            <a:r>
+              <a:rPr lang="es-419" noProof="0" dirty="0" smtClean="0"/>
+              <a:t> </a:t>
+            </a:r>
+            <a:r>
+              <a:rPr lang="es-419" noProof="0" dirty="0" err="1" smtClean="0"/>
+              <a:t>model</a:t>
+            </a:r>
+            <a:endParaRPr lang="es-419" noProof="0" dirty="0" smtClean="0"/>
           </a:p>
         </p:txBody>
       </p:sp>

</xml_diff>